<commit_message>
updated intro for summer school
</commit_message>
<xml_diff>
--- a/slides/1_Introduction.pptx
+++ b/slides/1_Introduction.pptx
@@ -259,7 +259,7 @@
           <a:p>
             <a:fld id="{2F3ABF1A-8818-4472-8518-E71DC7B5D2F7}" type="datetimeFigureOut">
               <a:rPr lang="en-US" smtClean="0"/>
-              <a:t>1/29/2025</a:t>
+              <a:t>6/12/2025</a:t>
             </a:fld>
             <a:endParaRPr lang="en-US"/>
           </a:p>
@@ -1279,7 +1279,7 @@
           <a:p>
             <a:fld id="{6E4A31BF-7266-4BEB-918B-ADC21C630A6F}" type="datetimeFigureOut">
               <a:rPr lang="en-US" smtClean="0"/>
-              <a:t>1/29/2025</a:t>
+              <a:t>6/12/2025</a:t>
             </a:fld>
             <a:endParaRPr lang="en-US"/>
           </a:p>
@@ -1477,7 +1477,7 @@
           <a:p>
             <a:fld id="{6E4A31BF-7266-4BEB-918B-ADC21C630A6F}" type="datetimeFigureOut">
               <a:rPr lang="en-US" smtClean="0"/>
-              <a:t>1/29/2025</a:t>
+              <a:t>6/12/2025</a:t>
             </a:fld>
             <a:endParaRPr lang="en-US"/>
           </a:p>
@@ -1685,7 +1685,7 @@
           <a:p>
             <a:fld id="{6E4A31BF-7266-4BEB-918B-ADC21C630A6F}" type="datetimeFigureOut">
               <a:rPr lang="en-US" smtClean="0"/>
-              <a:t>1/29/2025</a:t>
+              <a:t>6/12/2025</a:t>
             </a:fld>
             <a:endParaRPr lang="en-US"/>
           </a:p>
@@ -1883,7 +1883,7 @@
           <a:p>
             <a:fld id="{6E4A31BF-7266-4BEB-918B-ADC21C630A6F}" type="datetimeFigureOut">
               <a:rPr lang="en-US" smtClean="0"/>
-              <a:t>1/29/2025</a:t>
+              <a:t>6/12/2025</a:t>
             </a:fld>
             <a:endParaRPr lang="en-US"/>
           </a:p>
@@ -2158,7 +2158,7 @@
           <a:p>
             <a:fld id="{6E4A31BF-7266-4BEB-918B-ADC21C630A6F}" type="datetimeFigureOut">
               <a:rPr lang="en-US" smtClean="0"/>
-              <a:t>1/29/2025</a:t>
+              <a:t>6/12/2025</a:t>
             </a:fld>
             <a:endParaRPr lang="en-US"/>
           </a:p>
@@ -2423,7 +2423,7 @@
           <a:p>
             <a:fld id="{6E4A31BF-7266-4BEB-918B-ADC21C630A6F}" type="datetimeFigureOut">
               <a:rPr lang="en-US" smtClean="0"/>
-              <a:t>1/29/2025</a:t>
+              <a:t>6/12/2025</a:t>
             </a:fld>
             <a:endParaRPr lang="en-US"/>
           </a:p>
@@ -2835,7 +2835,7 @@
           <a:p>
             <a:fld id="{6E4A31BF-7266-4BEB-918B-ADC21C630A6F}" type="datetimeFigureOut">
               <a:rPr lang="en-US" smtClean="0"/>
-              <a:t>1/29/2025</a:t>
+              <a:t>6/12/2025</a:t>
             </a:fld>
             <a:endParaRPr lang="en-US"/>
           </a:p>
@@ -2976,7 +2976,7 @@
           <a:p>
             <a:fld id="{6E4A31BF-7266-4BEB-918B-ADC21C630A6F}" type="datetimeFigureOut">
               <a:rPr lang="en-US" smtClean="0"/>
-              <a:t>1/29/2025</a:t>
+              <a:t>6/12/2025</a:t>
             </a:fld>
             <a:endParaRPr lang="en-US"/>
           </a:p>
@@ -3089,7 +3089,7 @@
           <a:p>
             <a:fld id="{6E4A31BF-7266-4BEB-918B-ADC21C630A6F}" type="datetimeFigureOut">
               <a:rPr lang="en-US" smtClean="0"/>
-              <a:t>1/29/2025</a:t>
+              <a:t>6/12/2025</a:t>
             </a:fld>
             <a:endParaRPr lang="en-US"/>
           </a:p>
@@ -3400,7 +3400,7 @@
           <a:p>
             <a:fld id="{6E4A31BF-7266-4BEB-918B-ADC21C630A6F}" type="datetimeFigureOut">
               <a:rPr lang="en-US" smtClean="0"/>
-              <a:t>1/29/2025</a:t>
+              <a:t>6/12/2025</a:t>
             </a:fld>
             <a:endParaRPr lang="en-US"/>
           </a:p>
@@ -3688,7 +3688,7 @@
           <a:p>
             <a:fld id="{6E4A31BF-7266-4BEB-918B-ADC21C630A6F}" type="datetimeFigureOut">
               <a:rPr lang="en-US" smtClean="0"/>
-              <a:t>1/29/2025</a:t>
+              <a:t>6/12/2025</a:t>
             </a:fld>
             <a:endParaRPr lang="en-US"/>
           </a:p>
@@ -3929,7 +3929,7 @@
           <a:p>
             <a:fld id="{6E4A31BF-7266-4BEB-918B-ADC21C630A6F}" type="datetimeFigureOut">
               <a:rPr lang="en-US" smtClean="0"/>
-              <a:t>1/29/2025</a:t>
+              <a:t>6/12/2025</a:t>
             </a:fld>
             <a:endParaRPr lang="en-US"/>
           </a:p>
@@ -4582,6 +4582,16 @@
           <a:lstStyle/>
           <a:p>
             <a:r>
+              <a:rPr lang="en-US" sz="4000" i="0">
+                <a:solidFill>
+                  <a:srgbClr val="000000"/>
+                </a:solidFill>
+                <a:effectLst/>
+                <a:latin typeface="+mn-lt"/>
+              </a:rPr>
+              <a:t>About your TA: </a:t>
+            </a:r>
+            <a:r>
               <a:rPr lang="en-US" sz="4000" i="0" dirty="0">
                 <a:solidFill>
                   <a:srgbClr val="000000"/>
@@ -4589,7 +4599,7 @@
                 <a:effectLst/>
                 <a:latin typeface="+mn-lt"/>
               </a:rPr>
-              <a:t>Teaching Assistant: George Cruz</a:t>
+              <a:t>George Cruz</a:t>
             </a:r>
             <a:br>
               <a:rPr lang="en-US" sz="4000" b="1" i="0" dirty="0">
@@ -6463,7 +6473,7 @@
 </file>
 
 <file path=ppt/slides/slide14.xml><?xml version="1.0" encoding="utf-8"?>
-<p:sld xmlns:a="http://schemas.openxmlformats.org/drawingml/2006/main" xmlns:r="http://schemas.openxmlformats.org/officeDocument/2006/relationships" xmlns:p="http://schemas.openxmlformats.org/presentationml/2006/main">
+<p:sld xmlns:a="http://schemas.openxmlformats.org/drawingml/2006/main" xmlns:r="http://schemas.openxmlformats.org/officeDocument/2006/relationships" xmlns:p="http://schemas.openxmlformats.org/presentationml/2006/main" show="0">
   <p:cSld>
     <p:spTree>
       <p:nvGrpSpPr>
@@ -6839,7 +6849,7 @@
 </file>
 
 <file path=ppt/slides/slide15.xml><?xml version="1.0" encoding="utf-8"?>
-<p:sld xmlns:a="http://schemas.openxmlformats.org/drawingml/2006/main" xmlns:r="http://schemas.openxmlformats.org/officeDocument/2006/relationships" xmlns:p="http://schemas.openxmlformats.org/presentationml/2006/main" show="0">
+<p:sld xmlns:a="http://schemas.openxmlformats.org/drawingml/2006/main" xmlns:r="http://schemas.openxmlformats.org/officeDocument/2006/relationships" xmlns:p="http://schemas.openxmlformats.org/presentationml/2006/main">
   <p:cSld>
     <p:spTree>
       <p:nvGrpSpPr>
@@ -6879,7 +6889,7 @@
         </p:spPr>
         <p:txBody>
           <a:bodyPr>
-            <a:normAutofit lnSpcReduction="10000"/>
+            <a:normAutofit/>
           </a:bodyPr>
           <a:lstStyle/>
           <a:p>
@@ -6905,24 +6915,20 @@
             </a:r>
           </a:p>
           <a:p>
-            <a:pPr lvl="1"/>
-            <a:r>
-              <a:rPr lang="en-US" dirty="0"/>
-              <a:t>No class Tuesday July 4</a:t>
-            </a:r>
-          </a:p>
-          <a:p>
             <a:r>
               <a:rPr lang="en-US" dirty="0"/>
               <a:t>Tuesdays and Thursdays – Section meeting to address questions, discuss code, background review – starting at 6:30 pm US Eastern Time  </a:t>
             </a:r>
           </a:p>
           <a:p>
-            <a:pPr lvl="1"/>
-            <a:r>
-              <a:rPr lang="en-US" dirty="0"/>
-              <a:t>No meeting Thursday July 4</a:t>
-            </a:r>
+            <a:pPr marL="0" indent="0">
+              <a:buNone/>
+            </a:pPr>
+            <a:endParaRPr lang="en-US" dirty="0">
+              <a:solidFill>
+                <a:srgbClr val="C00000"/>
+              </a:solidFill>
+            </a:endParaRPr>
           </a:p>
           <a:p>
             <a:pPr marL="0" indent="0">
@@ -7090,15 +7096,33 @@
                                   </p:childTnLst>
                                 </p:cTn>
                               </p:par>
+                            </p:childTnLst>
+                          </p:cTn>
+                        </p:par>
+                      </p:childTnLst>
+                    </p:cTn>
+                  </p:par>
+                  <p:par>
+                    <p:cTn id="9" fill="hold">
+                      <p:stCondLst>
+                        <p:cond delay="indefinite"/>
+                      </p:stCondLst>
+                      <p:childTnLst>
+                        <p:par>
+                          <p:cTn id="10" fill="hold">
+                            <p:stCondLst>
+                              <p:cond delay="0"/>
+                            </p:stCondLst>
+                            <p:childTnLst>
                               <p:par>
-                                <p:cTn id="9" presetID="1" presetClass="entr" presetSubtype="0" fill="hold" nodeType="withEffect">
+                                <p:cTn id="11" presetID="1" presetClass="entr" presetSubtype="0" fill="hold" nodeType="clickEffect">
                                   <p:stCondLst>
                                     <p:cond delay="0"/>
                                   </p:stCondLst>
                                   <p:childTnLst>
                                     <p:set>
                                       <p:cBhvr>
-                                        <p:cTn id="10" dur="1" fill="hold">
+                                        <p:cTn id="12" dur="1" fill="hold">
                                           <p:stCondLst>
                                             <p:cond delay="0"/>
                                           </p:stCondLst>
@@ -7128,50 +7152,19 @@
                     </p:cTn>
                   </p:par>
                   <p:par>
-                    <p:cTn id="11" fill="hold">
+                    <p:cTn id="13" fill="hold">
                       <p:stCondLst>
                         <p:cond delay="indefinite"/>
                       </p:stCondLst>
                       <p:childTnLst>
                         <p:par>
-                          <p:cTn id="12" fill="hold">
+                          <p:cTn id="14" fill="hold">
                             <p:stCondLst>
                               <p:cond delay="0"/>
                             </p:stCondLst>
                             <p:childTnLst>
                               <p:par>
-                                <p:cTn id="13" presetID="1" presetClass="entr" presetSubtype="0" fill="hold" nodeType="clickEffect">
-                                  <p:stCondLst>
-                                    <p:cond delay="0"/>
-                                  </p:stCondLst>
-                                  <p:childTnLst>
-                                    <p:set>
-                                      <p:cBhvr>
-                                        <p:cTn id="14" dur="1" fill="hold">
-                                          <p:stCondLst>
-                                            <p:cond delay="0"/>
-                                          </p:stCondLst>
-                                        </p:cTn>
-                                        <p:tgtEl>
-                                          <p:spTgt spid="3">
-                                            <p:txEl>
-                                              <p:pRg st="4" end="4"/>
-                                            </p:txEl>
-                                          </p:spTgt>
-                                        </p:tgtEl>
-                                        <p:attrNameLst>
-                                          <p:attrName>style.visibility</p:attrName>
-                                        </p:attrNameLst>
-                                      </p:cBhvr>
-                                      <p:to>
-                                        <p:strVal val="visible"/>
-                                      </p:to>
-                                    </p:set>
-                                  </p:childTnLst>
-                                </p:cTn>
-                              </p:par>
-                              <p:par>
-                                <p:cTn id="15" presetID="1" presetClass="entr" presetSubtype="0" fill="hold" nodeType="withEffect">
+                                <p:cTn id="15" presetID="1" presetClass="entr" presetSubtype="0" fill="hold" nodeType="clickEffect">
                                   <p:stCondLst>
                                     <p:cond delay="0"/>
                                   </p:stCondLst>
@@ -7187,55 +7180,6 @@
                                           <p:spTgt spid="3">
                                             <p:txEl>
                                               <p:pRg st="5" end="5"/>
-                                            </p:txEl>
-                                          </p:spTgt>
-                                        </p:tgtEl>
-                                        <p:attrNameLst>
-                                          <p:attrName>style.visibility</p:attrName>
-                                        </p:attrNameLst>
-                                      </p:cBhvr>
-                                      <p:to>
-                                        <p:strVal val="visible"/>
-                                      </p:to>
-                                    </p:set>
-                                  </p:childTnLst>
-                                </p:cTn>
-                              </p:par>
-                            </p:childTnLst>
-                          </p:cTn>
-                        </p:par>
-                      </p:childTnLst>
-                    </p:cTn>
-                  </p:par>
-                  <p:par>
-                    <p:cTn id="17" fill="hold">
-                      <p:stCondLst>
-                        <p:cond delay="indefinite"/>
-                      </p:stCondLst>
-                      <p:childTnLst>
-                        <p:par>
-                          <p:cTn id="18" fill="hold">
-                            <p:stCondLst>
-                              <p:cond delay="0"/>
-                            </p:stCondLst>
-                            <p:childTnLst>
-                              <p:par>
-                                <p:cTn id="19" presetID="1" presetClass="entr" presetSubtype="0" fill="hold" nodeType="clickEffect">
-                                  <p:stCondLst>
-                                    <p:cond delay="0"/>
-                                  </p:stCondLst>
-                                  <p:childTnLst>
-                                    <p:set>
-                                      <p:cBhvr>
-                                        <p:cTn id="20" dur="1" fill="hold">
-                                          <p:stCondLst>
-                                            <p:cond delay="0"/>
-                                          </p:stCondLst>
-                                        </p:cTn>
-                                        <p:tgtEl>
-                                          <p:spTgt spid="3">
-                                            <p:txEl>
-                                              <p:pRg st="6" end="6"/>
                                             </p:txEl>
                                           </p:spTgt>
                                         </p:tgtEl>
@@ -7282,7 +7226,7 @@
 </file>
 
 <file path=ppt/slides/slide16.xml><?xml version="1.0" encoding="utf-8"?>
-<p:sld xmlns:a="http://schemas.openxmlformats.org/drawingml/2006/main" xmlns:r="http://schemas.openxmlformats.org/officeDocument/2006/relationships" xmlns:p="http://schemas.openxmlformats.org/presentationml/2006/main" show="0">
+<p:sld xmlns:a="http://schemas.openxmlformats.org/drawingml/2006/main" xmlns:r="http://schemas.openxmlformats.org/officeDocument/2006/relationships" xmlns:p="http://schemas.openxmlformats.org/presentationml/2006/main">
   <p:cSld>
     <p:spTree>
       <p:nvGrpSpPr>
@@ -9044,7 +8988,27 @@
               </a:rPr>
               <a:t>La Rocca, Marcello, Manning, 2021</a:t>
             </a:r>
-            <a:endParaRPr lang="en-US" dirty="0"/>
+          </a:p>
+          <a:p>
+            <a:pPr lvl="1"/>
+            <a:r>
+              <a:rPr lang="en-US" dirty="0">
+                <a:hlinkClick r:id="rId6"/>
+              </a:rPr>
+              <a:t>Data Mining, Concepts and Techniques</a:t>
+            </a:r>
+            <a:r>
+              <a:rPr lang="en-US" dirty="0"/>
+              <a:t>, 4th Edition, Jiawei Han, Jian Pei, </a:t>
+            </a:r>
+            <a:r>
+              <a:rPr lang="en-US" dirty="0" err="1"/>
+              <a:t>Hanghang</a:t>
+            </a:r>
+            <a:r>
+              <a:rPr lang="en-US" dirty="0"/>
+              <a:t> Tong, Morgan Kaufmann, 2022</a:t>
+            </a:r>
           </a:p>
           <a:p>
             <a:pPr lvl="1"/>
@@ -9206,7 +9170,7 @@
                   <a:srgbClr val="FF0000"/>
                 </a:solidFill>
               </a:rPr>
-              <a:t>Post code and complete exception messages if you are dealing with an error!</a:t>
+              <a:t>Post code and complete exception messages if you are dealing with code problem!</a:t>
             </a:r>
           </a:p>
           <a:p>
@@ -9416,7 +9380,7 @@
 </file>
 
 <file path=ppt/slides/slide22.xml><?xml version="1.0" encoding="utf-8"?>
-<p:sld xmlns:a="http://schemas.openxmlformats.org/drawingml/2006/main" xmlns:r="http://schemas.openxmlformats.org/officeDocument/2006/relationships" xmlns:p="http://schemas.openxmlformats.org/presentationml/2006/main" show="0">
+<p:sld xmlns:a="http://schemas.openxmlformats.org/drawingml/2006/main" xmlns:r="http://schemas.openxmlformats.org/officeDocument/2006/relationships" xmlns:p="http://schemas.openxmlformats.org/presentationml/2006/main">
   <p:cSld>
     <p:spTree>
       <p:nvGrpSpPr>
@@ -9590,7 +9554,7 @@
 </file>
 
 <file path=ppt/slides/slide23.xml><?xml version="1.0" encoding="utf-8"?>
-<p:sld xmlns:a="http://schemas.openxmlformats.org/drawingml/2006/main" xmlns:r="http://schemas.openxmlformats.org/officeDocument/2006/relationships" xmlns:p="http://schemas.openxmlformats.org/presentationml/2006/main">
+<p:sld xmlns:a="http://schemas.openxmlformats.org/drawingml/2006/main" xmlns:r="http://schemas.openxmlformats.org/officeDocument/2006/relationships" xmlns:p="http://schemas.openxmlformats.org/presentationml/2006/main" show="0">
   <p:cSld>
     <p:spTree>
       <p:nvGrpSpPr>
@@ -12772,8 +12736,8 @@
           <a:chExt cx="0" cy="0"/>
         </a:xfrm>
       </p:grpSpPr>
-      <mc:AlternateContent xmlns:mc="http://schemas.openxmlformats.org/markup-compatibility/2006">
-        <mc:Choice xmlns:a14="http://schemas.microsoft.com/office/drawing/2010/main" Requires="a14">
+      <mc:AlternateContent xmlns:mc="http://schemas.openxmlformats.org/markup-compatibility/2006" xmlns:a14="http://schemas.microsoft.com/office/drawing/2010/main">
+        <mc:Choice Requires="a14">
           <p:sp>
             <p:nvSpPr>
               <p:cNvPr id="3" name="Content Placeholder 2">
@@ -13079,7 +13043,7 @@
             </p:txBody>
           </p:sp>
         </mc:Choice>
-        <mc:Fallback>
+        <mc:Fallback xmlns="">
           <p:sp>
             <p:nvSpPr>
               <p:cNvPr id="3" name="Content Placeholder 2">
@@ -16040,8 +16004,8 @@
           <a:chExt cx="0" cy="0"/>
         </a:xfrm>
       </p:grpSpPr>
-      <mc:AlternateContent xmlns:mc="http://schemas.openxmlformats.org/markup-compatibility/2006">
-        <mc:Choice xmlns:a14="http://schemas.microsoft.com/office/drawing/2010/main" Requires="a14">
+      <mc:AlternateContent xmlns:mc="http://schemas.openxmlformats.org/markup-compatibility/2006" xmlns:a14="http://schemas.microsoft.com/office/drawing/2010/main">
+        <mc:Choice Requires="a14">
           <p:sp>
             <p:nvSpPr>
               <p:cNvPr id="3" name="Content Placeholder 2">
@@ -16259,7 +16223,7 @@
             </p:txBody>
           </p:sp>
         </mc:Choice>
-        <mc:Fallback>
+        <mc:Fallback xmlns="">
           <p:sp>
             <p:nvSpPr>
               <p:cNvPr id="3" name="Content Placeholder 2">
@@ -22469,8 +22433,8 @@
           <a:chExt cx="0" cy="0"/>
         </a:xfrm>
       </p:grpSpPr>
-      <mc:AlternateContent xmlns:mc="http://schemas.openxmlformats.org/markup-compatibility/2006">
-        <mc:Choice xmlns:a14="http://schemas.microsoft.com/office/drawing/2010/main" Requires="a14">
+      <mc:AlternateContent xmlns:mc="http://schemas.openxmlformats.org/markup-compatibility/2006" xmlns:a14="http://schemas.microsoft.com/office/drawing/2010/main">
+        <mc:Choice Requires="a14">
           <p:sp>
             <p:nvSpPr>
               <p:cNvPr id="3" name="Content Placeholder 2">
@@ -22747,7 +22711,7 @@
             </p:txBody>
           </p:sp>
         </mc:Choice>
-        <mc:Fallback>
+        <mc:Fallback xmlns="">
           <p:sp>
             <p:nvSpPr>
               <p:cNvPr id="3" name="Content Placeholder 2">
@@ -22877,8 +22841,8 @@
           <a:chExt cx="0" cy="0"/>
         </a:xfrm>
       </p:grpSpPr>
-      <mc:AlternateContent xmlns:mc="http://schemas.openxmlformats.org/markup-compatibility/2006">
-        <mc:Choice xmlns:a14="http://schemas.microsoft.com/office/drawing/2010/main" Requires="a14">
+      <mc:AlternateContent xmlns:mc="http://schemas.openxmlformats.org/markup-compatibility/2006" xmlns:a14="http://schemas.microsoft.com/office/drawing/2010/main">
+        <mc:Choice Requires="a14">
           <p:sp>
             <p:nvSpPr>
               <p:cNvPr id="3" name="Content Placeholder 2">
@@ -23210,7 +23174,7 @@
             </p:txBody>
           </p:sp>
         </mc:Choice>
-        <mc:Fallback>
+        <mc:Fallback xmlns="">
           <p:sp>
             <p:nvSpPr>
               <p:cNvPr id="3" name="Content Placeholder 2">
@@ -23340,8 +23304,8 @@
           <a:chExt cx="0" cy="0"/>
         </a:xfrm>
       </p:grpSpPr>
-      <mc:AlternateContent xmlns:mc="http://schemas.openxmlformats.org/markup-compatibility/2006">
-        <mc:Choice xmlns:a14="http://schemas.microsoft.com/office/drawing/2010/main" Requires="a14">
+      <mc:AlternateContent xmlns:mc="http://schemas.openxmlformats.org/markup-compatibility/2006" xmlns:a14="http://schemas.microsoft.com/office/drawing/2010/main">
+        <mc:Choice Requires="a14">
           <p:sp>
             <p:nvSpPr>
               <p:cNvPr id="3" name="Content Placeholder 2">
@@ -23640,7 +23604,7 @@
             </p:txBody>
           </p:sp>
         </mc:Choice>
-        <mc:Fallback>
+        <mc:Fallback xmlns="">
           <p:sp>
             <p:nvSpPr>
               <p:cNvPr id="3" name="Content Placeholder 2">
@@ -40543,7 +40507,7 @@
               <a:rPr lang="en-US" sz="2800" b="0" dirty="0">
                 <a:cs typeface="Arial" panose="020B0604020202020204" pitchFamily="34" charset="0"/>
               </a:rPr>
-              <a:t>Lead team that commercialized Bell Labs S, now open source R</a:t>
+              <a:t>Lead team that commercialized Bell Labs S, now open-source R</a:t>
             </a:r>
           </a:p>
           <a:p>

</xml_diff>

<commit_message>
Added intro and slide on AI policy
</commit_message>
<xml_diff>
--- a/slides/1_Introduction.pptx
+++ b/slides/1_Introduction.pptx
@@ -5,7 +5,7 @@
     <p:sldMasterId id="2147483648" r:id="rId1"/>
   </p:sldMasterIdLst>
   <p:notesMasterIdLst>
-    <p:notesMasterId r:id="rId66"/>
+    <p:notesMasterId r:id="rId67"/>
   </p:notesMasterIdLst>
   <p:sldIdLst>
     <p:sldId id="256" r:id="rId2"/>
@@ -31,47 +31,48 @@
     <p:sldId id="722" r:id="rId22"/>
     <p:sldId id="395" r:id="rId23"/>
     <p:sldId id="402" r:id="rId24"/>
-    <p:sldId id="401" r:id="rId25"/>
-    <p:sldId id="713" r:id="rId26"/>
-    <p:sldId id="387" r:id="rId27"/>
-    <p:sldId id="720" r:id="rId28"/>
-    <p:sldId id="382" r:id="rId29"/>
-    <p:sldId id="357" r:id="rId30"/>
-    <p:sldId id="385" r:id="rId31"/>
-    <p:sldId id="359" r:id="rId32"/>
-    <p:sldId id="386" r:id="rId33"/>
-    <p:sldId id="714" r:id="rId34"/>
-    <p:sldId id="360" r:id="rId35"/>
-    <p:sldId id="374" r:id="rId36"/>
-    <p:sldId id="375" r:id="rId37"/>
-    <p:sldId id="376" r:id="rId38"/>
-    <p:sldId id="377" r:id="rId39"/>
-    <p:sldId id="378" r:id="rId40"/>
-    <p:sldId id="379" r:id="rId41"/>
-    <p:sldId id="380" r:id="rId42"/>
-    <p:sldId id="715" r:id="rId43"/>
-    <p:sldId id="362" r:id="rId44"/>
-    <p:sldId id="364" r:id="rId45"/>
-    <p:sldId id="366" r:id="rId46"/>
-    <p:sldId id="365" r:id="rId47"/>
-    <p:sldId id="363" r:id="rId48"/>
-    <p:sldId id="372" r:id="rId49"/>
-    <p:sldId id="716" r:id="rId50"/>
-    <p:sldId id="361" r:id="rId51"/>
-    <p:sldId id="368" r:id="rId52"/>
-    <p:sldId id="390" r:id="rId53"/>
-    <p:sldId id="391" r:id="rId54"/>
-    <p:sldId id="392" r:id="rId55"/>
-    <p:sldId id="393" r:id="rId56"/>
-    <p:sldId id="394" r:id="rId57"/>
-    <p:sldId id="717" r:id="rId58"/>
-    <p:sldId id="371" r:id="rId59"/>
-    <p:sldId id="369" r:id="rId60"/>
-    <p:sldId id="373" r:id="rId61"/>
-    <p:sldId id="399" r:id="rId62"/>
-    <p:sldId id="370" r:id="rId63"/>
-    <p:sldId id="398" r:id="rId64"/>
-    <p:sldId id="384" r:id="rId65"/>
+    <p:sldId id="725" r:id="rId25"/>
+    <p:sldId id="401" r:id="rId26"/>
+    <p:sldId id="713" r:id="rId27"/>
+    <p:sldId id="387" r:id="rId28"/>
+    <p:sldId id="720" r:id="rId29"/>
+    <p:sldId id="382" r:id="rId30"/>
+    <p:sldId id="357" r:id="rId31"/>
+    <p:sldId id="385" r:id="rId32"/>
+    <p:sldId id="359" r:id="rId33"/>
+    <p:sldId id="386" r:id="rId34"/>
+    <p:sldId id="714" r:id="rId35"/>
+    <p:sldId id="360" r:id="rId36"/>
+    <p:sldId id="374" r:id="rId37"/>
+    <p:sldId id="375" r:id="rId38"/>
+    <p:sldId id="376" r:id="rId39"/>
+    <p:sldId id="377" r:id="rId40"/>
+    <p:sldId id="378" r:id="rId41"/>
+    <p:sldId id="379" r:id="rId42"/>
+    <p:sldId id="380" r:id="rId43"/>
+    <p:sldId id="715" r:id="rId44"/>
+    <p:sldId id="362" r:id="rId45"/>
+    <p:sldId id="364" r:id="rId46"/>
+    <p:sldId id="366" r:id="rId47"/>
+    <p:sldId id="365" r:id="rId48"/>
+    <p:sldId id="363" r:id="rId49"/>
+    <p:sldId id="372" r:id="rId50"/>
+    <p:sldId id="716" r:id="rId51"/>
+    <p:sldId id="361" r:id="rId52"/>
+    <p:sldId id="368" r:id="rId53"/>
+    <p:sldId id="390" r:id="rId54"/>
+    <p:sldId id="391" r:id="rId55"/>
+    <p:sldId id="392" r:id="rId56"/>
+    <p:sldId id="393" r:id="rId57"/>
+    <p:sldId id="394" r:id="rId58"/>
+    <p:sldId id="717" r:id="rId59"/>
+    <p:sldId id="371" r:id="rId60"/>
+    <p:sldId id="369" r:id="rId61"/>
+    <p:sldId id="373" r:id="rId62"/>
+    <p:sldId id="399" r:id="rId63"/>
+    <p:sldId id="370" r:id="rId64"/>
+    <p:sldId id="398" r:id="rId65"/>
+    <p:sldId id="384" r:id="rId66"/>
   </p:sldIdLst>
   <p:sldSz cx="12192000" cy="6858000"/>
   <p:notesSz cx="6858000" cy="9144000"/>
@@ -592,7 +593,7 @@
           <a:p>
             <a:fld id="{F33E01E3-981B-4CB5-81ED-65C622C255CB}" type="slidenum">
               <a:rPr lang="en-US" smtClean="0"/>
-              <a:t>45</a:t>
+              <a:t>46</a:t>
             </a:fld>
             <a:endParaRPr lang="en-US"/>
           </a:p>
@@ -679,7 +680,7 @@
           <a:p>
             <a:fld id="{F33E01E3-981B-4CB5-81ED-65C622C255CB}" type="slidenum">
               <a:rPr lang="en-US" smtClean="0"/>
-              <a:t>58</a:t>
+              <a:t>59</a:t>
             </a:fld>
             <a:endParaRPr lang="en-US"/>
           </a:p>
@@ -766,7 +767,7 @@
           <a:p>
             <a:fld id="{F33E01E3-981B-4CB5-81ED-65C622C255CB}" type="slidenum">
               <a:rPr lang="en-US" smtClean="0"/>
-              <a:t>59</a:t>
+              <a:t>60</a:t>
             </a:fld>
             <a:endParaRPr lang="en-US"/>
           </a:p>
@@ -853,7 +854,7 @@
           <a:p>
             <a:fld id="{F33E01E3-981B-4CB5-81ED-65C622C255CB}" type="slidenum">
               <a:rPr lang="en-US" smtClean="0"/>
-              <a:t>60</a:t>
+              <a:t>61</a:t>
             </a:fld>
             <a:endParaRPr lang="en-US"/>
           </a:p>
@@ -940,7 +941,7 @@
           <a:p>
             <a:fld id="{F33E01E3-981B-4CB5-81ED-65C622C255CB}" type="slidenum">
               <a:rPr lang="en-US" smtClean="0"/>
-              <a:t>61</a:t>
+              <a:t>62</a:t>
             </a:fld>
             <a:endParaRPr lang="en-US"/>
           </a:p>
@@ -1027,7 +1028,7 @@
           <a:p>
             <a:fld id="{F33E01E3-981B-4CB5-81ED-65C622C255CB}" type="slidenum">
               <a:rPr lang="en-US" smtClean="0"/>
-              <a:t>62</a:t>
+              <a:t>63</a:t>
             </a:fld>
             <a:endParaRPr lang="en-US"/>
           </a:p>
@@ -1114,7 +1115,7 @@
           <a:p>
             <a:fld id="{F33E01E3-981B-4CB5-81ED-65C622C255CB}" type="slidenum">
               <a:rPr lang="en-US" smtClean="0"/>
-              <a:t>63</a:t>
+              <a:t>64</a:t>
             </a:fld>
             <a:endParaRPr lang="en-US"/>
           </a:p>
@@ -12413,6 +12414,206 @@
 </file>
 
 <file path=ppt/slides/slide24.xml><?xml version="1.0" encoding="utf-8"?>
+<p:sld xmlns:a="http://schemas.openxmlformats.org/drawingml/2006/main" xmlns:r="http://schemas.openxmlformats.org/officeDocument/2006/relationships" xmlns:p="http://schemas.openxmlformats.org/presentationml/2006/main">
+  <p:cSld>
+    <p:spTree>
+      <p:nvGrpSpPr>
+        <p:cNvPr id="1" name="">
+          <a:extLst>
+            <a:ext uri="{FF2B5EF4-FFF2-40B4-BE49-F238E27FC236}">
+              <a16:creationId xmlns:a16="http://schemas.microsoft.com/office/drawing/2014/main" id="{5DA7D7DD-7AF9-FA05-2177-A254C493D02B}"/>
+            </a:ext>
+          </a:extLst>
+        </p:cNvPr>
+        <p:cNvGrpSpPr/>
+        <p:nvPr/>
+      </p:nvGrpSpPr>
+      <p:grpSpPr>
+        <a:xfrm>
+          <a:off x="0" y="0"/>
+          <a:ext cx="0" cy="0"/>
+          <a:chOff x="0" y="0"/>
+          <a:chExt cx="0" cy="0"/>
+        </a:xfrm>
+      </p:grpSpPr>
+      <p:sp>
+        <p:nvSpPr>
+          <p:cNvPr id="3" name="Content Placeholder 2">
+            <a:extLst>
+              <a:ext uri="{FF2B5EF4-FFF2-40B4-BE49-F238E27FC236}">
+                <a16:creationId xmlns:a16="http://schemas.microsoft.com/office/drawing/2014/main" id="{3AB2EEC0-807D-1936-07D1-132231394C2C}"/>
+              </a:ext>
+            </a:extLst>
+          </p:cNvPr>
+          <p:cNvSpPr>
+            <a:spLocks noGrp="1"/>
+          </p:cNvSpPr>
+          <p:nvPr>
+            <p:ph idx="1"/>
+          </p:nvPr>
+        </p:nvSpPr>
+        <p:spPr>
+          <a:xfrm>
+            <a:off x="838200" y="1126210"/>
+            <a:ext cx="10515600" cy="5563892"/>
+          </a:xfrm>
+        </p:spPr>
+        <p:txBody>
+          <a:bodyPr>
+            <a:normAutofit fontScale="92500" lnSpcReduction="10000"/>
+          </a:bodyPr>
+          <a:lstStyle/>
+          <a:p>
+            <a:pPr marL="0" indent="0">
+              <a:buNone/>
+            </a:pPr>
+            <a:r>
+              <a:rPr lang="en-US" dirty="0"/>
+              <a:t>As AI (LLMs) is becoming a standard too for professional data scientists, limited use is allowed for this course  </a:t>
+            </a:r>
+          </a:p>
+          <a:p>
+            <a:pPr lvl="0"/>
+            <a:r>
+              <a:rPr lang="en-US" b="1" dirty="0"/>
+              <a:t>Writing &amp; Analysis: </a:t>
+            </a:r>
+            <a:r>
+              <a:rPr lang="en-US" dirty="0"/>
+              <a:t>Your written reports, question responses and discussion post </a:t>
+            </a:r>
+            <a:r>
+              <a:rPr lang="en-US" b="1" dirty="0"/>
+              <a:t>must be your own original work!</a:t>
+            </a:r>
+            <a:endParaRPr lang="en-US" dirty="0"/>
+          </a:p>
+          <a:p>
+            <a:pPr lvl="0"/>
+            <a:r>
+              <a:rPr lang="en-US" b="1" dirty="0"/>
+              <a:t>Code Generation: </a:t>
+            </a:r>
+            <a:r>
+              <a:rPr lang="en-US" dirty="0"/>
+              <a:t>You may use AI to generate small, discrete portions of code. </a:t>
+            </a:r>
+          </a:p>
+          <a:p>
+            <a:pPr lvl="1"/>
+            <a:r>
+              <a:rPr lang="en-US" dirty="0"/>
+              <a:t>You may do so for up to 4 instances of up to 20 lines each in an assignment or a report</a:t>
+            </a:r>
+          </a:p>
+          <a:p>
+            <a:pPr lvl="1"/>
+            <a:r>
+              <a:rPr lang="en-US" dirty="0"/>
+              <a:t>Required: Include the exact prompt(s) used to generate the code in your submission. </a:t>
+            </a:r>
+          </a:p>
+          <a:p>
+            <a:pPr lvl="0"/>
+            <a:r>
+              <a:rPr lang="en-US" b="1" dirty="0"/>
+              <a:t>Validation of Results: </a:t>
+            </a:r>
+            <a:r>
+              <a:rPr lang="en-US" dirty="0"/>
+              <a:t>You are responsible for validating the correctness, efficiency, and security of any AI-generated code. </a:t>
+            </a:r>
+          </a:p>
+          <a:p>
+            <a:pPr lvl="0"/>
+            <a:r>
+              <a:rPr lang="en-US" b="1" dirty="0"/>
+              <a:t>Attribution &amp; Integrity:</a:t>
+            </a:r>
+            <a:r>
+              <a:rPr lang="en-US" dirty="0"/>
+              <a:t> Cite AI use per the Harvard Academic Integrity Policy (e.g., "Code generated using [Tool Name] with prompt: ‘...’")</a:t>
+            </a:r>
+          </a:p>
+          <a:p>
+            <a:pPr lvl="0"/>
+            <a:r>
+              <a:rPr lang="en-US" dirty="0"/>
+              <a:t>See course syllabus in Canvas for additional details </a:t>
+            </a:r>
+          </a:p>
+        </p:txBody>
+      </p:sp>
+      <p:sp>
+        <p:nvSpPr>
+          <p:cNvPr id="6" name="Title 1">
+            <a:extLst>
+              <a:ext uri="{FF2B5EF4-FFF2-40B4-BE49-F238E27FC236}">
+                <a16:creationId xmlns:a16="http://schemas.microsoft.com/office/drawing/2014/main" id="{79A07D1A-2593-EA96-9F4B-0D7D49DF3736}"/>
+              </a:ext>
+            </a:extLst>
+          </p:cNvPr>
+          <p:cNvSpPr txBox="1">
+            <a:spLocks/>
+          </p:cNvSpPr>
+          <p:nvPr/>
+        </p:nvSpPr>
+        <p:spPr>
+          <a:xfrm>
+            <a:off x="838200" y="-635"/>
+            <a:ext cx="10515600" cy="1325563"/>
+          </a:xfrm>
+          <a:prstGeom prst="rect">
+            <a:avLst/>
+          </a:prstGeom>
+        </p:spPr>
+        <p:txBody>
+          <a:bodyPr vert="horz" lIns="91440" tIns="45720" rIns="91440" bIns="45720" rtlCol="0" anchor="ctr">
+            <a:normAutofit/>
+          </a:bodyPr>
+          <a:lstStyle>
+            <a:lvl1pPr algn="l" defTabSz="914400" rtl="0" eaLnBrk="1" latinLnBrk="0" hangingPunct="1">
+              <a:lnSpc>
+                <a:spcPct val="90000"/>
+              </a:lnSpc>
+              <a:spcBef>
+                <a:spcPct val="0"/>
+              </a:spcBef>
+              <a:buNone/>
+              <a:defRPr sz="4400" kern="1200">
+                <a:solidFill>
+                  <a:schemeClr val="tx1"/>
+                </a:solidFill>
+                <a:latin typeface="+mj-lt"/>
+                <a:ea typeface="+mj-ea"/>
+                <a:cs typeface="+mj-cs"/>
+              </a:defRPr>
+            </a:lvl1pPr>
+          </a:lstStyle>
+          <a:p>
+            <a:r>
+              <a:rPr lang="en-US" dirty="0">
+                <a:latin typeface="+mn-lt"/>
+              </a:rPr>
+              <a:t>Using AI for this course</a:t>
+            </a:r>
+          </a:p>
+        </p:txBody>
+      </p:sp>
+    </p:spTree>
+    <p:extLst>
+      <p:ext uri="{BB962C8B-B14F-4D97-AF65-F5344CB8AC3E}">
+        <p14:creationId xmlns:p14="http://schemas.microsoft.com/office/powerpoint/2010/main" val="1849980316"/>
+      </p:ext>
+    </p:extLst>
+  </p:cSld>
+  <p:clrMapOvr>
+    <a:masterClrMapping/>
+  </p:clrMapOvr>
+</p:sld>
+</file>
+
+<file path=ppt/slides/slide25.xml><?xml version="1.0" encoding="utf-8"?>
 <p:sld xmlns:a="http://schemas.openxmlformats.org/drawingml/2006/main" xmlns:r="http://schemas.openxmlformats.org/officeDocument/2006/relationships" xmlns:p="http://schemas.openxmlformats.org/presentationml/2006/main" show="0">
   <p:cSld>
     <p:spTree>
@@ -12591,7 +12792,7 @@
 </p:sld>
 </file>
 
-<file path=ppt/slides/slide25.xml><?xml version="1.0" encoding="utf-8"?>
+<file path=ppt/slides/slide26.xml><?xml version="1.0" encoding="utf-8"?>
 <p:sld xmlns:a="http://schemas.openxmlformats.org/drawingml/2006/main" xmlns:r="http://schemas.openxmlformats.org/officeDocument/2006/relationships" xmlns:p="http://schemas.openxmlformats.org/presentationml/2006/main">
   <p:cSld>
     <p:spTree>
@@ -12651,7 +12852,7 @@
 </p:sld>
 </file>
 
-<file path=ppt/slides/slide26.xml><?xml version="1.0" encoding="utf-8"?>
+<file path=ppt/slides/slide27.xml><?xml version="1.0" encoding="utf-8"?>
 <p:sld xmlns:a="http://schemas.openxmlformats.org/drawingml/2006/main" xmlns:r="http://schemas.openxmlformats.org/officeDocument/2006/relationships" xmlns:p="http://schemas.openxmlformats.org/presentationml/2006/main">
   <p:cSld>
     <p:spTree>
@@ -13213,7 +13414,7 @@
 </p:sld>
 </file>
 
-<file path=ppt/slides/slide27.xml><?xml version="1.0" encoding="utf-8"?>
+<file path=ppt/slides/slide28.xml><?xml version="1.0" encoding="utf-8"?>
 <p:sld xmlns:a="http://schemas.openxmlformats.org/drawingml/2006/main" xmlns:r="http://schemas.openxmlformats.org/officeDocument/2006/relationships" xmlns:p="http://schemas.openxmlformats.org/presentationml/2006/main">
   <p:cSld>
     <p:spTree>
@@ -13273,7 +13474,7 @@
 </p:sld>
 </file>
 
-<file path=ppt/slides/slide28.xml><?xml version="1.0" encoding="utf-8"?>
+<file path=ppt/slides/slide29.xml><?xml version="1.0" encoding="utf-8"?>
 <p:sld xmlns:a="http://schemas.openxmlformats.org/drawingml/2006/main" xmlns:r="http://schemas.openxmlformats.org/officeDocument/2006/relationships" xmlns:p="http://schemas.openxmlformats.org/presentationml/2006/main">
   <p:cSld>
     <p:spTree>
@@ -13974,621 +14175,6 @@
 </p:sld>
 </file>
 
-<file path=ppt/slides/slide29.xml><?xml version="1.0" encoding="utf-8"?>
-<p:sld xmlns:a="http://schemas.openxmlformats.org/drawingml/2006/main" xmlns:r="http://schemas.openxmlformats.org/officeDocument/2006/relationships" xmlns:p="http://schemas.openxmlformats.org/presentationml/2006/main">
-  <p:cSld>
-    <p:spTree>
-      <p:nvGrpSpPr>
-        <p:cNvPr id="1" name=""/>
-        <p:cNvGrpSpPr/>
-        <p:nvPr/>
-      </p:nvGrpSpPr>
-      <p:grpSpPr>
-        <a:xfrm>
-          <a:off x="0" y="0"/>
-          <a:ext cx="0" cy="0"/>
-          <a:chOff x="0" y="0"/>
-          <a:chExt cx="0" cy="0"/>
-        </a:xfrm>
-      </p:grpSpPr>
-      <mc:AlternateContent xmlns:mc="http://schemas.openxmlformats.org/markup-compatibility/2006" xmlns:a14="http://schemas.microsoft.com/office/drawing/2010/main">
-        <mc:Choice Requires="a14">
-          <p:sp>
-            <p:nvSpPr>
-              <p:cNvPr id="3" name="Content Placeholder 2">
-                <a:extLst>
-                  <a:ext uri="{FF2B5EF4-FFF2-40B4-BE49-F238E27FC236}">
-                    <a16:creationId xmlns:a16="http://schemas.microsoft.com/office/drawing/2014/main" id="{258E6AF3-7615-4BD1-878E-A94C93E98F90}"/>
-                  </a:ext>
-                </a:extLst>
-              </p:cNvPr>
-              <p:cNvSpPr>
-                <a:spLocks noGrp="1"/>
-              </p:cNvSpPr>
-              <p:nvPr>
-                <p:ph idx="1"/>
-              </p:nvPr>
-            </p:nvSpPr>
-            <p:spPr>
-              <a:xfrm>
-                <a:off x="838200" y="1541417"/>
-                <a:ext cx="10515600" cy="4635546"/>
-              </a:xfrm>
-            </p:spPr>
-            <p:txBody>
-              <a:bodyPr>
-                <a:normAutofit/>
-              </a:bodyPr>
-              <a:lstStyle/>
-              <a:p>
-                <a:pPr marL="0" indent="0">
-                  <a:buNone/>
-                </a:pPr>
-                <a:r>
-                  <a:rPr lang="en-US" b="1" dirty="0"/>
-                  <a:t>Key-value indexing </a:t>
-                </a:r>
-                <a:r>
-                  <a:rPr lang="en-US" dirty="0"/>
-                  <a:t>used to manage massive quantities of data   </a:t>
-                </a:r>
-              </a:p>
-              <a:p>
-                <a:r>
-                  <a:rPr lang="en-US" dirty="0"/>
-                  <a:t>Address values, </a:t>
-                </a:r>
-                <a14:m>
-                  <m:oMath xmlns:m="http://schemas.openxmlformats.org/officeDocument/2006/math">
-                    <m:r>
-                      <a:rPr lang="en-US" b="0" i="1" smtClean="0">
-                        <a:latin typeface="Cambria Math" panose="02040503050406030204" pitchFamily="18" charset="0"/>
-                      </a:rPr>
-                      <m:t>𝑉</m:t>
-                    </m:r>
-                  </m:oMath>
-                </a14:m>
-                <a:r>
-                  <a:rPr lang="en-US" dirty="0"/>
-                  <a:t>, by key, </a:t>
-                </a:r>
-                <a14:m>
-                  <m:oMath xmlns:m="http://schemas.openxmlformats.org/officeDocument/2006/math">
-                    <m:r>
-                      <a:rPr lang="en-US" b="0" i="1" smtClean="0">
-                        <a:latin typeface="Cambria Math" panose="02040503050406030204" pitchFamily="18" charset="0"/>
-                      </a:rPr>
-                      <m:t>𝐾</m:t>
-                    </m:r>
-                  </m:oMath>
-                </a14:m>
-                <a:r>
-                  <a:rPr lang="en-US" dirty="0"/>
-                  <a:t>, as a tuple </a:t>
-                </a:r>
-                <a14:m>
-                  <m:oMath xmlns:m="http://schemas.openxmlformats.org/officeDocument/2006/math">
-                    <m:r>
-                      <a:rPr lang="en-US" b="0" i="1" smtClean="0">
-                        <a:latin typeface="Cambria Math" panose="02040503050406030204" pitchFamily="18" charset="0"/>
-                      </a:rPr>
-                      <m:t>(</m:t>
-                    </m:r>
-                    <m:r>
-                      <a:rPr lang="en-US" b="0" i="1" smtClean="0">
-                        <a:latin typeface="Cambria Math" panose="02040503050406030204" pitchFamily="18" charset="0"/>
-                      </a:rPr>
-                      <m:t>𝐾</m:t>
-                    </m:r>
-                    <m:r>
-                      <a:rPr lang="en-US" b="0" i="1" smtClean="0">
-                        <a:latin typeface="Cambria Math" panose="02040503050406030204" pitchFamily="18" charset="0"/>
-                      </a:rPr>
-                      <m:t>,</m:t>
-                    </m:r>
-                    <m:r>
-                      <a:rPr lang="en-US" b="0" i="1" smtClean="0">
-                        <a:latin typeface="Cambria Math" panose="02040503050406030204" pitchFamily="18" charset="0"/>
-                      </a:rPr>
-                      <m:t>𝑉</m:t>
-                    </m:r>
-                    <m:r>
-                      <a:rPr lang="en-US" b="0" i="1" smtClean="0">
-                        <a:latin typeface="Cambria Math" panose="02040503050406030204" pitchFamily="18" charset="0"/>
-                      </a:rPr>
-                      <m:t>)</m:t>
-                    </m:r>
-                  </m:oMath>
-                </a14:m>
-                <a:r>
-                  <a:rPr lang="en-US" dirty="0"/>
-                  <a:t>  </a:t>
-                </a:r>
-              </a:p>
-              <a:p>
-                <a:r>
-                  <a:rPr lang="en-US" dirty="0"/>
-                  <a:t>Example: In-memory </a:t>
-                </a:r>
-                <a:r>
-                  <a:rPr lang="en-US" b="1" dirty="0"/>
-                  <a:t>dictionaries</a:t>
-                </a:r>
-              </a:p>
-              <a:p>
-                <a:pPr lvl="1"/>
-                <a:r>
-                  <a:rPr lang="en-US" dirty="0"/>
-                  <a:t>Fast lookup</a:t>
-                </a:r>
-              </a:p>
-              <a:p>
-                <a:pPr lvl="1"/>
-                <a:r>
-                  <a:rPr lang="en-US" dirty="0"/>
-                  <a:t>Size limited by main memory</a:t>
-                </a:r>
-              </a:p>
-              <a:p>
-                <a:pPr lvl="1"/>
-                <a:r>
-                  <a:rPr lang="en-US" dirty="0"/>
-                  <a:t>Supported in Python and many other languages</a:t>
-                </a:r>
-              </a:p>
-              <a:p>
-                <a:r>
-                  <a:rPr lang="en-US" dirty="0"/>
-                  <a:t>NoSQL data bases – scalable object storage   </a:t>
-                </a:r>
-              </a:p>
-              <a:p>
-                <a:r>
-                  <a:rPr lang="en-US" dirty="0"/>
-                  <a:t>Map-reduce, scalable parallel processing – Next lesson</a:t>
-                </a:r>
-              </a:p>
-              <a:p>
-                <a:endParaRPr lang="en-US" dirty="0"/>
-              </a:p>
-              <a:p>
-                <a:endParaRPr lang="en-US" b="1" dirty="0"/>
-              </a:p>
-            </p:txBody>
-          </p:sp>
-        </mc:Choice>
-        <mc:Fallback xmlns="">
-          <p:sp>
-            <p:nvSpPr>
-              <p:cNvPr id="3" name="Content Placeholder 2">
-                <a:extLst>
-                  <a:ext uri="{FF2B5EF4-FFF2-40B4-BE49-F238E27FC236}">
-                    <a16:creationId xmlns:a16="http://schemas.microsoft.com/office/drawing/2014/main" id="{258E6AF3-7615-4BD1-878E-A94C93E98F90}"/>
-                  </a:ext>
-                </a:extLst>
-              </p:cNvPr>
-              <p:cNvSpPr>
-                <a:spLocks noGrp="1" noRot="1" noChangeAspect="1" noMove="1" noResize="1" noEditPoints="1" noAdjustHandles="1" noChangeArrowheads="1" noChangeShapeType="1" noTextEdit="1"/>
-              </p:cNvSpPr>
-              <p:nvPr>
-                <p:ph idx="1"/>
-              </p:nvPr>
-            </p:nvSpPr>
-            <p:spPr>
-              <a:xfrm>
-                <a:off x="838200" y="1541417"/>
-                <a:ext cx="10515600" cy="4635546"/>
-              </a:xfrm>
-              <a:blipFill>
-                <a:blip r:embed="rId2"/>
-                <a:stretch>
-                  <a:fillRect l="-1217" t="-2237"/>
-                </a:stretch>
-              </a:blipFill>
-            </p:spPr>
-            <p:txBody>
-              <a:bodyPr/>
-              <a:lstStyle/>
-              <a:p>
-                <a:r>
-                  <a:rPr lang="en-US">
-                    <a:noFill/>
-                  </a:rPr>
-                  <a:t> </a:t>
-                </a:r>
-              </a:p>
-            </p:txBody>
-          </p:sp>
-        </mc:Fallback>
-      </mc:AlternateContent>
-      <p:sp>
-        <p:nvSpPr>
-          <p:cNvPr id="6" name="Title 1">
-            <a:extLst>
-              <a:ext uri="{FF2B5EF4-FFF2-40B4-BE49-F238E27FC236}">
-                <a16:creationId xmlns:a16="http://schemas.microsoft.com/office/drawing/2014/main" id="{CD29F70F-B868-451B-A65D-8721F4C7A2D9}"/>
-              </a:ext>
-            </a:extLst>
-          </p:cNvPr>
-          <p:cNvSpPr txBox="1">
-            <a:spLocks/>
-          </p:cNvSpPr>
-          <p:nvPr/>
-        </p:nvSpPr>
-        <p:spPr>
-          <a:xfrm>
-            <a:off x="838200" y="-635"/>
-            <a:ext cx="10515600" cy="1325563"/>
-          </a:xfrm>
-          <a:prstGeom prst="rect">
-            <a:avLst/>
-          </a:prstGeom>
-        </p:spPr>
-        <p:txBody>
-          <a:bodyPr vert="horz" lIns="91440" tIns="45720" rIns="91440" bIns="45720" rtlCol="0" anchor="ctr">
-            <a:normAutofit/>
-          </a:bodyPr>
-          <a:lstStyle>
-            <a:lvl1pPr algn="l" defTabSz="914400" rtl="0" eaLnBrk="1" latinLnBrk="0" hangingPunct="1">
-              <a:lnSpc>
-                <a:spcPct val="90000"/>
-              </a:lnSpc>
-              <a:spcBef>
-                <a:spcPct val="0"/>
-              </a:spcBef>
-              <a:buNone/>
-              <a:defRPr sz="4400" kern="1200">
-                <a:solidFill>
-                  <a:schemeClr val="tx1"/>
-                </a:solidFill>
-                <a:latin typeface="+mj-lt"/>
-                <a:ea typeface="+mj-ea"/>
-                <a:cs typeface="+mj-cs"/>
-              </a:defRPr>
-            </a:lvl1pPr>
-          </a:lstStyle>
-          <a:p>
-            <a:r>
-              <a:rPr lang="en-US" dirty="0">
-                <a:latin typeface="+mn-lt"/>
-              </a:rPr>
-              <a:t>Introduction to key-value indexing</a:t>
-            </a:r>
-          </a:p>
-        </p:txBody>
-      </p:sp>
-    </p:spTree>
-    <p:extLst>
-      <p:ext uri="{BB962C8B-B14F-4D97-AF65-F5344CB8AC3E}">
-        <p14:creationId xmlns:p14="http://schemas.microsoft.com/office/powerpoint/2010/main" val="1970960301"/>
-      </p:ext>
-    </p:extLst>
-  </p:cSld>
-  <p:clrMapOvr>
-    <a:masterClrMapping/>
-  </p:clrMapOvr>
-  <p:timing>
-    <p:tnLst>
-      <p:par>
-        <p:cTn id="1" dur="indefinite" restart="never" nodeType="tmRoot">
-          <p:childTnLst>
-            <p:seq concurrent="1" nextAc="seek">
-              <p:cTn id="2" dur="indefinite" nodeType="mainSeq">
-                <p:childTnLst>
-                  <p:par>
-                    <p:cTn id="3" fill="hold">
-                      <p:stCondLst>
-                        <p:cond delay="indefinite"/>
-                      </p:stCondLst>
-                      <p:childTnLst>
-                        <p:par>
-                          <p:cTn id="4" fill="hold">
-                            <p:stCondLst>
-                              <p:cond delay="0"/>
-                            </p:stCondLst>
-                            <p:childTnLst>
-                              <p:par>
-                                <p:cTn id="5" presetID="1" presetClass="entr" presetSubtype="0" fill="hold" nodeType="clickEffect">
-                                  <p:stCondLst>
-                                    <p:cond delay="0"/>
-                                  </p:stCondLst>
-                                  <p:childTnLst>
-                                    <p:set>
-                                      <p:cBhvr>
-                                        <p:cTn id="6" dur="1" fill="hold">
-                                          <p:stCondLst>
-                                            <p:cond delay="0"/>
-                                          </p:stCondLst>
-                                        </p:cTn>
-                                        <p:tgtEl>
-                                          <p:spTgt spid="3">
-                                            <p:txEl>
-                                              <p:pRg st="1" end="1"/>
-                                            </p:txEl>
-                                          </p:spTgt>
-                                        </p:tgtEl>
-                                        <p:attrNameLst>
-                                          <p:attrName>style.visibility</p:attrName>
-                                        </p:attrNameLst>
-                                      </p:cBhvr>
-                                      <p:to>
-                                        <p:strVal val="visible"/>
-                                      </p:to>
-                                    </p:set>
-                                  </p:childTnLst>
-                                </p:cTn>
-                              </p:par>
-                            </p:childTnLst>
-                          </p:cTn>
-                        </p:par>
-                      </p:childTnLst>
-                    </p:cTn>
-                  </p:par>
-                  <p:par>
-                    <p:cTn id="7" fill="hold">
-                      <p:stCondLst>
-                        <p:cond delay="indefinite"/>
-                      </p:stCondLst>
-                      <p:childTnLst>
-                        <p:par>
-                          <p:cTn id="8" fill="hold">
-                            <p:stCondLst>
-                              <p:cond delay="0"/>
-                            </p:stCondLst>
-                            <p:childTnLst>
-                              <p:par>
-                                <p:cTn id="9" presetID="1" presetClass="entr" presetSubtype="0" fill="hold" nodeType="clickEffect">
-                                  <p:stCondLst>
-                                    <p:cond delay="0"/>
-                                  </p:stCondLst>
-                                  <p:childTnLst>
-                                    <p:set>
-                                      <p:cBhvr>
-                                        <p:cTn id="10" dur="1" fill="hold">
-                                          <p:stCondLst>
-                                            <p:cond delay="0"/>
-                                          </p:stCondLst>
-                                        </p:cTn>
-                                        <p:tgtEl>
-                                          <p:spTgt spid="3">
-                                            <p:txEl>
-                                              <p:pRg st="2" end="2"/>
-                                            </p:txEl>
-                                          </p:spTgt>
-                                        </p:tgtEl>
-                                        <p:attrNameLst>
-                                          <p:attrName>style.visibility</p:attrName>
-                                        </p:attrNameLst>
-                                      </p:cBhvr>
-                                      <p:to>
-                                        <p:strVal val="visible"/>
-                                      </p:to>
-                                    </p:set>
-                                  </p:childTnLst>
-                                </p:cTn>
-                              </p:par>
-                              <p:par>
-                                <p:cTn id="11" presetID="1" presetClass="entr" presetSubtype="0" fill="hold" nodeType="withEffect">
-                                  <p:stCondLst>
-                                    <p:cond delay="0"/>
-                                  </p:stCondLst>
-                                  <p:childTnLst>
-                                    <p:set>
-                                      <p:cBhvr>
-                                        <p:cTn id="12" dur="1" fill="hold">
-                                          <p:stCondLst>
-                                            <p:cond delay="0"/>
-                                          </p:stCondLst>
-                                        </p:cTn>
-                                        <p:tgtEl>
-                                          <p:spTgt spid="3">
-                                            <p:txEl>
-                                              <p:pRg st="3" end="3"/>
-                                            </p:txEl>
-                                          </p:spTgt>
-                                        </p:tgtEl>
-                                        <p:attrNameLst>
-                                          <p:attrName>style.visibility</p:attrName>
-                                        </p:attrNameLst>
-                                      </p:cBhvr>
-                                      <p:to>
-                                        <p:strVal val="visible"/>
-                                      </p:to>
-                                    </p:set>
-                                  </p:childTnLst>
-                                </p:cTn>
-                              </p:par>
-                              <p:par>
-                                <p:cTn id="13" presetID="1" presetClass="entr" presetSubtype="0" fill="hold" nodeType="withEffect">
-                                  <p:stCondLst>
-                                    <p:cond delay="0"/>
-                                  </p:stCondLst>
-                                  <p:childTnLst>
-                                    <p:set>
-                                      <p:cBhvr>
-                                        <p:cTn id="14" dur="1" fill="hold">
-                                          <p:stCondLst>
-                                            <p:cond delay="0"/>
-                                          </p:stCondLst>
-                                        </p:cTn>
-                                        <p:tgtEl>
-                                          <p:spTgt spid="3">
-                                            <p:txEl>
-                                              <p:pRg st="4" end="4"/>
-                                            </p:txEl>
-                                          </p:spTgt>
-                                        </p:tgtEl>
-                                        <p:attrNameLst>
-                                          <p:attrName>style.visibility</p:attrName>
-                                        </p:attrNameLst>
-                                      </p:cBhvr>
-                                      <p:to>
-                                        <p:strVal val="visible"/>
-                                      </p:to>
-                                    </p:set>
-                                  </p:childTnLst>
-                                </p:cTn>
-                              </p:par>
-                              <p:par>
-                                <p:cTn id="15" presetID="1" presetClass="entr" presetSubtype="0" fill="hold" nodeType="withEffect">
-                                  <p:stCondLst>
-                                    <p:cond delay="0"/>
-                                  </p:stCondLst>
-                                  <p:childTnLst>
-                                    <p:set>
-                                      <p:cBhvr>
-                                        <p:cTn id="16" dur="1" fill="hold">
-                                          <p:stCondLst>
-                                            <p:cond delay="0"/>
-                                          </p:stCondLst>
-                                        </p:cTn>
-                                        <p:tgtEl>
-                                          <p:spTgt spid="3">
-                                            <p:txEl>
-                                              <p:pRg st="5" end="5"/>
-                                            </p:txEl>
-                                          </p:spTgt>
-                                        </p:tgtEl>
-                                        <p:attrNameLst>
-                                          <p:attrName>style.visibility</p:attrName>
-                                        </p:attrNameLst>
-                                      </p:cBhvr>
-                                      <p:to>
-                                        <p:strVal val="visible"/>
-                                      </p:to>
-                                    </p:set>
-                                  </p:childTnLst>
-                                </p:cTn>
-                              </p:par>
-                            </p:childTnLst>
-                          </p:cTn>
-                        </p:par>
-                      </p:childTnLst>
-                    </p:cTn>
-                  </p:par>
-                  <p:par>
-                    <p:cTn id="17" fill="hold">
-                      <p:stCondLst>
-                        <p:cond delay="indefinite"/>
-                      </p:stCondLst>
-                      <p:childTnLst>
-                        <p:par>
-                          <p:cTn id="18" fill="hold">
-                            <p:stCondLst>
-                              <p:cond delay="0"/>
-                            </p:stCondLst>
-                            <p:childTnLst>
-                              <p:par>
-                                <p:cTn id="19" presetID="1" presetClass="entr" presetSubtype="0" fill="hold" nodeType="clickEffect">
-                                  <p:stCondLst>
-                                    <p:cond delay="0"/>
-                                  </p:stCondLst>
-                                  <p:childTnLst>
-                                    <p:set>
-                                      <p:cBhvr>
-                                        <p:cTn id="20" dur="1" fill="hold">
-                                          <p:stCondLst>
-                                            <p:cond delay="0"/>
-                                          </p:stCondLst>
-                                        </p:cTn>
-                                        <p:tgtEl>
-                                          <p:spTgt spid="3">
-                                            <p:txEl>
-                                              <p:pRg st="6" end="6"/>
-                                            </p:txEl>
-                                          </p:spTgt>
-                                        </p:tgtEl>
-                                        <p:attrNameLst>
-                                          <p:attrName>style.visibility</p:attrName>
-                                        </p:attrNameLst>
-                                      </p:cBhvr>
-                                      <p:to>
-                                        <p:strVal val="visible"/>
-                                      </p:to>
-                                    </p:set>
-                                  </p:childTnLst>
-                                </p:cTn>
-                              </p:par>
-                            </p:childTnLst>
-                          </p:cTn>
-                        </p:par>
-                      </p:childTnLst>
-                    </p:cTn>
-                  </p:par>
-                  <p:par>
-                    <p:cTn id="21" fill="hold">
-                      <p:stCondLst>
-                        <p:cond delay="indefinite"/>
-                      </p:stCondLst>
-                      <p:childTnLst>
-                        <p:par>
-                          <p:cTn id="22" fill="hold">
-                            <p:stCondLst>
-                              <p:cond delay="0"/>
-                            </p:stCondLst>
-                            <p:childTnLst>
-                              <p:par>
-                                <p:cTn id="23" presetID="1" presetClass="entr" presetSubtype="0" fill="hold" nodeType="clickEffect">
-                                  <p:stCondLst>
-                                    <p:cond delay="0"/>
-                                  </p:stCondLst>
-                                  <p:childTnLst>
-                                    <p:set>
-                                      <p:cBhvr>
-                                        <p:cTn id="24" dur="1" fill="hold">
-                                          <p:stCondLst>
-                                            <p:cond delay="0"/>
-                                          </p:stCondLst>
-                                        </p:cTn>
-                                        <p:tgtEl>
-                                          <p:spTgt spid="3">
-                                            <p:txEl>
-                                              <p:pRg st="7" end="7"/>
-                                            </p:txEl>
-                                          </p:spTgt>
-                                        </p:tgtEl>
-                                        <p:attrNameLst>
-                                          <p:attrName>style.visibility</p:attrName>
-                                        </p:attrNameLst>
-                                      </p:cBhvr>
-                                      <p:to>
-                                        <p:strVal val="visible"/>
-                                      </p:to>
-                                    </p:set>
-                                  </p:childTnLst>
-                                </p:cTn>
-                              </p:par>
-                            </p:childTnLst>
-                          </p:cTn>
-                        </p:par>
-                      </p:childTnLst>
-                    </p:cTn>
-                  </p:par>
-                </p:childTnLst>
-              </p:cTn>
-              <p:prevCondLst>
-                <p:cond evt="onPrev" delay="0">
-                  <p:tgtEl>
-                    <p:sldTgt/>
-                  </p:tgtEl>
-                </p:cond>
-              </p:prevCondLst>
-              <p:nextCondLst>
-                <p:cond evt="onNext" delay="0">
-                  <p:tgtEl>
-                    <p:sldTgt/>
-                  </p:tgtEl>
-                </p:cond>
-              </p:nextCondLst>
-            </p:seq>
-          </p:childTnLst>
-        </p:cTn>
-      </p:par>
-    </p:tnLst>
-  </p:timing>
-</p:sld>
-</file>
-
 <file path=ppt/slides/slide3.xml><?xml version="1.0" encoding="utf-8"?>
 <p:sld xmlns:a="http://schemas.openxmlformats.org/drawingml/2006/main" xmlns:r="http://schemas.openxmlformats.org/officeDocument/2006/relationships" xmlns:p="http://schemas.openxmlformats.org/presentationml/2006/main">
   <p:cSld>
@@ -15108,6 +14694,621 @@
           <a:chExt cx="0" cy="0"/>
         </a:xfrm>
       </p:grpSpPr>
+      <mc:AlternateContent xmlns:mc="http://schemas.openxmlformats.org/markup-compatibility/2006" xmlns:a14="http://schemas.microsoft.com/office/drawing/2010/main">
+        <mc:Choice Requires="a14">
+          <p:sp>
+            <p:nvSpPr>
+              <p:cNvPr id="3" name="Content Placeholder 2">
+                <a:extLst>
+                  <a:ext uri="{FF2B5EF4-FFF2-40B4-BE49-F238E27FC236}">
+                    <a16:creationId xmlns:a16="http://schemas.microsoft.com/office/drawing/2014/main" id="{258E6AF3-7615-4BD1-878E-A94C93E98F90}"/>
+                  </a:ext>
+                </a:extLst>
+              </p:cNvPr>
+              <p:cNvSpPr>
+                <a:spLocks noGrp="1"/>
+              </p:cNvSpPr>
+              <p:nvPr>
+                <p:ph idx="1"/>
+              </p:nvPr>
+            </p:nvSpPr>
+            <p:spPr>
+              <a:xfrm>
+                <a:off x="838200" y="1541417"/>
+                <a:ext cx="10515600" cy="4635546"/>
+              </a:xfrm>
+            </p:spPr>
+            <p:txBody>
+              <a:bodyPr>
+                <a:normAutofit/>
+              </a:bodyPr>
+              <a:lstStyle/>
+              <a:p>
+                <a:pPr marL="0" indent="0">
+                  <a:buNone/>
+                </a:pPr>
+                <a:r>
+                  <a:rPr lang="en-US" b="1" dirty="0"/>
+                  <a:t>Key-value indexing </a:t>
+                </a:r>
+                <a:r>
+                  <a:rPr lang="en-US" dirty="0"/>
+                  <a:t>used to manage massive quantities of data   </a:t>
+                </a:r>
+              </a:p>
+              <a:p>
+                <a:r>
+                  <a:rPr lang="en-US" dirty="0"/>
+                  <a:t>Address values, </a:t>
+                </a:r>
+                <a14:m>
+                  <m:oMath xmlns:m="http://schemas.openxmlformats.org/officeDocument/2006/math">
+                    <m:r>
+                      <a:rPr lang="en-US" b="0" i="1" smtClean="0">
+                        <a:latin typeface="Cambria Math" panose="02040503050406030204" pitchFamily="18" charset="0"/>
+                      </a:rPr>
+                      <m:t>𝑉</m:t>
+                    </m:r>
+                  </m:oMath>
+                </a14:m>
+                <a:r>
+                  <a:rPr lang="en-US" dirty="0"/>
+                  <a:t>, by key, </a:t>
+                </a:r>
+                <a14:m>
+                  <m:oMath xmlns:m="http://schemas.openxmlformats.org/officeDocument/2006/math">
+                    <m:r>
+                      <a:rPr lang="en-US" b="0" i="1" smtClean="0">
+                        <a:latin typeface="Cambria Math" panose="02040503050406030204" pitchFamily="18" charset="0"/>
+                      </a:rPr>
+                      <m:t>𝐾</m:t>
+                    </m:r>
+                  </m:oMath>
+                </a14:m>
+                <a:r>
+                  <a:rPr lang="en-US" dirty="0"/>
+                  <a:t>, as a tuple </a:t>
+                </a:r>
+                <a14:m>
+                  <m:oMath xmlns:m="http://schemas.openxmlformats.org/officeDocument/2006/math">
+                    <m:r>
+                      <a:rPr lang="en-US" b="0" i="1" smtClean="0">
+                        <a:latin typeface="Cambria Math" panose="02040503050406030204" pitchFamily="18" charset="0"/>
+                      </a:rPr>
+                      <m:t>(</m:t>
+                    </m:r>
+                    <m:r>
+                      <a:rPr lang="en-US" b="0" i="1" smtClean="0">
+                        <a:latin typeface="Cambria Math" panose="02040503050406030204" pitchFamily="18" charset="0"/>
+                      </a:rPr>
+                      <m:t>𝐾</m:t>
+                    </m:r>
+                    <m:r>
+                      <a:rPr lang="en-US" b="0" i="1" smtClean="0">
+                        <a:latin typeface="Cambria Math" panose="02040503050406030204" pitchFamily="18" charset="0"/>
+                      </a:rPr>
+                      <m:t>,</m:t>
+                    </m:r>
+                    <m:r>
+                      <a:rPr lang="en-US" b="0" i="1" smtClean="0">
+                        <a:latin typeface="Cambria Math" panose="02040503050406030204" pitchFamily="18" charset="0"/>
+                      </a:rPr>
+                      <m:t>𝑉</m:t>
+                    </m:r>
+                    <m:r>
+                      <a:rPr lang="en-US" b="0" i="1" smtClean="0">
+                        <a:latin typeface="Cambria Math" panose="02040503050406030204" pitchFamily="18" charset="0"/>
+                      </a:rPr>
+                      <m:t>)</m:t>
+                    </m:r>
+                  </m:oMath>
+                </a14:m>
+                <a:r>
+                  <a:rPr lang="en-US" dirty="0"/>
+                  <a:t>  </a:t>
+                </a:r>
+              </a:p>
+              <a:p>
+                <a:r>
+                  <a:rPr lang="en-US" dirty="0"/>
+                  <a:t>Example: In-memory </a:t>
+                </a:r>
+                <a:r>
+                  <a:rPr lang="en-US" b="1" dirty="0"/>
+                  <a:t>dictionaries</a:t>
+                </a:r>
+              </a:p>
+              <a:p>
+                <a:pPr lvl="1"/>
+                <a:r>
+                  <a:rPr lang="en-US" dirty="0"/>
+                  <a:t>Fast lookup</a:t>
+                </a:r>
+              </a:p>
+              <a:p>
+                <a:pPr lvl="1"/>
+                <a:r>
+                  <a:rPr lang="en-US" dirty="0"/>
+                  <a:t>Size limited by main memory</a:t>
+                </a:r>
+              </a:p>
+              <a:p>
+                <a:pPr lvl="1"/>
+                <a:r>
+                  <a:rPr lang="en-US" dirty="0"/>
+                  <a:t>Supported in Python and many other languages</a:t>
+                </a:r>
+              </a:p>
+              <a:p>
+                <a:r>
+                  <a:rPr lang="en-US" dirty="0"/>
+                  <a:t>NoSQL data bases – scalable object storage   </a:t>
+                </a:r>
+              </a:p>
+              <a:p>
+                <a:r>
+                  <a:rPr lang="en-US" dirty="0"/>
+                  <a:t>Map-reduce, scalable parallel processing – Next lesson</a:t>
+                </a:r>
+              </a:p>
+              <a:p>
+                <a:endParaRPr lang="en-US" dirty="0"/>
+              </a:p>
+              <a:p>
+                <a:endParaRPr lang="en-US" b="1" dirty="0"/>
+              </a:p>
+            </p:txBody>
+          </p:sp>
+        </mc:Choice>
+        <mc:Fallback xmlns="">
+          <p:sp>
+            <p:nvSpPr>
+              <p:cNvPr id="3" name="Content Placeholder 2">
+                <a:extLst>
+                  <a:ext uri="{FF2B5EF4-FFF2-40B4-BE49-F238E27FC236}">
+                    <a16:creationId xmlns:a16="http://schemas.microsoft.com/office/drawing/2014/main" id="{258E6AF3-7615-4BD1-878E-A94C93E98F90}"/>
+                  </a:ext>
+                </a:extLst>
+              </p:cNvPr>
+              <p:cNvSpPr>
+                <a:spLocks noGrp="1" noRot="1" noChangeAspect="1" noMove="1" noResize="1" noEditPoints="1" noAdjustHandles="1" noChangeArrowheads="1" noChangeShapeType="1" noTextEdit="1"/>
+              </p:cNvSpPr>
+              <p:nvPr>
+                <p:ph idx="1"/>
+              </p:nvPr>
+            </p:nvSpPr>
+            <p:spPr>
+              <a:xfrm>
+                <a:off x="838200" y="1541417"/>
+                <a:ext cx="10515600" cy="4635546"/>
+              </a:xfrm>
+              <a:blipFill>
+                <a:blip r:embed="rId2"/>
+                <a:stretch>
+                  <a:fillRect l="-1217" t="-2237"/>
+                </a:stretch>
+              </a:blipFill>
+            </p:spPr>
+            <p:txBody>
+              <a:bodyPr/>
+              <a:lstStyle/>
+              <a:p>
+                <a:r>
+                  <a:rPr lang="en-US">
+                    <a:noFill/>
+                  </a:rPr>
+                  <a:t> </a:t>
+                </a:r>
+              </a:p>
+            </p:txBody>
+          </p:sp>
+        </mc:Fallback>
+      </mc:AlternateContent>
+      <p:sp>
+        <p:nvSpPr>
+          <p:cNvPr id="6" name="Title 1">
+            <a:extLst>
+              <a:ext uri="{FF2B5EF4-FFF2-40B4-BE49-F238E27FC236}">
+                <a16:creationId xmlns:a16="http://schemas.microsoft.com/office/drawing/2014/main" id="{CD29F70F-B868-451B-A65D-8721F4C7A2D9}"/>
+              </a:ext>
+            </a:extLst>
+          </p:cNvPr>
+          <p:cNvSpPr txBox="1">
+            <a:spLocks/>
+          </p:cNvSpPr>
+          <p:nvPr/>
+        </p:nvSpPr>
+        <p:spPr>
+          <a:xfrm>
+            <a:off x="838200" y="-635"/>
+            <a:ext cx="10515600" cy="1325563"/>
+          </a:xfrm>
+          <a:prstGeom prst="rect">
+            <a:avLst/>
+          </a:prstGeom>
+        </p:spPr>
+        <p:txBody>
+          <a:bodyPr vert="horz" lIns="91440" tIns="45720" rIns="91440" bIns="45720" rtlCol="0" anchor="ctr">
+            <a:normAutofit/>
+          </a:bodyPr>
+          <a:lstStyle>
+            <a:lvl1pPr algn="l" defTabSz="914400" rtl="0" eaLnBrk="1" latinLnBrk="0" hangingPunct="1">
+              <a:lnSpc>
+                <a:spcPct val="90000"/>
+              </a:lnSpc>
+              <a:spcBef>
+                <a:spcPct val="0"/>
+              </a:spcBef>
+              <a:buNone/>
+              <a:defRPr sz="4400" kern="1200">
+                <a:solidFill>
+                  <a:schemeClr val="tx1"/>
+                </a:solidFill>
+                <a:latin typeface="+mj-lt"/>
+                <a:ea typeface="+mj-ea"/>
+                <a:cs typeface="+mj-cs"/>
+              </a:defRPr>
+            </a:lvl1pPr>
+          </a:lstStyle>
+          <a:p>
+            <a:r>
+              <a:rPr lang="en-US" dirty="0">
+                <a:latin typeface="+mn-lt"/>
+              </a:rPr>
+              <a:t>Introduction to key-value indexing</a:t>
+            </a:r>
+          </a:p>
+        </p:txBody>
+      </p:sp>
+    </p:spTree>
+    <p:extLst>
+      <p:ext uri="{BB962C8B-B14F-4D97-AF65-F5344CB8AC3E}">
+        <p14:creationId xmlns:p14="http://schemas.microsoft.com/office/powerpoint/2010/main" val="1970960301"/>
+      </p:ext>
+    </p:extLst>
+  </p:cSld>
+  <p:clrMapOvr>
+    <a:masterClrMapping/>
+  </p:clrMapOvr>
+  <p:timing>
+    <p:tnLst>
+      <p:par>
+        <p:cTn id="1" dur="indefinite" restart="never" nodeType="tmRoot">
+          <p:childTnLst>
+            <p:seq concurrent="1" nextAc="seek">
+              <p:cTn id="2" dur="indefinite" nodeType="mainSeq">
+                <p:childTnLst>
+                  <p:par>
+                    <p:cTn id="3" fill="hold">
+                      <p:stCondLst>
+                        <p:cond delay="indefinite"/>
+                      </p:stCondLst>
+                      <p:childTnLst>
+                        <p:par>
+                          <p:cTn id="4" fill="hold">
+                            <p:stCondLst>
+                              <p:cond delay="0"/>
+                            </p:stCondLst>
+                            <p:childTnLst>
+                              <p:par>
+                                <p:cTn id="5" presetID="1" presetClass="entr" presetSubtype="0" fill="hold" nodeType="clickEffect">
+                                  <p:stCondLst>
+                                    <p:cond delay="0"/>
+                                  </p:stCondLst>
+                                  <p:childTnLst>
+                                    <p:set>
+                                      <p:cBhvr>
+                                        <p:cTn id="6" dur="1" fill="hold">
+                                          <p:stCondLst>
+                                            <p:cond delay="0"/>
+                                          </p:stCondLst>
+                                        </p:cTn>
+                                        <p:tgtEl>
+                                          <p:spTgt spid="3">
+                                            <p:txEl>
+                                              <p:pRg st="1" end="1"/>
+                                            </p:txEl>
+                                          </p:spTgt>
+                                        </p:tgtEl>
+                                        <p:attrNameLst>
+                                          <p:attrName>style.visibility</p:attrName>
+                                        </p:attrNameLst>
+                                      </p:cBhvr>
+                                      <p:to>
+                                        <p:strVal val="visible"/>
+                                      </p:to>
+                                    </p:set>
+                                  </p:childTnLst>
+                                </p:cTn>
+                              </p:par>
+                            </p:childTnLst>
+                          </p:cTn>
+                        </p:par>
+                      </p:childTnLst>
+                    </p:cTn>
+                  </p:par>
+                  <p:par>
+                    <p:cTn id="7" fill="hold">
+                      <p:stCondLst>
+                        <p:cond delay="indefinite"/>
+                      </p:stCondLst>
+                      <p:childTnLst>
+                        <p:par>
+                          <p:cTn id="8" fill="hold">
+                            <p:stCondLst>
+                              <p:cond delay="0"/>
+                            </p:stCondLst>
+                            <p:childTnLst>
+                              <p:par>
+                                <p:cTn id="9" presetID="1" presetClass="entr" presetSubtype="0" fill="hold" nodeType="clickEffect">
+                                  <p:stCondLst>
+                                    <p:cond delay="0"/>
+                                  </p:stCondLst>
+                                  <p:childTnLst>
+                                    <p:set>
+                                      <p:cBhvr>
+                                        <p:cTn id="10" dur="1" fill="hold">
+                                          <p:stCondLst>
+                                            <p:cond delay="0"/>
+                                          </p:stCondLst>
+                                        </p:cTn>
+                                        <p:tgtEl>
+                                          <p:spTgt spid="3">
+                                            <p:txEl>
+                                              <p:pRg st="2" end="2"/>
+                                            </p:txEl>
+                                          </p:spTgt>
+                                        </p:tgtEl>
+                                        <p:attrNameLst>
+                                          <p:attrName>style.visibility</p:attrName>
+                                        </p:attrNameLst>
+                                      </p:cBhvr>
+                                      <p:to>
+                                        <p:strVal val="visible"/>
+                                      </p:to>
+                                    </p:set>
+                                  </p:childTnLst>
+                                </p:cTn>
+                              </p:par>
+                              <p:par>
+                                <p:cTn id="11" presetID="1" presetClass="entr" presetSubtype="0" fill="hold" nodeType="withEffect">
+                                  <p:stCondLst>
+                                    <p:cond delay="0"/>
+                                  </p:stCondLst>
+                                  <p:childTnLst>
+                                    <p:set>
+                                      <p:cBhvr>
+                                        <p:cTn id="12" dur="1" fill="hold">
+                                          <p:stCondLst>
+                                            <p:cond delay="0"/>
+                                          </p:stCondLst>
+                                        </p:cTn>
+                                        <p:tgtEl>
+                                          <p:spTgt spid="3">
+                                            <p:txEl>
+                                              <p:pRg st="3" end="3"/>
+                                            </p:txEl>
+                                          </p:spTgt>
+                                        </p:tgtEl>
+                                        <p:attrNameLst>
+                                          <p:attrName>style.visibility</p:attrName>
+                                        </p:attrNameLst>
+                                      </p:cBhvr>
+                                      <p:to>
+                                        <p:strVal val="visible"/>
+                                      </p:to>
+                                    </p:set>
+                                  </p:childTnLst>
+                                </p:cTn>
+                              </p:par>
+                              <p:par>
+                                <p:cTn id="13" presetID="1" presetClass="entr" presetSubtype="0" fill="hold" nodeType="withEffect">
+                                  <p:stCondLst>
+                                    <p:cond delay="0"/>
+                                  </p:stCondLst>
+                                  <p:childTnLst>
+                                    <p:set>
+                                      <p:cBhvr>
+                                        <p:cTn id="14" dur="1" fill="hold">
+                                          <p:stCondLst>
+                                            <p:cond delay="0"/>
+                                          </p:stCondLst>
+                                        </p:cTn>
+                                        <p:tgtEl>
+                                          <p:spTgt spid="3">
+                                            <p:txEl>
+                                              <p:pRg st="4" end="4"/>
+                                            </p:txEl>
+                                          </p:spTgt>
+                                        </p:tgtEl>
+                                        <p:attrNameLst>
+                                          <p:attrName>style.visibility</p:attrName>
+                                        </p:attrNameLst>
+                                      </p:cBhvr>
+                                      <p:to>
+                                        <p:strVal val="visible"/>
+                                      </p:to>
+                                    </p:set>
+                                  </p:childTnLst>
+                                </p:cTn>
+                              </p:par>
+                              <p:par>
+                                <p:cTn id="15" presetID="1" presetClass="entr" presetSubtype="0" fill="hold" nodeType="withEffect">
+                                  <p:stCondLst>
+                                    <p:cond delay="0"/>
+                                  </p:stCondLst>
+                                  <p:childTnLst>
+                                    <p:set>
+                                      <p:cBhvr>
+                                        <p:cTn id="16" dur="1" fill="hold">
+                                          <p:stCondLst>
+                                            <p:cond delay="0"/>
+                                          </p:stCondLst>
+                                        </p:cTn>
+                                        <p:tgtEl>
+                                          <p:spTgt spid="3">
+                                            <p:txEl>
+                                              <p:pRg st="5" end="5"/>
+                                            </p:txEl>
+                                          </p:spTgt>
+                                        </p:tgtEl>
+                                        <p:attrNameLst>
+                                          <p:attrName>style.visibility</p:attrName>
+                                        </p:attrNameLst>
+                                      </p:cBhvr>
+                                      <p:to>
+                                        <p:strVal val="visible"/>
+                                      </p:to>
+                                    </p:set>
+                                  </p:childTnLst>
+                                </p:cTn>
+                              </p:par>
+                            </p:childTnLst>
+                          </p:cTn>
+                        </p:par>
+                      </p:childTnLst>
+                    </p:cTn>
+                  </p:par>
+                  <p:par>
+                    <p:cTn id="17" fill="hold">
+                      <p:stCondLst>
+                        <p:cond delay="indefinite"/>
+                      </p:stCondLst>
+                      <p:childTnLst>
+                        <p:par>
+                          <p:cTn id="18" fill="hold">
+                            <p:stCondLst>
+                              <p:cond delay="0"/>
+                            </p:stCondLst>
+                            <p:childTnLst>
+                              <p:par>
+                                <p:cTn id="19" presetID="1" presetClass="entr" presetSubtype="0" fill="hold" nodeType="clickEffect">
+                                  <p:stCondLst>
+                                    <p:cond delay="0"/>
+                                  </p:stCondLst>
+                                  <p:childTnLst>
+                                    <p:set>
+                                      <p:cBhvr>
+                                        <p:cTn id="20" dur="1" fill="hold">
+                                          <p:stCondLst>
+                                            <p:cond delay="0"/>
+                                          </p:stCondLst>
+                                        </p:cTn>
+                                        <p:tgtEl>
+                                          <p:spTgt spid="3">
+                                            <p:txEl>
+                                              <p:pRg st="6" end="6"/>
+                                            </p:txEl>
+                                          </p:spTgt>
+                                        </p:tgtEl>
+                                        <p:attrNameLst>
+                                          <p:attrName>style.visibility</p:attrName>
+                                        </p:attrNameLst>
+                                      </p:cBhvr>
+                                      <p:to>
+                                        <p:strVal val="visible"/>
+                                      </p:to>
+                                    </p:set>
+                                  </p:childTnLst>
+                                </p:cTn>
+                              </p:par>
+                            </p:childTnLst>
+                          </p:cTn>
+                        </p:par>
+                      </p:childTnLst>
+                    </p:cTn>
+                  </p:par>
+                  <p:par>
+                    <p:cTn id="21" fill="hold">
+                      <p:stCondLst>
+                        <p:cond delay="indefinite"/>
+                      </p:stCondLst>
+                      <p:childTnLst>
+                        <p:par>
+                          <p:cTn id="22" fill="hold">
+                            <p:stCondLst>
+                              <p:cond delay="0"/>
+                            </p:stCondLst>
+                            <p:childTnLst>
+                              <p:par>
+                                <p:cTn id="23" presetID="1" presetClass="entr" presetSubtype="0" fill="hold" nodeType="clickEffect">
+                                  <p:stCondLst>
+                                    <p:cond delay="0"/>
+                                  </p:stCondLst>
+                                  <p:childTnLst>
+                                    <p:set>
+                                      <p:cBhvr>
+                                        <p:cTn id="24" dur="1" fill="hold">
+                                          <p:stCondLst>
+                                            <p:cond delay="0"/>
+                                          </p:stCondLst>
+                                        </p:cTn>
+                                        <p:tgtEl>
+                                          <p:spTgt spid="3">
+                                            <p:txEl>
+                                              <p:pRg st="7" end="7"/>
+                                            </p:txEl>
+                                          </p:spTgt>
+                                        </p:tgtEl>
+                                        <p:attrNameLst>
+                                          <p:attrName>style.visibility</p:attrName>
+                                        </p:attrNameLst>
+                                      </p:cBhvr>
+                                      <p:to>
+                                        <p:strVal val="visible"/>
+                                      </p:to>
+                                    </p:set>
+                                  </p:childTnLst>
+                                </p:cTn>
+                              </p:par>
+                            </p:childTnLst>
+                          </p:cTn>
+                        </p:par>
+                      </p:childTnLst>
+                    </p:cTn>
+                  </p:par>
+                </p:childTnLst>
+              </p:cTn>
+              <p:prevCondLst>
+                <p:cond evt="onPrev" delay="0">
+                  <p:tgtEl>
+                    <p:sldTgt/>
+                  </p:tgtEl>
+                </p:cond>
+              </p:prevCondLst>
+              <p:nextCondLst>
+                <p:cond evt="onNext" delay="0">
+                  <p:tgtEl>
+                    <p:sldTgt/>
+                  </p:tgtEl>
+                </p:cond>
+              </p:nextCondLst>
+            </p:seq>
+          </p:childTnLst>
+        </p:cTn>
+      </p:par>
+    </p:tnLst>
+  </p:timing>
+</p:sld>
+</file>
+
+<file path=ppt/slides/slide31.xml><?xml version="1.0" encoding="utf-8"?>
+<p:sld xmlns:a="http://schemas.openxmlformats.org/drawingml/2006/main" xmlns:r="http://schemas.openxmlformats.org/officeDocument/2006/relationships" xmlns:p="http://schemas.openxmlformats.org/presentationml/2006/main">
+  <p:cSld>
+    <p:spTree>
+      <p:nvGrpSpPr>
+        <p:cNvPr id="1" name=""/>
+        <p:cNvGrpSpPr/>
+        <p:nvPr/>
+      </p:nvGrpSpPr>
+      <p:grpSpPr>
+        <a:xfrm>
+          <a:off x="0" y="0"/>
+          <a:ext cx="0" cy="0"/>
+          <a:chOff x="0" y="0"/>
+          <a:chExt cx="0" cy="0"/>
+        </a:xfrm>
+      </p:grpSpPr>
       <p:sp>
         <p:nvSpPr>
           <p:cNvPr id="3" name="Content Placeholder 2">
@@ -15578,7 +15779,7 @@
 </p:sld>
 </file>
 
-<file path=ppt/slides/slide31.xml><?xml version="1.0" encoding="utf-8"?>
+<file path=ppt/slides/slide32.xml><?xml version="1.0" encoding="utf-8"?>
 <p:sld xmlns:a="http://schemas.openxmlformats.org/drawingml/2006/main" xmlns:r="http://schemas.openxmlformats.org/officeDocument/2006/relationships" xmlns:p="http://schemas.openxmlformats.org/presentationml/2006/main">
   <p:cSld>
     <p:spTree>
@@ -16414,7 +16615,7 @@
 </p:sld>
 </file>
 
-<file path=ppt/slides/slide32.xml><?xml version="1.0" encoding="utf-8"?>
+<file path=ppt/slides/slide33.xml><?xml version="1.0" encoding="utf-8"?>
 <p:sld xmlns:a="http://schemas.openxmlformats.org/drawingml/2006/main" xmlns:r="http://schemas.openxmlformats.org/officeDocument/2006/relationships" xmlns:p="http://schemas.openxmlformats.org/presentationml/2006/main">
   <p:cSld>
     <p:spTree>
@@ -18786,7 +18987,7 @@
 </p:sld>
 </file>
 
-<file path=ppt/slides/slide33.xml><?xml version="1.0" encoding="utf-8"?>
+<file path=ppt/slides/slide34.xml><?xml version="1.0" encoding="utf-8"?>
 <p:sld xmlns:a="http://schemas.openxmlformats.org/drawingml/2006/main" xmlns:r="http://schemas.openxmlformats.org/officeDocument/2006/relationships" xmlns:p="http://schemas.openxmlformats.org/presentationml/2006/main">
   <p:cSld>
     <p:spTree>
@@ -18846,7 +19047,7 @@
 </p:sld>
 </file>
 
-<file path=ppt/slides/slide34.xml><?xml version="1.0" encoding="utf-8"?>
+<file path=ppt/slides/slide35.xml><?xml version="1.0" encoding="utf-8"?>
 <p:sld xmlns:a="http://schemas.openxmlformats.org/drawingml/2006/main" xmlns:r="http://schemas.openxmlformats.org/officeDocument/2006/relationships" xmlns:p="http://schemas.openxmlformats.org/presentationml/2006/main">
   <p:cSld>
     <p:spTree>
@@ -19483,7 +19684,7 @@
 </p:sld>
 </file>
 
-<file path=ppt/slides/slide35.xml><?xml version="1.0" encoding="utf-8"?>
+<file path=ppt/slides/slide36.xml><?xml version="1.0" encoding="utf-8"?>
 <p:sld xmlns:a="http://schemas.openxmlformats.org/drawingml/2006/main" xmlns:r="http://schemas.openxmlformats.org/officeDocument/2006/relationships" xmlns:p="http://schemas.openxmlformats.org/presentationml/2006/main">
   <p:cSld>
     <p:spTree>
@@ -22400,7 +22601,7 @@
 </p:sld>
 </file>
 
-<file path=ppt/slides/slide36.xml><?xml version="1.0" encoding="utf-8"?>
+<file path=ppt/slides/slide37.xml><?xml version="1.0" encoding="utf-8"?>
 <p:sld xmlns:a="http://schemas.openxmlformats.org/drawingml/2006/main" xmlns:r="http://schemas.openxmlformats.org/officeDocument/2006/relationships" xmlns:p="http://schemas.openxmlformats.org/presentationml/2006/main">
   <p:cSld>
     <p:spTree>
@@ -25275,7 +25476,7 @@
 </p:sld>
 </file>
 
-<file path=ppt/slides/slide37.xml><?xml version="1.0" encoding="utf-8"?>
+<file path=ppt/slides/slide38.xml><?xml version="1.0" encoding="utf-8"?>
 <p:sld xmlns:a="http://schemas.openxmlformats.org/drawingml/2006/main" xmlns:r="http://schemas.openxmlformats.org/officeDocument/2006/relationships" xmlns:p="http://schemas.openxmlformats.org/presentationml/2006/main">
   <p:cSld>
     <p:spTree>
@@ -25683,7 +25884,7 @@
 </p:sld>
 </file>
 
-<file path=ppt/slides/slide38.xml><?xml version="1.0" encoding="utf-8"?>
+<file path=ppt/slides/slide39.xml><?xml version="1.0" encoding="utf-8"?>
 <p:sld xmlns:a="http://schemas.openxmlformats.org/drawingml/2006/main" xmlns:r="http://schemas.openxmlformats.org/officeDocument/2006/relationships" xmlns:p="http://schemas.openxmlformats.org/presentationml/2006/main">
   <p:cSld>
     <p:spTree>
@@ -26146,7 +26347,496 @@
 </p:sld>
 </file>
 
-<file path=ppt/slides/slide39.xml><?xml version="1.0" encoding="utf-8"?>
+<file path=ppt/slides/slide4.xml><?xml version="1.0" encoding="utf-8"?>
+<p:sld xmlns:a="http://schemas.openxmlformats.org/drawingml/2006/main" xmlns:r="http://schemas.openxmlformats.org/officeDocument/2006/relationships" xmlns:p="http://schemas.openxmlformats.org/presentationml/2006/main">
+  <p:cSld>
+    <p:spTree>
+      <p:nvGrpSpPr>
+        <p:cNvPr id="1" name=""/>
+        <p:cNvGrpSpPr/>
+        <p:nvPr/>
+      </p:nvGrpSpPr>
+      <p:grpSpPr>
+        <a:xfrm>
+          <a:off x="0" y="0"/>
+          <a:ext cx="0" cy="0"/>
+          <a:chOff x="0" y="0"/>
+          <a:chExt cx="0" cy="0"/>
+        </a:xfrm>
+      </p:grpSpPr>
+      <p:sp>
+        <p:nvSpPr>
+          <p:cNvPr id="3" name="Content Placeholder 2">
+            <a:extLst>
+              <a:ext uri="{FF2B5EF4-FFF2-40B4-BE49-F238E27FC236}">
+                <a16:creationId xmlns:a16="http://schemas.microsoft.com/office/drawing/2014/main" id="{258E6AF3-7615-4BD1-878E-A94C93E98F90}"/>
+              </a:ext>
+            </a:extLst>
+          </p:cNvPr>
+          <p:cNvSpPr>
+            <a:spLocks noGrp="1"/>
+          </p:cNvSpPr>
+          <p:nvPr>
+            <p:ph idx="1"/>
+          </p:nvPr>
+        </p:nvSpPr>
+        <p:spPr/>
+        <p:txBody>
+          <a:bodyPr/>
+          <a:lstStyle/>
+          <a:p>
+            <a:pPr marL="0" indent="0">
+              <a:buNone/>
+            </a:pPr>
+            <a:r>
+              <a:rPr lang="en-US" dirty="0"/>
+              <a:t>Data mining (KDD) is generally performed at </a:t>
+            </a:r>
+            <a:r>
+              <a:rPr lang="en-US" b="1" dirty="0"/>
+              <a:t>large scale </a:t>
+            </a:r>
+          </a:p>
+          <a:p>
+            <a:r>
+              <a:rPr lang="en-US" dirty="0"/>
+              <a:t>Dataset size has grown nearly exponentially  </a:t>
+            </a:r>
+          </a:p>
+          <a:p>
+            <a:r>
+              <a:rPr lang="en-US" dirty="0"/>
+              <a:t>More importantly, </a:t>
+            </a:r>
+            <a:r>
+              <a:rPr lang="en-US" b="1" dirty="0"/>
+              <a:t>dataset and problem complexity has grown</a:t>
+            </a:r>
+          </a:p>
+          <a:p>
+            <a:r>
+              <a:rPr lang="en-US" dirty="0"/>
+              <a:t>Data mining is at the intersection of several subjects   </a:t>
+            </a:r>
+          </a:p>
+          <a:p>
+            <a:pPr lvl="1"/>
+            <a:r>
+              <a:rPr lang="en-US" b="1" dirty="0"/>
+              <a:t>Statistics:</a:t>
+            </a:r>
+            <a:r>
+              <a:rPr lang="en-US" dirty="0"/>
+              <a:t> What of significance can we learn from the data? </a:t>
+            </a:r>
+          </a:p>
+          <a:p>
+            <a:pPr lvl="1"/>
+            <a:r>
+              <a:rPr lang="en-US" b="1" dirty="0"/>
+              <a:t>Mathematics:</a:t>
+            </a:r>
+            <a:r>
+              <a:rPr lang="en-US" dirty="0"/>
+              <a:t> How do we represent a model of the data as, say, a graph?</a:t>
+            </a:r>
+          </a:p>
+          <a:p>
+            <a:pPr lvl="1"/>
+            <a:r>
+              <a:rPr lang="en-US" b="1" dirty="0"/>
+              <a:t>Algorithms: </a:t>
+            </a:r>
+            <a:r>
+              <a:rPr lang="en-US" dirty="0"/>
+              <a:t>How do we efficiently find important relationships in massive datasets? </a:t>
+            </a:r>
+          </a:p>
+          <a:p>
+            <a:pPr lvl="1"/>
+            <a:r>
+              <a:rPr lang="en-US" b="1" dirty="0"/>
+              <a:t>Technology:</a:t>
+            </a:r>
+            <a:r>
+              <a:rPr lang="en-US" dirty="0"/>
+              <a:t> How do we manage and process massive datasets? </a:t>
+            </a:r>
+            <a:endParaRPr lang="en-US" b="1" dirty="0"/>
+          </a:p>
+        </p:txBody>
+      </p:sp>
+      <p:sp>
+        <p:nvSpPr>
+          <p:cNvPr id="6" name="Title 1">
+            <a:extLst>
+              <a:ext uri="{FF2B5EF4-FFF2-40B4-BE49-F238E27FC236}">
+                <a16:creationId xmlns:a16="http://schemas.microsoft.com/office/drawing/2014/main" id="{CD29F70F-B868-451B-A65D-8721F4C7A2D9}"/>
+              </a:ext>
+            </a:extLst>
+          </p:cNvPr>
+          <p:cNvSpPr txBox="1">
+            <a:spLocks/>
+          </p:cNvSpPr>
+          <p:nvPr/>
+        </p:nvSpPr>
+        <p:spPr>
+          <a:xfrm>
+            <a:off x="838200" y="-635"/>
+            <a:ext cx="10515600" cy="1325563"/>
+          </a:xfrm>
+          <a:prstGeom prst="rect">
+            <a:avLst/>
+          </a:prstGeom>
+        </p:spPr>
+        <p:txBody>
+          <a:bodyPr vert="horz" lIns="91440" tIns="45720" rIns="91440" bIns="45720" rtlCol="0" anchor="ctr">
+            <a:normAutofit/>
+          </a:bodyPr>
+          <a:lstStyle>
+            <a:lvl1pPr algn="l" defTabSz="914400" rtl="0" eaLnBrk="1" latinLnBrk="0" hangingPunct="1">
+              <a:lnSpc>
+                <a:spcPct val="90000"/>
+              </a:lnSpc>
+              <a:spcBef>
+                <a:spcPct val="0"/>
+              </a:spcBef>
+              <a:buNone/>
+              <a:defRPr sz="4400" kern="1200">
+                <a:solidFill>
+                  <a:schemeClr val="tx1"/>
+                </a:solidFill>
+                <a:latin typeface="+mj-lt"/>
+                <a:ea typeface="+mj-ea"/>
+                <a:cs typeface="+mj-cs"/>
+              </a:defRPr>
+            </a:lvl1pPr>
+          </a:lstStyle>
+          <a:p>
+            <a:r>
+              <a:rPr lang="en-US" dirty="0">
+                <a:latin typeface="+mn-lt"/>
+              </a:rPr>
+              <a:t>What is data mining?</a:t>
+            </a:r>
+          </a:p>
+        </p:txBody>
+      </p:sp>
+    </p:spTree>
+    <p:extLst>
+      <p:ext uri="{BB962C8B-B14F-4D97-AF65-F5344CB8AC3E}">
+        <p14:creationId xmlns:p14="http://schemas.microsoft.com/office/powerpoint/2010/main" val="69986985"/>
+      </p:ext>
+    </p:extLst>
+  </p:cSld>
+  <p:clrMapOvr>
+    <a:masterClrMapping/>
+  </p:clrMapOvr>
+  <p:timing>
+    <p:tnLst>
+      <p:par>
+        <p:cTn id="1" dur="indefinite" restart="never" nodeType="tmRoot">
+          <p:childTnLst>
+            <p:seq concurrent="1" nextAc="seek">
+              <p:cTn id="2" dur="indefinite" nodeType="mainSeq">
+                <p:childTnLst>
+                  <p:par>
+                    <p:cTn id="3" fill="hold">
+                      <p:stCondLst>
+                        <p:cond delay="indefinite"/>
+                      </p:stCondLst>
+                      <p:childTnLst>
+                        <p:par>
+                          <p:cTn id="4" fill="hold">
+                            <p:stCondLst>
+                              <p:cond delay="0"/>
+                            </p:stCondLst>
+                            <p:childTnLst>
+                              <p:par>
+                                <p:cTn id="5" presetID="1" presetClass="entr" presetSubtype="0" fill="hold" nodeType="clickEffect">
+                                  <p:stCondLst>
+                                    <p:cond delay="0"/>
+                                  </p:stCondLst>
+                                  <p:childTnLst>
+                                    <p:set>
+                                      <p:cBhvr>
+                                        <p:cTn id="6" dur="1" fill="hold">
+                                          <p:stCondLst>
+                                            <p:cond delay="0"/>
+                                          </p:stCondLst>
+                                        </p:cTn>
+                                        <p:tgtEl>
+                                          <p:spTgt spid="3">
+                                            <p:txEl>
+                                              <p:pRg st="1" end="1"/>
+                                            </p:txEl>
+                                          </p:spTgt>
+                                        </p:tgtEl>
+                                        <p:attrNameLst>
+                                          <p:attrName>style.visibility</p:attrName>
+                                        </p:attrNameLst>
+                                      </p:cBhvr>
+                                      <p:to>
+                                        <p:strVal val="visible"/>
+                                      </p:to>
+                                    </p:set>
+                                  </p:childTnLst>
+                                </p:cTn>
+                              </p:par>
+                            </p:childTnLst>
+                          </p:cTn>
+                        </p:par>
+                      </p:childTnLst>
+                    </p:cTn>
+                  </p:par>
+                  <p:par>
+                    <p:cTn id="7" fill="hold">
+                      <p:stCondLst>
+                        <p:cond delay="indefinite"/>
+                      </p:stCondLst>
+                      <p:childTnLst>
+                        <p:par>
+                          <p:cTn id="8" fill="hold">
+                            <p:stCondLst>
+                              <p:cond delay="0"/>
+                            </p:stCondLst>
+                            <p:childTnLst>
+                              <p:par>
+                                <p:cTn id="9" presetID="1" presetClass="entr" presetSubtype="0" fill="hold" nodeType="clickEffect">
+                                  <p:stCondLst>
+                                    <p:cond delay="0"/>
+                                  </p:stCondLst>
+                                  <p:childTnLst>
+                                    <p:set>
+                                      <p:cBhvr>
+                                        <p:cTn id="10" dur="1" fill="hold">
+                                          <p:stCondLst>
+                                            <p:cond delay="0"/>
+                                          </p:stCondLst>
+                                        </p:cTn>
+                                        <p:tgtEl>
+                                          <p:spTgt spid="3">
+                                            <p:txEl>
+                                              <p:pRg st="2" end="2"/>
+                                            </p:txEl>
+                                          </p:spTgt>
+                                        </p:tgtEl>
+                                        <p:attrNameLst>
+                                          <p:attrName>style.visibility</p:attrName>
+                                        </p:attrNameLst>
+                                      </p:cBhvr>
+                                      <p:to>
+                                        <p:strVal val="visible"/>
+                                      </p:to>
+                                    </p:set>
+                                  </p:childTnLst>
+                                </p:cTn>
+                              </p:par>
+                            </p:childTnLst>
+                          </p:cTn>
+                        </p:par>
+                      </p:childTnLst>
+                    </p:cTn>
+                  </p:par>
+                  <p:par>
+                    <p:cTn id="11" fill="hold">
+                      <p:stCondLst>
+                        <p:cond delay="indefinite"/>
+                      </p:stCondLst>
+                      <p:childTnLst>
+                        <p:par>
+                          <p:cTn id="12" fill="hold">
+                            <p:stCondLst>
+                              <p:cond delay="0"/>
+                            </p:stCondLst>
+                            <p:childTnLst>
+                              <p:par>
+                                <p:cTn id="13" presetID="1" presetClass="entr" presetSubtype="0" fill="hold" nodeType="clickEffect">
+                                  <p:stCondLst>
+                                    <p:cond delay="0"/>
+                                  </p:stCondLst>
+                                  <p:childTnLst>
+                                    <p:set>
+                                      <p:cBhvr>
+                                        <p:cTn id="14" dur="1" fill="hold">
+                                          <p:stCondLst>
+                                            <p:cond delay="0"/>
+                                          </p:stCondLst>
+                                        </p:cTn>
+                                        <p:tgtEl>
+                                          <p:spTgt spid="3">
+                                            <p:txEl>
+                                              <p:pRg st="3" end="3"/>
+                                            </p:txEl>
+                                          </p:spTgt>
+                                        </p:tgtEl>
+                                        <p:attrNameLst>
+                                          <p:attrName>style.visibility</p:attrName>
+                                        </p:attrNameLst>
+                                      </p:cBhvr>
+                                      <p:to>
+                                        <p:strVal val="visible"/>
+                                      </p:to>
+                                    </p:set>
+                                  </p:childTnLst>
+                                </p:cTn>
+                              </p:par>
+                              <p:par>
+                                <p:cTn id="15" presetID="1" presetClass="entr" presetSubtype="0" fill="hold" nodeType="withEffect">
+                                  <p:stCondLst>
+                                    <p:cond delay="0"/>
+                                  </p:stCondLst>
+                                  <p:childTnLst>
+                                    <p:set>
+                                      <p:cBhvr>
+                                        <p:cTn id="16" dur="1" fill="hold">
+                                          <p:stCondLst>
+                                            <p:cond delay="0"/>
+                                          </p:stCondLst>
+                                        </p:cTn>
+                                        <p:tgtEl>
+                                          <p:spTgt spid="3">
+                                            <p:txEl>
+                                              <p:pRg st="4" end="4"/>
+                                            </p:txEl>
+                                          </p:spTgt>
+                                        </p:tgtEl>
+                                        <p:attrNameLst>
+                                          <p:attrName>style.visibility</p:attrName>
+                                        </p:attrNameLst>
+                                      </p:cBhvr>
+                                      <p:to>
+                                        <p:strVal val="visible"/>
+                                      </p:to>
+                                    </p:set>
+                                  </p:childTnLst>
+                                </p:cTn>
+                              </p:par>
+                              <p:par>
+                                <p:cTn id="17" presetID="1" presetClass="entr" presetSubtype="0" fill="hold" nodeType="withEffect">
+                                  <p:stCondLst>
+                                    <p:cond delay="0"/>
+                                  </p:stCondLst>
+                                  <p:childTnLst>
+                                    <p:set>
+                                      <p:cBhvr>
+                                        <p:cTn id="18" dur="1" fill="hold">
+                                          <p:stCondLst>
+                                            <p:cond delay="0"/>
+                                          </p:stCondLst>
+                                        </p:cTn>
+                                        <p:tgtEl>
+                                          <p:spTgt spid="3">
+                                            <p:txEl>
+                                              <p:pRg st="5" end="5"/>
+                                            </p:txEl>
+                                          </p:spTgt>
+                                        </p:tgtEl>
+                                        <p:attrNameLst>
+                                          <p:attrName>style.visibility</p:attrName>
+                                        </p:attrNameLst>
+                                      </p:cBhvr>
+                                      <p:to>
+                                        <p:strVal val="visible"/>
+                                      </p:to>
+                                    </p:set>
+                                  </p:childTnLst>
+                                </p:cTn>
+                              </p:par>
+                              <p:par>
+                                <p:cTn id="19" presetID="1" presetClass="entr" presetSubtype="0" fill="hold" nodeType="withEffect">
+                                  <p:stCondLst>
+                                    <p:cond delay="0"/>
+                                  </p:stCondLst>
+                                  <p:childTnLst>
+                                    <p:set>
+                                      <p:cBhvr>
+                                        <p:cTn id="20" dur="1" fill="hold">
+                                          <p:stCondLst>
+                                            <p:cond delay="0"/>
+                                          </p:stCondLst>
+                                        </p:cTn>
+                                        <p:tgtEl>
+                                          <p:spTgt spid="3">
+                                            <p:txEl>
+                                              <p:pRg st="6" end="6"/>
+                                            </p:txEl>
+                                          </p:spTgt>
+                                        </p:tgtEl>
+                                        <p:attrNameLst>
+                                          <p:attrName>style.visibility</p:attrName>
+                                        </p:attrNameLst>
+                                      </p:cBhvr>
+                                      <p:to>
+                                        <p:strVal val="visible"/>
+                                      </p:to>
+                                    </p:set>
+                                  </p:childTnLst>
+                                </p:cTn>
+                              </p:par>
+                              <p:par>
+                                <p:cTn id="21" presetID="1" presetClass="entr" presetSubtype="0" fill="hold" nodeType="withEffect">
+                                  <p:stCondLst>
+                                    <p:cond delay="0"/>
+                                  </p:stCondLst>
+                                  <p:childTnLst>
+                                    <p:set>
+                                      <p:cBhvr>
+                                        <p:cTn id="22" dur="1" fill="hold">
+                                          <p:stCondLst>
+                                            <p:cond delay="0"/>
+                                          </p:stCondLst>
+                                        </p:cTn>
+                                        <p:tgtEl>
+                                          <p:spTgt spid="3">
+                                            <p:txEl>
+                                              <p:pRg st="7" end="7"/>
+                                            </p:txEl>
+                                          </p:spTgt>
+                                        </p:tgtEl>
+                                        <p:attrNameLst>
+                                          <p:attrName>style.visibility</p:attrName>
+                                        </p:attrNameLst>
+                                      </p:cBhvr>
+                                      <p:to>
+                                        <p:strVal val="visible"/>
+                                      </p:to>
+                                    </p:set>
+                                  </p:childTnLst>
+                                </p:cTn>
+                              </p:par>
+                            </p:childTnLst>
+                          </p:cTn>
+                        </p:par>
+                      </p:childTnLst>
+                    </p:cTn>
+                  </p:par>
+                </p:childTnLst>
+              </p:cTn>
+              <p:prevCondLst>
+                <p:cond evt="onPrev" delay="0">
+                  <p:tgtEl>
+                    <p:sldTgt/>
+                  </p:tgtEl>
+                </p:cond>
+              </p:prevCondLst>
+              <p:nextCondLst>
+                <p:cond evt="onNext" delay="0">
+                  <p:tgtEl>
+                    <p:sldTgt/>
+                  </p:tgtEl>
+                </p:cond>
+              </p:nextCondLst>
+            </p:seq>
+          </p:childTnLst>
+        </p:cTn>
+      </p:par>
+    </p:tnLst>
+  </p:timing>
+</p:sld>
+</file>
+
+<file path=ppt/slides/slide40.xml><?xml version="1.0" encoding="utf-8"?>
 <p:sld xmlns:a="http://schemas.openxmlformats.org/drawingml/2006/main" xmlns:r="http://schemas.openxmlformats.org/officeDocument/2006/relationships" xmlns:p="http://schemas.openxmlformats.org/presentationml/2006/main">
   <p:cSld>
     <p:spTree>
@@ -26576,496 +27266,7 @@
 </p:sld>
 </file>
 
-<file path=ppt/slides/slide4.xml><?xml version="1.0" encoding="utf-8"?>
-<p:sld xmlns:a="http://schemas.openxmlformats.org/drawingml/2006/main" xmlns:r="http://schemas.openxmlformats.org/officeDocument/2006/relationships" xmlns:p="http://schemas.openxmlformats.org/presentationml/2006/main">
-  <p:cSld>
-    <p:spTree>
-      <p:nvGrpSpPr>
-        <p:cNvPr id="1" name=""/>
-        <p:cNvGrpSpPr/>
-        <p:nvPr/>
-      </p:nvGrpSpPr>
-      <p:grpSpPr>
-        <a:xfrm>
-          <a:off x="0" y="0"/>
-          <a:ext cx="0" cy="0"/>
-          <a:chOff x="0" y="0"/>
-          <a:chExt cx="0" cy="0"/>
-        </a:xfrm>
-      </p:grpSpPr>
-      <p:sp>
-        <p:nvSpPr>
-          <p:cNvPr id="3" name="Content Placeholder 2">
-            <a:extLst>
-              <a:ext uri="{FF2B5EF4-FFF2-40B4-BE49-F238E27FC236}">
-                <a16:creationId xmlns:a16="http://schemas.microsoft.com/office/drawing/2014/main" id="{258E6AF3-7615-4BD1-878E-A94C93E98F90}"/>
-              </a:ext>
-            </a:extLst>
-          </p:cNvPr>
-          <p:cNvSpPr>
-            <a:spLocks noGrp="1"/>
-          </p:cNvSpPr>
-          <p:nvPr>
-            <p:ph idx="1"/>
-          </p:nvPr>
-        </p:nvSpPr>
-        <p:spPr/>
-        <p:txBody>
-          <a:bodyPr/>
-          <a:lstStyle/>
-          <a:p>
-            <a:pPr marL="0" indent="0">
-              <a:buNone/>
-            </a:pPr>
-            <a:r>
-              <a:rPr lang="en-US" dirty="0"/>
-              <a:t>Data mining (KDD) is generally performed at </a:t>
-            </a:r>
-            <a:r>
-              <a:rPr lang="en-US" b="1" dirty="0"/>
-              <a:t>large scale </a:t>
-            </a:r>
-          </a:p>
-          <a:p>
-            <a:r>
-              <a:rPr lang="en-US" dirty="0"/>
-              <a:t>Dataset size has grown nearly exponentially  </a:t>
-            </a:r>
-          </a:p>
-          <a:p>
-            <a:r>
-              <a:rPr lang="en-US" dirty="0"/>
-              <a:t>More importantly, </a:t>
-            </a:r>
-            <a:r>
-              <a:rPr lang="en-US" b="1" dirty="0"/>
-              <a:t>dataset and problem complexity has grown</a:t>
-            </a:r>
-          </a:p>
-          <a:p>
-            <a:r>
-              <a:rPr lang="en-US" dirty="0"/>
-              <a:t>Data mining is at the intersection of several subjects   </a:t>
-            </a:r>
-          </a:p>
-          <a:p>
-            <a:pPr lvl="1"/>
-            <a:r>
-              <a:rPr lang="en-US" b="1" dirty="0"/>
-              <a:t>Statistics:</a:t>
-            </a:r>
-            <a:r>
-              <a:rPr lang="en-US" dirty="0"/>
-              <a:t> What of significance can we learn from the data? </a:t>
-            </a:r>
-          </a:p>
-          <a:p>
-            <a:pPr lvl="1"/>
-            <a:r>
-              <a:rPr lang="en-US" b="1" dirty="0"/>
-              <a:t>Mathematics:</a:t>
-            </a:r>
-            <a:r>
-              <a:rPr lang="en-US" dirty="0"/>
-              <a:t> How do we represent a model of the data as, say, a graph?</a:t>
-            </a:r>
-          </a:p>
-          <a:p>
-            <a:pPr lvl="1"/>
-            <a:r>
-              <a:rPr lang="en-US" b="1" dirty="0"/>
-              <a:t>Algorithms: </a:t>
-            </a:r>
-            <a:r>
-              <a:rPr lang="en-US" dirty="0"/>
-              <a:t>How do we efficiently find important relationships in massive datasets? </a:t>
-            </a:r>
-          </a:p>
-          <a:p>
-            <a:pPr lvl="1"/>
-            <a:r>
-              <a:rPr lang="en-US" b="1" dirty="0"/>
-              <a:t>Technology:</a:t>
-            </a:r>
-            <a:r>
-              <a:rPr lang="en-US" dirty="0"/>
-              <a:t> How do we manage and process massive datasets? </a:t>
-            </a:r>
-            <a:endParaRPr lang="en-US" b="1" dirty="0"/>
-          </a:p>
-        </p:txBody>
-      </p:sp>
-      <p:sp>
-        <p:nvSpPr>
-          <p:cNvPr id="6" name="Title 1">
-            <a:extLst>
-              <a:ext uri="{FF2B5EF4-FFF2-40B4-BE49-F238E27FC236}">
-                <a16:creationId xmlns:a16="http://schemas.microsoft.com/office/drawing/2014/main" id="{CD29F70F-B868-451B-A65D-8721F4C7A2D9}"/>
-              </a:ext>
-            </a:extLst>
-          </p:cNvPr>
-          <p:cNvSpPr txBox="1">
-            <a:spLocks/>
-          </p:cNvSpPr>
-          <p:nvPr/>
-        </p:nvSpPr>
-        <p:spPr>
-          <a:xfrm>
-            <a:off x="838200" y="-635"/>
-            <a:ext cx="10515600" cy="1325563"/>
-          </a:xfrm>
-          <a:prstGeom prst="rect">
-            <a:avLst/>
-          </a:prstGeom>
-        </p:spPr>
-        <p:txBody>
-          <a:bodyPr vert="horz" lIns="91440" tIns="45720" rIns="91440" bIns="45720" rtlCol="0" anchor="ctr">
-            <a:normAutofit/>
-          </a:bodyPr>
-          <a:lstStyle>
-            <a:lvl1pPr algn="l" defTabSz="914400" rtl="0" eaLnBrk="1" latinLnBrk="0" hangingPunct="1">
-              <a:lnSpc>
-                <a:spcPct val="90000"/>
-              </a:lnSpc>
-              <a:spcBef>
-                <a:spcPct val="0"/>
-              </a:spcBef>
-              <a:buNone/>
-              <a:defRPr sz="4400" kern="1200">
-                <a:solidFill>
-                  <a:schemeClr val="tx1"/>
-                </a:solidFill>
-                <a:latin typeface="+mj-lt"/>
-                <a:ea typeface="+mj-ea"/>
-                <a:cs typeface="+mj-cs"/>
-              </a:defRPr>
-            </a:lvl1pPr>
-          </a:lstStyle>
-          <a:p>
-            <a:r>
-              <a:rPr lang="en-US" dirty="0">
-                <a:latin typeface="+mn-lt"/>
-              </a:rPr>
-              <a:t>What is data mining?</a:t>
-            </a:r>
-          </a:p>
-        </p:txBody>
-      </p:sp>
-    </p:spTree>
-    <p:extLst>
-      <p:ext uri="{BB962C8B-B14F-4D97-AF65-F5344CB8AC3E}">
-        <p14:creationId xmlns:p14="http://schemas.microsoft.com/office/powerpoint/2010/main" val="69986985"/>
-      </p:ext>
-    </p:extLst>
-  </p:cSld>
-  <p:clrMapOvr>
-    <a:masterClrMapping/>
-  </p:clrMapOvr>
-  <p:timing>
-    <p:tnLst>
-      <p:par>
-        <p:cTn id="1" dur="indefinite" restart="never" nodeType="tmRoot">
-          <p:childTnLst>
-            <p:seq concurrent="1" nextAc="seek">
-              <p:cTn id="2" dur="indefinite" nodeType="mainSeq">
-                <p:childTnLst>
-                  <p:par>
-                    <p:cTn id="3" fill="hold">
-                      <p:stCondLst>
-                        <p:cond delay="indefinite"/>
-                      </p:stCondLst>
-                      <p:childTnLst>
-                        <p:par>
-                          <p:cTn id="4" fill="hold">
-                            <p:stCondLst>
-                              <p:cond delay="0"/>
-                            </p:stCondLst>
-                            <p:childTnLst>
-                              <p:par>
-                                <p:cTn id="5" presetID="1" presetClass="entr" presetSubtype="0" fill="hold" nodeType="clickEffect">
-                                  <p:stCondLst>
-                                    <p:cond delay="0"/>
-                                  </p:stCondLst>
-                                  <p:childTnLst>
-                                    <p:set>
-                                      <p:cBhvr>
-                                        <p:cTn id="6" dur="1" fill="hold">
-                                          <p:stCondLst>
-                                            <p:cond delay="0"/>
-                                          </p:stCondLst>
-                                        </p:cTn>
-                                        <p:tgtEl>
-                                          <p:spTgt spid="3">
-                                            <p:txEl>
-                                              <p:pRg st="1" end="1"/>
-                                            </p:txEl>
-                                          </p:spTgt>
-                                        </p:tgtEl>
-                                        <p:attrNameLst>
-                                          <p:attrName>style.visibility</p:attrName>
-                                        </p:attrNameLst>
-                                      </p:cBhvr>
-                                      <p:to>
-                                        <p:strVal val="visible"/>
-                                      </p:to>
-                                    </p:set>
-                                  </p:childTnLst>
-                                </p:cTn>
-                              </p:par>
-                            </p:childTnLst>
-                          </p:cTn>
-                        </p:par>
-                      </p:childTnLst>
-                    </p:cTn>
-                  </p:par>
-                  <p:par>
-                    <p:cTn id="7" fill="hold">
-                      <p:stCondLst>
-                        <p:cond delay="indefinite"/>
-                      </p:stCondLst>
-                      <p:childTnLst>
-                        <p:par>
-                          <p:cTn id="8" fill="hold">
-                            <p:stCondLst>
-                              <p:cond delay="0"/>
-                            </p:stCondLst>
-                            <p:childTnLst>
-                              <p:par>
-                                <p:cTn id="9" presetID="1" presetClass="entr" presetSubtype="0" fill="hold" nodeType="clickEffect">
-                                  <p:stCondLst>
-                                    <p:cond delay="0"/>
-                                  </p:stCondLst>
-                                  <p:childTnLst>
-                                    <p:set>
-                                      <p:cBhvr>
-                                        <p:cTn id="10" dur="1" fill="hold">
-                                          <p:stCondLst>
-                                            <p:cond delay="0"/>
-                                          </p:stCondLst>
-                                        </p:cTn>
-                                        <p:tgtEl>
-                                          <p:spTgt spid="3">
-                                            <p:txEl>
-                                              <p:pRg st="2" end="2"/>
-                                            </p:txEl>
-                                          </p:spTgt>
-                                        </p:tgtEl>
-                                        <p:attrNameLst>
-                                          <p:attrName>style.visibility</p:attrName>
-                                        </p:attrNameLst>
-                                      </p:cBhvr>
-                                      <p:to>
-                                        <p:strVal val="visible"/>
-                                      </p:to>
-                                    </p:set>
-                                  </p:childTnLst>
-                                </p:cTn>
-                              </p:par>
-                            </p:childTnLst>
-                          </p:cTn>
-                        </p:par>
-                      </p:childTnLst>
-                    </p:cTn>
-                  </p:par>
-                  <p:par>
-                    <p:cTn id="11" fill="hold">
-                      <p:stCondLst>
-                        <p:cond delay="indefinite"/>
-                      </p:stCondLst>
-                      <p:childTnLst>
-                        <p:par>
-                          <p:cTn id="12" fill="hold">
-                            <p:stCondLst>
-                              <p:cond delay="0"/>
-                            </p:stCondLst>
-                            <p:childTnLst>
-                              <p:par>
-                                <p:cTn id="13" presetID="1" presetClass="entr" presetSubtype="0" fill="hold" nodeType="clickEffect">
-                                  <p:stCondLst>
-                                    <p:cond delay="0"/>
-                                  </p:stCondLst>
-                                  <p:childTnLst>
-                                    <p:set>
-                                      <p:cBhvr>
-                                        <p:cTn id="14" dur="1" fill="hold">
-                                          <p:stCondLst>
-                                            <p:cond delay="0"/>
-                                          </p:stCondLst>
-                                        </p:cTn>
-                                        <p:tgtEl>
-                                          <p:spTgt spid="3">
-                                            <p:txEl>
-                                              <p:pRg st="3" end="3"/>
-                                            </p:txEl>
-                                          </p:spTgt>
-                                        </p:tgtEl>
-                                        <p:attrNameLst>
-                                          <p:attrName>style.visibility</p:attrName>
-                                        </p:attrNameLst>
-                                      </p:cBhvr>
-                                      <p:to>
-                                        <p:strVal val="visible"/>
-                                      </p:to>
-                                    </p:set>
-                                  </p:childTnLst>
-                                </p:cTn>
-                              </p:par>
-                              <p:par>
-                                <p:cTn id="15" presetID="1" presetClass="entr" presetSubtype="0" fill="hold" nodeType="withEffect">
-                                  <p:stCondLst>
-                                    <p:cond delay="0"/>
-                                  </p:stCondLst>
-                                  <p:childTnLst>
-                                    <p:set>
-                                      <p:cBhvr>
-                                        <p:cTn id="16" dur="1" fill="hold">
-                                          <p:stCondLst>
-                                            <p:cond delay="0"/>
-                                          </p:stCondLst>
-                                        </p:cTn>
-                                        <p:tgtEl>
-                                          <p:spTgt spid="3">
-                                            <p:txEl>
-                                              <p:pRg st="4" end="4"/>
-                                            </p:txEl>
-                                          </p:spTgt>
-                                        </p:tgtEl>
-                                        <p:attrNameLst>
-                                          <p:attrName>style.visibility</p:attrName>
-                                        </p:attrNameLst>
-                                      </p:cBhvr>
-                                      <p:to>
-                                        <p:strVal val="visible"/>
-                                      </p:to>
-                                    </p:set>
-                                  </p:childTnLst>
-                                </p:cTn>
-                              </p:par>
-                              <p:par>
-                                <p:cTn id="17" presetID="1" presetClass="entr" presetSubtype="0" fill="hold" nodeType="withEffect">
-                                  <p:stCondLst>
-                                    <p:cond delay="0"/>
-                                  </p:stCondLst>
-                                  <p:childTnLst>
-                                    <p:set>
-                                      <p:cBhvr>
-                                        <p:cTn id="18" dur="1" fill="hold">
-                                          <p:stCondLst>
-                                            <p:cond delay="0"/>
-                                          </p:stCondLst>
-                                        </p:cTn>
-                                        <p:tgtEl>
-                                          <p:spTgt spid="3">
-                                            <p:txEl>
-                                              <p:pRg st="5" end="5"/>
-                                            </p:txEl>
-                                          </p:spTgt>
-                                        </p:tgtEl>
-                                        <p:attrNameLst>
-                                          <p:attrName>style.visibility</p:attrName>
-                                        </p:attrNameLst>
-                                      </p:cBhvr>
-                                      <p:to>
-                                        <p:strVal val="visible"/>
-                                      </p:to>
-                                    </p:set>
-                                  </p:childTnLst>
-                                </p:cTn>
-                              </p:par>
-                              <p:par>
-                                <p:cTn id="19" presetID="1" presetClass="entr" presetSubtype="0" fill="hold" nodeType="withEffect">
-                                  <p:stCondLst>
-                                    <p:cond delay="0"/>
-                                  </p:stCondLst>
-                                  <p:childTnLst>
-                                    <p:set>
-                                      <p:cBhvr>
-                                        <p:cTn id="20" dur="1" fill="hold">
-                                          <p:stCondLst>
-                                            <p:cond delay="0"/>
-                                          </p:stCondLst>
-                                        </p:cTn>
-                                        <p:tgtEl>
-                                          <p:spTgt spid="3">
-                                            <p:txEl>
-                                              <p:pRg st="6" end="6"/>
-                                            </p:txEl>
-                                          </p:spTgt>
-                                        </p:tgtEl>
-                                        <p:attrNameLst>
-                                          <p:attrName>style.visibility</p:attrName>
-                                        </p:attrNameLst>
-                                      </p:cBhvr>
-                                      <p:to>
-                                        <p:strVal val="visible"/>
-                                      </p:to>
-                                    </p:set>
-                                  </p:childTnLst>
-                                </p:cTn>
-                              </p:par>
-                              <p:par>
-                                <p:cTn id="21" presetID="1" presetClass="entr" presetSubtype="0" fill="hold" nodeType="withEffect">
-                                  <p:stCondLst>
-                                    <p:cond delay="0"/>
-                                  </p:stCondLst>
-                                  <p:childTnLst>
-                                    <p:set>
-                                      <p:cBhvr>
-                                        <p:cTn id="22" dur="1" fill="hold">
-                                          <p:stCondLst>
-                                            <p:cond delay="0"/>
-                                          </p:stCondLst>
-                                        </p:cTn>
-                                        <p:tgtEl>
-                                          <p:spTgt spid="3">
-                                            <p:txEl>
-                                              <p:pRg st="7" end="7"/>
-                                            </p:txEl>
-                                          </p:spTgt>
-                                        </p:tgtEl>
-                                        <p:attrNameLst>
-                                          <p:attrName>style.visibility</p:attrName>
-                                        </p:attrNameLst>
-                                      </p:cBhvr>
-                                      <p:to>
-                                        <p:strVal val="visible"/>
-                                      </p:to>
-                                    </p:set>
-                                  </p:childTnLst>
-                                </p:cTn>
-                              </p:par>
-                            </p:childTnLst>
-                          </p:cTn>
-                        </p:par>
-                      </p:childTnLst>
-                    </p:cTn>
-                  </p:par>
-                </p:childTnLst>
-              </p:cTn>
-              <p:prevCondLst>
-                <p:cond evt="onPrev" delay="0">
-                  <p:tgtEl>
-                    <p:sldTgt/>
-                  </p:tgtEl>
-                </p:cond>
-              </p:prevCondLst>
-              <p:nextCondLst>
-                <p:cond evt="onNext" delay="0">
-                  <p:tgtEl>
-                    <p:sldTgt/>
-                  </p:tgtEl>
-                </p:cond>
-              </p:nextCondLst>
-            </p:seq>
-          </p:childTnLst>
-        </p:cTn>
-      </p:par>
-    </p:tnLst>
-  </p:timing>
-</p:sld>
-</file>
-
-<file path=ppt/slides/slide40.xml><?xml version="1.0" encoding="utf-8"?>
+<file path=ppt/slides/slide41.xml><?xml version="1.0" encoding="utf-8"?>
 <p:sld xmlns:a="http://schemas.openxmlformats.org/drawingml/2006/main" xmlns:r="http://schemas.openxmlformats.org/officeDocument/2006/relationships" xmlns:p="http://schemas.openxmlformats.org/presentationml/2006/main">
   <p:cSld>
     <p:spTree>
@@ -27631,7 +27832,7 @@
 </p:sld>
 </file>
 
-<file path=ppt/slides/slide41.xml><?xml version="1.0" encoding="utf-8"?>
+<file path=ppt/slides/slide42.xml><?xml version="1.0" encoding="utf-8"?>
 <p:sld xmlns:a="http://schemas.openxmlformats.org/drawingml/2006/main" xmlns:r="http://schemas.openxmlformats.org/officeDocument/2006/relationships" xmlns:p="http://schemas.openxmlformats.org/presentationml/2006/main">
   <p:cSld>
     <p:spTree>
@@ -28205,7 +28406,7 @@
 </p:sld>
 </file>
 
-<file path=ppt/slides/slide42.xml><?xml version="1.0" encoding="utf-8"?>
+<file path=ppt/slides/slide43.xml><?xml version="1.0" encoding="utf-8"?>
 <p:sld xmlns:a="http://schemas.openxmlformats.org/drawingml/2006/main" xmlns:r="http://schemas.openxmlformats.org/officeDocument/2006/relationships" xmlns:p="http://schemas.openxmlformats.org/presentationml/2006/main">
   <p:cSld>
     <p:spTree>
@@ -28265,7 +28466,7 @@
 </p:sld>
 </file>
 
-<file path=ppt/slides/slide43.xml><?xml version="1.0" encoding="utf-8"?>
+<file path=ppt/slides/slide44.xml><?xml version="1.0" encoding="utf-8"?>
 <p:sld xmlns:a="http://schemas.openxmlformats.org/drawingml/2006/main" xmlns:r="http://schemas.openxmlformats.org/officeDocument/2006/relationships" xmlns:p="http://schemas.openxmlformats.org/presentationml/2006/main">
   <p:cSld>
     <p:spTree>
@@ -28941,7 +29142,7 @@
 </p:sld>
 </file>
 
-<file path=ppt/slides/slide44.xml><?xml version="1.0" encoding="utf-8"?>
+<file path=ppt/slides/slide45.xml><?xml version="1.0" encoding="utf-8"?>
 <p:sld xmlns:a="http://schemas.openxmlformats.org/drawingml/2006/main" xmlns:r="http://schemas.openxmlformats.org/officeDocument/2006/relationships" xmlns:p="http://schemas.openxmlformats.org/presentationml/2006/main">
   <p:cSld>
     <p:spTree>
@@ -29805,7 +30006,7 @@
 </p:sld>
 </file>
 
-<file path=ppt/slides/slide45.xml><?xml version="1.0" encoding="utf-8"?>
+<file path=ppt/slides/slide46.xml><?xml version="1.0" encoding="utf-8"?>
 <p:sld xmlns:a="http://schemas.openxmlformats.org/drawingml/2006/main" xmlns:r="http://schemas.openxmlformats.org/officeDocument/2006/relationships" xmlns:p="http://schemas.openxmlformats.org/presentationml/2006/main">
   <p:cSld>
     <p:spTree>
@@ -32100,7 +32301,7 @@
 </p:sld>
 </file>
 
-<file path=ppt/slides/slide46.xml><?xml version="1.0" encoding="utf-8"?>
+<file path=ppt/slides/slide47.xml><?xml version="1.0" encoding="utf-8"?>
 <p:sld xmlns:a="http://schemas.openxmlformats.org/drawingml/2006/main" xmlns:r="http://schemas.openxmlformats.org/officeDocument/2006/relationships" xmlns:p="http://schemas.openxmlformats.org/presentationml/2006/main">
   <p:cSld>
     <p:spTree>
@@ -32719,7 +32920,7 @@
 </p:sld>
 </file>
 
-<file path=ppt/slides/slide47.xml><?xml version="1.0" encoding="utf-8"?>
+<file path=ppt/slides/slide48.xml><?xml version="1.0" encoding="utf-8"?>
 <p:sld xmlns:a="http://schemas.openxmlformats.org/drawingml/2006/main" xmlns:r="http://schemas.openxmlformats.org/officeDocument/2006/relationships" xmlns:p="http://schemas.openxmlformats.org/presentationml/2006/main">
   <p:cSld>
     <p:spTree>
@@ -33427,7 +33628,7 @@
 </p:sld>
 </file>
 
-<file path=ppt/slides/slide48.xml><?xml version="1.0" encoding="utf-8"?>
+<file path=ppt/slides/slide49.xml><?xml version="1.0" encoding="utf-8"?>
 <p:sld xmlns:a="http://schemas.openxmlformats.org/drawingml/2006/main" xmlns:r="http://schemas.openxmlformats.org/officeDocument/2006/relationships" xmlns:p="http://schemas.openxmlformats.org/presentationml/2006/main">
   <p:cSld>
     <p:spTree>
@@ -34698,76 +34899,6 @@
 </p:sld>
 </file>
 
-<file path=ppt/slides/slide49.xml><?xml version="1.0" encoding="utf-8"?>
-<p:sld xmlns:a="http://schemas.openxmlformats.org/drawingml/2006/main" xmlns:r="http://schemas.openxmlformats.org/officeDocument/2006/relationships" xmlns:p="http://schemas.openxmlformats.org/presentationml/2006/main">
-  <p:cSld>
-    <p:spTree>
-      <p:nvGrpSpPr>
-        <p:cNvPr id="1" name=""/>
-        <p:cNvGrpSpPr/>
-        <p:nvPr/>
-      </p:nvGrpSpPr>
-      <p:grpSpPr>
-        <a:xfrm>
-          <a:off x="0" y="0"/>
-          <a:ext cx="0" cy="0"/>
-          <a:chOff x="0" y="0"/>
-          <a:chExt cx="0" cy="0"/>
-        </a:xfrm>
-      </p:grpSpPr>
-      <p:sp>
-        <p:nvSpPr>
-          <p:cNvPr id="2" name="Title 1">
-            <a:extLst>
-              <a:ext uri="{FF2B5EF4-FFF2-40B4-BE49-F238E27FC236}">
-                <a16:creationId xmlns:a16="http://schemas.microsoft.com/office/drawing/2014/main" id="{F8A33362-6456-0F5B-5570-FA2A30C5C24B}"/>
-              </a:ext>
-            </a:extLst>
-          </p:cNvPr>
-          <p:cNvSpPr>
-            <a:spLocks noGrp="1"/>
-          </p:cNvSpPr>
-          <p:nvPr>
-            <p:ph type="ctrTitle"/>
-          </p:nvPr>
-        </p:nvSpPr>
-        <p:spPr>
-          <a:xfrm>
-            <a:off x="1524000" y="1122363"/>
-            <a:ext cx="9438752" cy="2387600"/>
-          </a:xfrm>
-        </p:spPr>
-        <p:txBody>
-          <a:bodyPr>
-            <a:normAutofit/>
-          </a:bodyPr>
-          <a:lstStyle/>
-          <a:p>
-            <a:r>
-              <a:rPr lang="en-US" sz="4400" dirty="0"/>
-              <a:t>Pitfalls of </a:t>
-            </a:r>
-            <a:r>
-              <a:rPr lang="en-US" sz="4400"/>
-              <a:t>Large-Scale Data Mining</a:t>
-            </a:r>
-            <a:endParaRPr lang="en-US" sz="4400" dirty="0"/>
-          </a:p>
-        </p:txBody>
-      </p:sp>
-    </p:spTree>
-    <p:extLst>
-      <p:ext uri="{BB962C8B-B14F-4D97-AF65-F5344CB8AC3E}">
-        <p14:creationId xmlns:p14="http://schemas.microsoft.com/office/powerpoint/2010/main" val="1079301423"/>
-      </p:ext>
-    </p:extLst>
-  </p:cSld>
-  <p:clrMapOvr>
-    <a:masterClrMapping/>
-  </p:clrMapOvr>
-</p:sld>
-</file>
-
 <file path=ppt/slides/slide5.xml><?xml version="1.0" encoding="utf-8"?>
 <p:sld xmlns:a="http://schemas.openxmlformats.org/drawingml/2006/main" xmlns:r="http://schemas.openxmlformats.org/officeDocument/2006/relationships" xmlns:p="http://schemas.openxmlformats.org/presentationml/2006/main">
   <p:cSld>
@@ -35163,6 +35294,76 @@
 </file>
 
 <file path=ppt/slides/slide50.xml><?xml version="1.0" encoding="utf-8"?>
+<p:sld xmlns:a="http://schemas.openxmlformats.org/drawingml/2006/main" xmlns:r="http://schemas.openxmlformats.org/officeDocument/2006/relationships" xmlns:p="http://schemas.openxmlformats.org/presentationml/2006/main">
+  <p:cSld>
+    <p:spTree>
+      <p:nvGrpSpPr>
+        <p:cNvPr id="1" name=""/>
+        <p:cNvGrpSpPr/>
+        <p:nvPr/>
+      </p:nvGrpSpPr>
+      <p:grpSpPr>
+        <a:xfrm>
+          <a:off x="0" y="0"/>
+          <a:ext cx="0" cy="0"/>
+          <a:chOff x="0" y="0"/>
+          <a:chExt cx="0" cy="0"/>
+        </a:xfrm>
+      </p:grpSpPr>
+      <p:sp>
+        <p:nvSpPr>
+          <p:cNvPr id="2" name="Title 1">
+            <a:extLst>
+              <a:ext uri="{FF2B5EF4-FFF2-40B4-BE49-F238E27FC236}">
+                <a16:creationId xmlns:a16="http://schemas.microsoft.com/office/drawing/2014/main" id="{F8A33362-6456-0F5B-5570-FA2A30C5C24B}"/>
+              </a:ext>
+            </a:extLst>
+          </p:cNvPr>
+          <p:cNvSpPr>
+            <a:spLocks noGrp="1"/>
+          </p:cNvSpPr>
+          <p:nvPr>
+            <p:ph type="ctrTitle"/>
+          </p:nvPr>
+        </p:nvSpPr>
+        <p:spPr>
+          <a:xfrm>
+            <a:off x="1524000" y="1122363"/>
+            <a:ext cx="9438752" cy="2387600"/>
+          </a:xfrm>
+        </p:spPr>
+        <p:txBody>
+          <a:bodyPr>
+            <a:normAutofit/>
+          </a:bodyPr>
+          <a:lstStyle/>
+          <a:p>
+            <a:r>
+              <a:rPr lang="en-US" sz="4400" dirty="0"/>
+              <a:t>Pitfalls of </a:t>
+            </a:r>
+            <a:r>
+              <a:rPr lang="en-US" sz="4400"/>
+              <a:t>Large-Scale Data Mining</a:t>
+            </a:r>
+            <a:endParaRPr lang="en-US" sz="4400" dirty="0"/>
+          </a:p>
+        </p:txBody>
+      </p:sp>
+    </p:spTree>
+    <p:extLst>
+      <p:ext uri="{BB962C8B-B14F-4D97-AF65-F5344CB8AC3E}">
+        <p14:creationId xmlns:p14="http://schemas.microsoft.com/office/powerpoint/2010/main" val="1079301423"/>
+      </p:ext>
+    </p:extLst>
+  </p:cSld>
+  <p:clrMapOvr>
+    <a:masterClrMapping/>
+  </p:clrMapOvr>
+</p:sld>
+</file>
+
+<file path=ppt/slides/slide51.xml><?xml version="1.0" encoding="utf-8"?>
 <p:sld xmlns:a="http://schemas.openxmlformats.org/drawingml/2006/main" xmlns:r="http://schemas.openxmlformats.org/officeDocument/2006/relationships" xmlns:p="http://schemas.openxmlformats.org/presentationml/2006/main">
   <p:cSld>
     <p:spTree>
@@ -35709,7 +35910,7 @@
 </p:sld>
 </file>
 
-<file path=ppt/slides/slide51.xml><?xml version="1.0" encoding="utf-8"?>
+<file path=ppt/slides/slide52.xml><?xml version="1.0" encoding="utf-8"?>
 <p:sld xmlns:a="http://schemas.openxmlformats.org/drawingml/2006/main" xmlns:r="http://schemas.openxmlformats.org/officeDocument/2006/relationships" xmlns:p="http://schemas.openxmlformats.org/presentationml/2006/main">
   <p:cSld>
     <p:spTree>
@@ -36252,7 +36453,7 @@
 </p:sld>
 </file>
 
-<file path=ppt/slides/slide52.xml><?xml version="1.0" encoding="utf-8"?>
+<file path=ppt/slides/slide53.xml><?xml version="1.0" encoding="utf-8"?>
 <p:sld xmlns:a="http://schemas.openxmlformats.org/drawingml/2006/main" xmlns:r="http://schemas.openxmlformats.org/officeDocument/2006/relationships" xmlns:p="http://schemas.openxmlformats.org/presentationml/2006/main">
   <p:cSld>
     <p:spTree>
@@ -36589,7 +36790,7 @@
 </p:sld>
 </file>
 
-<file path=ppt/slides/slide53.xml><?xml version="1.0" encoding="utf-8"?>
+<file path=ppt/slides/slide54.xml><?xml version="1.0" encoding="utf-8"?>
 <p:sld xmlns:a="http://schemas.openxmlformats.org/drawingml/2006/main" xmlns:r="http://schemas.openxmlformats.org/officeDocument/2006/relationships" xmlns:p="http://schemas.openxmlformats.org/presentationml/2006/main">
   <p:cSld>
     <p:spTree>
@@ -37177,7 +37378,7 @@
 </p:sld>
 </file>
 
-<file path=ppt/slides/slide54.xml><?xml version="1.0" encoding="utf-8"?>
+<file path=ppt/slides/slide55.xml><?xml version="1.0" encoding="utf-8"?>
 <p:sld xmlns:a="http://schemas.openxmlformats.org/drawingml/2006/main" xmlns:r="http://schemas.openxmlformats.org/officeDocument/2006/relationships" xmlns:p="http://schemas.openxmlformats.org/presentationml/2006/main">
   <p:cSld>
     <p:spTree>
@@ -37610,7 +37811,7 @@
 </p:sld>
 </file>
 
-<file path=ppt/slides/slide55.xml><?xml version="1.0" encoding="utf-8"?>
+<file path=ppt/slides/slide56.xml><?xml version="1.0" encoding="utf-8"?>
 <p:sld xmlns:a="http://schemas.openxmlformats.org/drawingml/2006/main" xmlns:r="http://schemas.openxmlformats.org/officeDocument/2006/relationships" xmlns:p="http://schemas.openxmlformats.org/presentationml/2006/main">
   <p:cSld>
     <p:spTree>
@@ -37988,7 +38189,7 @@
 </p:sld>
 </file>
 
-<file path=ppt/slides/slide56.xml><?xml version="1.0" encoding="utf-8"?>
+<file path=ppt/slides/slide57.xml><?xml version="1.0" encoding="utf-8"?>
 <p:sld xmlns:a="http://schemas.openxmlformats.org/drawingml/2006/main" xmlns:r="http://schemas.openxmlformats.org/officeDocument/2006/relationships" xmlns:p="http://schemas.openxmlformats.org/presentationml/2006/main">
   <p:cSld>
     <p:spTree>
@@ -38518,7 +38719,7 @@
 </p:sld>
 </file>
 
-<file path=ppt/slides/slide57.xml><?xml version="1.0" encoding="utf-8"?>
+<file path=ppt/slides/slide58.xml><?xml version="1.0" encoding="utf-8"?>
 <p:sld xmlns:a="http://schemas.openxmlformats.org/drawingml/2006/main" xmlns:r="http://schemas.openxmlformats.org/officeDocument/2006/relationships" xmlns:p="http://schemas.openxmlformats.org/presentationml/2006/main">
   <p:cSld>
     <p:spTree>
@@ -38578,7 +38779,7 @@
 </p:sld>
 </file>
 
-<file path=ppt/slides/slide58.xml><?xml version="1.0" encoding="utf-8"?>
+<file path=ppt/slides/slide59.xml><?xml version="1.0" encoding="utf-8"?>
 <p:sld xmlns:a="http://schemas.openxmlformats.org/drawingml/2006/main" xmlns:r="http://schemas.openxmlformats.org/officeDocument/2006/relationships" xmlns:p="http://schemas.openxmlformats.org/presentationml/2006/main">
   <p:cSld>
     <p:spTree>
@@ -39133,7 +39334,635 @@
 </p:sld>
 </file>
 
-<file path=ppt/slides/slide59.xml><?xml version="1.0" encoding="utf-8"?>
+<file path=ppt/slides/slide6.xml><?xml version="1.0" encoding="utf-8"?>
+<p:sld xmlns:a="http://schemas.openxmlformats.org/drawingml/2006/main" xmlns:r="http://schemas.openxmlformats.org/officeDocument/2006/relationships" xmlns:p="http://schemas.openxmlformats.org/presentationml/2006/main">
+  <p:cSld>
+    <p:spTree>
+      <p:nvGrpSpPr>
+        <p:cNvPr id="1" name=""/>
+        <p:cNvGrpSpPr/>
+        <p:nvPr/>
+      </p:nvGrpSpPr>
+      <p:grpSpPr>
+        <a:xfrm>
+          <a:off x="0" y="0"/>
+          <a:ext cx="0" cy="0"/>
+          <a:chOff x="0" y="0"/>
+          <a:chExt cx="0" cy="0"/>
+        </a:xfrm>
+      </p:grpSpPr>
+      <p:sp>
+        <p:nvSpPr>
+          <p:cNvPr id="3" name="Content Placeholder 2">
+            <a:extLst>
+              <a:ext uri="{FF2B5EF4-FFF2-40B4-BE49-F238E27FC236}">
+                <a16:creationId xmlns:a16="http://schemas.microsoft.com/office/drawing/2014/main" id="{258E6AF3-7615-4BD1-878E-A94C93E98F90}"/>
+              </a:ext>
+            </a:extLst>
+          </p:cNvPr>
+          <p:cNvSpPr>
+            <a:spLocks noGrp="1"/>
+          </p:cNvSpPr>
+          <p:nvPr>
+            <p:ph idx="1"/>
+          </p:nvPr>
+        </p:nvSpPr>
+        <p:spPr>
+          <a:xfrm>
+            <a:off x="838200" y="1217458"/>
+            <a:ext cx="10515600" cy="485939"/>
+          </a:xfrm>
+        </p:spPr>
+        <p:txBody>
+          <a:bodyPr>
+            <a:normAutofit fontScale="92500" lnSpcReduction="10000"/>
+          </a:bodyPr>
+          <a:lstStyle/>
+          <a:p>
+            <a:pPr marL="0" indent="0">
+              <a:buNone/>
+            </a:pPr>
+            <a:r>
+              <a:rPr lang="en-US" sz="3200" dirty="0"/>
+              <a:t>What is the KDD process?   </a:t>
+            </a:r>
+          </a:p>
+        </p:txBody>
+      </p:sp>
+      <p:sp>
+        <p:nvSpPr>
+          <p:cNvPr id="6" name="Title 1">
+            <a:extLst>
+              <a:ext uri="{FF2B5EF4-FFF2-40B4-BE49-F238E27FC236}">
+                <a16:creationId xmlns:a16="http://schemas.microsoft.com/office/drawing/2014/main" id="{CD29F70F-B868-451B-A65D-8721F4C7A2D9}"/>
+              </a:ext>
+            </a:extLst>
+          </p:cNvPr>
+          <p:cNvSpPr txBox="1">
+            <a:spLocks/>
+          </p:cNvSpPr>
+          <p:nvPr/>
+        </p:nvSpPr>
+        <p:spPr>
+          <a:xfrm>
+            <a:off x="838200" y="-635"/>
+            <a:ext cx="10515600" cy="1325563"/>
+          </a:xfrm>
+          <a:prstGeom prst="rect">
+            <a:avLst/>
+          </a:prstGeom>
+        </p:spPr>
+        <p:txBody>
+          <a:bodyPr vert="horz" lIns="91440" tIns="45720" rIns="91440" bIns="45720" rtlCol="0" anchor="ctr">
+            <a:normAutofit/>
+          </a:bodyPr>
+          <a:lstStyle>
+            <a:lvl1pPr algn="l" defTabSz="914400" rtl="0" eaLnBrk="1" latinLnBrk="0" hangingPunct="1">
+              <a:lnSpc>
+                <a:spcPct val="90000"/>
+              </a:lnSpc>
+              <a:spcBef>
+                <a:spcPct val="0"/>
+              </a:spcBef>
+              <a:buNone/>
+              <a:defRPr sz="4400" kern="1200">
+                <a:solidFill>
+                  <a:schemeClr val="tx1"/>
+                </a:solidFill>
+                <a:latin typeface="+mj-lt"/>
+                <a:ea typeface="+mj-ea"/>
+                <a:cs typeface="+mj-cs"/>
+              </a:defRPr>
+            </a:lvl1pPr>
+          </a:lstStyle>
+          <a:p>
+            <a:r>
+              <a:rPr lang="en-US" dirty="0">
+                <a:latin typeface="+mn-lt"/>
+              </a:rPr>
+              <a:t>KDD process</a:t>
+            </a:r>
+          </a:p>
+        </p:txBody>
+      </p:sp>
+      <p:pic>
+        <p:nvPicPr>
+          <p:cNvPr id="4" name="Picture 3">
+            <a:extLst>
+              <a:ext uri="{FF2B5EF4-FFF2-40B4-BE49-F238E27FC236}">
+                <a16:creationId xmlns:a16="http://schemas.microsoft.com/office/drawing/2014/main" id="{41A10601-345E-4A04-878A-28FFF71506B5}"/>
+              </a:ext>
+            </a:extLst>
+          </p:cNvPr>
+          <p:cNvPicPr>
+            <a:picLocks noChangeAspect="1"/>
+          </p:cNvPicPr>
+          <p:nvPr/>
+        </p:nvPicPr>
+        <p:blipFill>
+          <a:blip r:embed="rId2"/>
+          <a:stretch>
+            <a:fillRect/>
+          </a:stretch>
+        </p:blipFill>
+        <p:spPr>
+          <a:xfrm>
+            <a:off x="376610" y="2168435"/>
+            <a:ext cx="6121998" cy="3176886"/>
+          </a:xfrm>
+          <a:prstGeom prst="rect">
+            <a:avLst/>
+          </a:prstGeom>
+        </p:spPr>
+      </p:pic>
+      <p:sp>
+        <p:nvSpPr>
+          <p:cNvPr id="5" name="Content Placeholder 2">
+            <a:extLst>
+              <a:ext uri="{FF2B5EF4-FFF2-40B4-BE49-F238E27FC236}">
+                <a16:creationId xmlns:a16="http://schemas.microsoft.com/office/drawing/2014/main" id="{DBC99F37-3CFD-4C3B-8CF6-AEDE11B202D2}"/>
+              </a:ext>
+            </a:extLst>
+          </p:cNvPr>
+          <p:cNvSpPr txBox="1">
+            <a:spLocks/>
+          </p:cNvSpPr>
+          <p:nvPr/>
+        </p:nvSpPr>
+        <p:spPr>
+          <a:xfrm>
+            <a:off x="6787461" y="1921229"/>
+            <a:ext cx="5116757" cy="4395969"/>
+          </a:xfrm>
+          <a:prstGeom prst="rect">
+            <a:avLst/>
+          </a:prstGeom>
+        </p:spPr>
+        <p:txBody>
+          <a:bodyPr vert="horz" lIns="91440" tIns="45720" rIns="91440" bIns="45720" rtlCol="0">
+            <a:normAutofit lnSpcReduction="10000"/>
+          </a:bodyPr>
+          <a:lstStyle>
+            <a:lvl1pPr marL="228600" indent="-228600" algn="l" defTabSz="914400" rtl="0" eaLnBrk="1" latinLnBrk="0" hangingPunct="1">
+              <a:lnSpc>
+                <a:spcPct val="90000"/>
+              </a:lnSpc>
+              <a:spcBef>
+                <a:spcPts val="1000"/>
+              </a:spcBef>
+              <a:buFont typeface="Arial" panose="020B0604020202020204" pitchFamily="34" charset="0"/>
+              <a:buChar char="•"/>
+              <a:defRPr sz="2800" kern="1200">
+                <a:solidFill>
+                  <a:schemeClr val="tx1"/>
+                </a:solidFill>
+                <a:latin typeface="+mn-lt"/>
+                <a:ea typeface="+mn-ea"/>
+                <a:cs typeface="+mn-cs"/>
+              </a:defRPr>
+            </a:lvl1pPr>
+            <a:lvl2pPr marL="685800" indent="-228600" algn="l" defTabSz="914400" rtl="0" eaLnBrk="1" latinLnBrk="0" hangingPunct="1">
+              <a:lnSpc>
+                <a:spcPct val="90000"/>
+              </a:lnSpc>
+              <a:spcBef>
+                <a:spcPts val="500"/>
+              </a:spcBef>
+              <a:buFont typeface="Arial" panose="020B0604020202020204" pitchFamily="34" charset="0"/>
+              <a:buChar char="•"/>
+              <a:defRPr sz="2400" kern="1200">
+                <a:solidFill>
+                  <a:schemeClr val="tx1"/>
+                </a:solidFill>
+                <a:latin typeface="+mn-lt"/>
+                <a:ea typeface="+mn-ea"/>
+                <a:cs typeface="+mn-cs"/>
+              </a:defRPr>
+            </a:lvl2pPr>
+            <a:lvl3pPr marL="1143000" indent="-228600" algn="l" defTabSz="914400" rtl="0" eaLnBrk="1" latinLnBrk="0" hangingPunct="1">
+              <a:lnSpc>
+                <a:spcPct val="90000"/>
+              </a:lnSpc>
+              <a:spcBef>
+                <a:spcPts val="500"/>
+              </a:spcBef>
+              <a:buFont typeface="Arial" panose="020B0604020202020204" pitchFamily="34" charset="0"/>
+              <a:buChar char="•"/>
+              <a:defRPr sz="2000" kern="1200">
+                <a:solidFill>
+                  <a:schemeClr val="tx1"/>
+                </a:solidFill>
+                <a:latin typeface="+mn-lt"/>
+                <a:ea typeface="+mn-ea"/>
+                <a:cs typeface="+mn-cs"/>
+              </a:defRPr>
+            </a:lvl3pPr>
+            <a:lvl4pPr marL="1600200" indent="-228600" algn="l" defTabSz="914400" rtl="0" eaLnBrk="1" latinLnBrk="0" hangingPunct="1">
+              <a:lnSpc>
+                <a:spcPct val="90000"/>
+              </a:lnSpc>
+              <a:spcBef>
+                <a:spcPts val="500"/>
+              </a:spcBef>
+              <a:buFont typeface="Arial" panose="020B0604020202020204" pitchFamily="34" charset="0"/>
+              <a:buChar char="•"/>
+              <a:defRPr sz="1800" kern="1200">
+                <a:solidFill>
+                  <a:schemeClr val="tx1"/>
+                </a:solidFill>
+                <a:latin typeface="+mn-lt"/>
+                <a:ea typeface="+mn-ea"/>
+                <a:cs typeface="+mn-cs"/>
+              </a:defRPr>
+            </a:lvl4pPr>
+            <a:lvl5pPr marL="2057400" indent="-228600" algn="l" defTabSz="914400" rtl="0" eaLnBrk="1" latinLnBrk="0" hangingPunct="1">
+              <a:lnSpc>
+                <a:spcPct val="90000"/>
+              </a:lnSpc>
+              <a:spcBef>
+                <a:spcPts val="500"/>
+              </a:spcBef>
+              <a:buFont typeface="Arial" panose="020B0604020202020204" pitchFamily="34" charset="0"/>
+              <a:buChar char="•"/>
+              <a:defRPr sz="1800" kern="1200">
+                <a:solidFill>
+                  <a:schemeClr val="tx1"/>
+                </a:solidFill>
+                <a:latin typeface="+mn-lt"/>
+                <a:ea typeface="+mn-ea"/>
+                <a:cs typeface="+mn-cs"/>
+              </a:defRPr>
+            </a:lvl5pPr>
+            <a:lvl6pPr marL="2514600" indent="-228600" algn="l" defTabSz="914400" rtl="0" eaLnBrk="1" latinLnBrk="0" hangingPunct="1">
+              <a:lnSpc>
+                <a:spcPct val="90000"/>
+              </a:lnSpc>
+              <a:spcBef>
+                <a:spcPts val="500"/>
+              </a:spcBef>
+              <a:buFont typeface="Arial" panose="020B0604020202020204" pitchFamily="34" charset="0"/>
+              <a:buChar char="•"/>
+              <a:defRPr sz="1800" kern="1200">
+                <a:solidFill>
+                  <a:schemeClr val="tx1"/>
+                </a:solidFill>
+                <a:latin typeface="+mn-lt"/>
+                <a:ea typeface="+mn-ea"/>
+                <a:cs typeface="+mn-cs"/>
+              </a:defRPr>
+            </a:lvl6pPr>
+            <a:lvl7pPr marL="2971800" indent="-228600" algn="l" defTabSz="914400" rtl="0" eaLnBrk="1" latinLnBrk="0" hangingPunct="1">
+              <a:lnSpc>
+                <a:spcPct val="90000"/>
+              </a:lnSpc>
+              <a:spcBef>
+                <a:spcPts val="500"/>
+              </a:spcBef>
+              <a:buFont typeface="Arial" panose="020B0604020202020204" pitchFamily="34" charset="0"/>
+              <a:buChar char="•"/>
+              <a:defRPr sz="1800" kern="1200">
+                <a:solidFill>
+                  <a:schemeClr val="tx1"/>
+                </a:solidFill>
+                <a:latin typeface="+mn-lt"/>
+                <a:ea typeface="+mn-ea"/>
+                <a:cs typeface="+mn-cs"/>
+              </a:defRPr>
+            </a:lvl7pPr>
+            <a:lvl8pPr marL="3429000" indent="-228600" algn="l" defTabSz="914400" rtl="0" eaLnBrk="1" latinLnBrk="0" hangingPunct="1">
+              <a:lnSpc>
+                <a:spcPct val="90000"/>
+              </a:lnSpc>
+              <a:spcBef>
+                <a:spcPts val="500"/>
+              </a:spcBef>
+              <a:buFont typeface="Arial" panose="020B0604020202020204" pitchFamily="34" charset="0"/>
+              <a:buChar char="•"/>
+              <a:defRPr sz="1800" kern="1200">
+                <a:solidFill>
+                  <a:schemeClr val="tx1"/>
+                </a:solidFill>
+                <a:latin typeface="+mn-lt"/>
+                <a:ea typeface="+mn-ea"/>
+                <a:cs typeface="+mn-cs"/>
+              </a:defRPr>
+            </a:lvl8pPr>
+            <a:lvl9pPr marL="3886200" indent="-228600" algn="l" defTabSz="914400" rtl="0" eaLnBrk="1" latinLnBrk="0" hangingPunct="1">
+              <a:lnSpc>
+                <a:spcPct val="90000"/>
+              </a:lnSpc>
+              <a:spcBef>
+                <a:spcPts val="500"/>
+              </a:spcBef>
+              <a:buFont typeface="Arial" panose="020B0604020202020204" pitchFamily="34" charset="0"/>
+              <a:buChar char="•"/>
+              <a:defRPr sz="1800" kern="1200">
+                <a:solidFill>
+                  <a:schemeClr val="tx1"/>
+                </a:solidFill>
+                <a:latin typeface="+mn-lt"/>
+                <a:ea typeface="+mn-ea"/>
+                <a:cs typeface="+mn-cs"/>
+              </a:defRPr>
+            </a:lvl9pPr>
+          </a:lstStyle>
+          <a:p>
+            <a:pPr marL="0" indent="0">
+              <a:buFont typeface="Arial" panose="020B0604020202020204" pitchFamily="34" charset="0"/>
+              <a:buNone/>
+            </a:pPr>
+            <a:r>
+              <a:rPr lang="en-US" dirty="0"/>
+              <a:t>Is this diagram representative of today’s process?</a:t>
+            </a:r>
+          </a:p>
+          <a:p>
+            <a:r>
+              <a:rPr lang="en-US" dirty="0"/>
+              <a:t>Perhaps? </a:t>
+            </a:r>
+          </a:p>
+          <a:p>
+            <a:r>
+              <a:rPr lang="en-US" dirty="0"/>
+              <a:t>Must have a clear idea of goal!</a:t>
+            </a:r>
+          </a:p>
+          <a:p>
+            <a:r>
+              <a:rPr lang="en-US" dirty="0"/>
+              <a:t>KDD is an iterative process</a:t>
+            </a:r>
+          </a:p>
+          <a:p>
+            <a:pPr lvl="1"/>
+            <a:r>
+              <a:rPr lang="en-US" sz="2800" dirty="0"/>
+              <a:t>The results of on step informs updates to previous steps  </a:t>
+            </a:r>
+          </a:p>
+          <a:p>
+            <a:pPr lvl="1"/>
+            <a:r>
+              <a:rPr lang="en-US" sz="2800" dirty="0"/>
+              <a:t>Process is a series of overlapping cycles </a:t>
+            </a:r>
+          </a:p>
+        </p:txBody>
+      </p:sp>
+    </p:spTree>
+    <p:extLst>
+      <p:ext uri="{BB962C8B-B14F-4D97-AF65-F5344CB8AC3E}">
+        <p14:creationId xmlns:p14="http://schemas.microsoft.com/office/powerpoint/2010/main" val="2657309543"/>
+      </p:ext>
+    </p:extLst>
+  </p:cSld>
+  <p:clrMapOvr>
+    <a:masterClrMapping/>
+  </p:clrMapOvr>
+  <p:timing>
+    <p:tnLst>
+      <p:par>
+        <p:cTn id="1" dur="indefinite" restart="never" nodeType="tmRoot">
+          <p:childTnLst>
+            <p:seq concurrent="1" nextAc="seek">
+              <p:cTn id="2" dur="indefinite" nodeType="mainSeq">
+                <p:childTnLst>
+                  <p:par>
+                    <p:cTn id="3" fill="hold">
+                      <p:stCondLst>
+                        <p:cond delay="indefinite"/>
+                      </p:stCondLst>
+                      <p:childTnLst>
+                        <p:par>
+                          <p:cTn id="4" fill="hold">
+                            <p:stCondLst>
+                              <p:cond delay="0"/>
+                            </p:stCondLst>
+                            <p:childTnLst>
+                              <p:par>
+                                <p:cTn id="5" presetID="1" presetClass="entr" presetSubtype="0" fill="hold" nodeType="clickEffect">
+                                  <p:stCondLst>
+                                    <p:cond delay="0"/>
+                                  </p:stCondLst>
+                                  <p:childTnLst>
+                                    <p:set>
+                                      <p:cBhvr>
+                                        <p:cTn id="6" dur="1" fill="hold">
+                                          <p:stCondLst>
+                                            <p:cond delay="0"/>
+                                          </p:stCondLst>
+                                        </p:cTn>
+                                        <p:tgtEl>
+                                          <p:spTgt spid="5">
+                                            <p:txEl>
+                                              <p:pRg st="1" end="1"/>
+                                            </p:txEl>
+                                          </p:spTgt>
+                                        </p:tgtEl>
+                                        <p:attrNameLst>
+                                          <p:attrName>style.visibility</p:attrName>
+                                        </p:attrNameLst>
+                                      </p:cBhvr>
+                                      <p:to>
+                                        <p:strVal val="visible"/>
+                                      </p:to>
+                                    </p:set>
+                                  </p:childTnLst>
+                                </p:cTn>
+                              </p:par>
+                            </p:childTnLst>
+                          </p:cTn>
+                        </p:par>
+                      </p:childTnLst>
+                    </p:cTn>
+                  </p:par>
+                  <p:par>
+                    <p:cTn id="7" fill="hold">
+                      <p:stCondLst>
+                        <p:cond delay="indefinite"/>
+                      </p:stCondLst>
+                      <p:childTnLst>
+                        <p:par>
+                          <p:cTn id="8" fill="hold">
+                            <p:stCondLst>
+                              <p:cond delay="0"/>
+                            </p:stCondLst>
+                            <p:childTnLst>
+                              <p:par>
+                                <p:cTn id="9" presetID="1" presetClass="entr" presetSubtype="0" fill="hold" nodeType="clickEffect">
+                                  <p:stCondLst>
+                                    <p:cond delay="0"/>
+                                  </p:stCondLst>
+                                  <p:childTnLst>
+                                    <p:set>
+                                      <p:cBhvr>
+                                        <p:cTn id="10" dur="1" fill="hold">
+                                          <p:stCondLst>
+                                            <p:cond delay="0"/>
+                                          </p:stCondLst>
+                                        </p:cTn>
+                                        <p:tgtEl>
+                                          <p:spTgt spid="5">
+                                            <p:txEl>
+                                              <p:pRg st="2" end="2"/>
+                                            </p:txEl>
+                                          </p:spTgt>
+                                        </p:tgtEl>
+                                        <p:attrNameLst>
+                                          <p:attrName>style.visibility</p:attrName>
+                                        </p:attrNameLst>
+                                      </p:cBhvr>
+                                      <p:to>
+                                        <p:strVal val="visible"/>
+                                      </p:to>
+                                    </p:set>
+                                  </p:childTnLst>
+                                </p:cTn>
+                              </p:par>
+                            </p:childTnLst>
+                          </p:cTn>
+                        </p:par>
+                      </p:childTnLst>
+                    </p:cTn>
+                  </p:par>
+                  <p:par>
+                    <p:cTn id="11" fill="hold">
+                      <p:stCondLst>
+                        <p:cond delay="indefinite"/>
+                      </p:stCondLst>
+                      <p:childTnLst>
+                        <p:par>
+                          <p:cTn id="12" fill="hold">
+                            <p:stCondLst>
+                              <p:cond delay="0"/>
+                            </p:stCondLst>
+                            <p:childTnLst>
+                              <p:par>
+                                <p:cTn id="13" presetID="1" presetClass="entr" presetSubtype="0" fill="hold" nodeType="clickEffect">
+                                  <p:stCondLst>
+                                    <p:cond delay="0"/>
+                                  </p:stCondLst>
+                                  <p:childTnLst>
+                                    <p:set>
+                                      <p:cBhvr>
+                                        <p:cTn id="14" dur="1" fill="hold">
+                                          <p:stCondLst>
+                                            <p:cond delay="0"/>
+                                          </p:stCondLst>
+                                        </p:cTn>
+                                        <p:tgtEl>
+                                          <p:spTgt spid="5">
+                                            <p:txEl>
+                                              <p:pRg st="3" end="3"/>
+                                            </p:txEl>
+                                          </p:spTgt>
+                                        </p:tgtEl>
+                                        <p:attrNameLst>
+                                          <p:attrName>style.visibility</p:attrName>
+                                        </p:attrNameLst>
+                                      </p:cBhvr>
+                                      <p:to>
+                                        <p:strVal val="visible"/>
+                                      </p:to>
+                                    </p:set>
+                                  </p:childTnLst>
+                                </p:cTn>
+                              </p:par>
+                              <p:par>
+                                <p:cTn id="15" presetID="1" presetClass="entr" presetSubtype="0" fill="hold" nodeType="withEffect">
+                                  <p:stCondLst>
+                                    <p:cond delay="0"/>
+                                  </p:stCondLst>
+                                  <p:childTnLst>
+                                    <p:set>
+                                      <p:cBhvr>
+                                        <p:cTn id="16" dur="1" fill="hold">
+                                          <p:stCondLst>
+                                            <p:cond delay="0"/>
+                                          </p:stCondLst>
+                                        </p:cTn>
+                                        <p:tgtEl>
+                                          <p:spTgt spid="5">
+                                            <p:txEl>
+                                              <p:pRg st="4" end="4"/>
+                                            </p:txEl>
+                                          </p:spTgt>
+                                        </p:tgtEl>
+                                        <p:attrNameLst>
+                                          <p:attrName>style.visibility</p:attrName>
+                                        </p:attrNameLst>
+                                      </p:cBhvr>
+                                      <p:to>
+                                        <p:strVal val="visible"/>
+                                      </p:to>
+                                    </p:set>
+                                  </p:childTnLst>
+                                </p:cTn>
+                              </p:par>
+                              <p:par>
+                                <p:cTn id="17" presetID="1" presetClass="entr" presetSubtype="0" fill="hold" nodeType="withEffect">
+                                  <p:stCondLst>
+                                    <p:cond delay="0"/>
+                                  </p:stCondLst>
+                                  <p:childTnLst>
+                                    <p:set>
+                                      <p:cBhvr>
+                                        <p:cTn id="18" dur="1" fill="hold">
+                                          <p:stCondLst>
+                                            <p:cond delay="0"/>
+                                          </p:stCondLst>
+                                        </p:cTn>
+                                        <p:tgtEl>
+                                          <p:spTgt spid="5">
+                                            <p:txEl>
+                                              <p:pRg st="5" end="5"/>
+                                            </p:txEl>
+                                          </p:spTgt>
+                                        </p:tgtEl>
+                                        <p:attrNameLst>
+                                          <p:attrName>style.visibility</p:attrName>
+                                        </p:attrNameLst>
+                                      </p:cBhvr>
+                                      <p:to>
+                                        <p:strVal val="visible"/>
+                                      </p:to>
+                                    </p:set>
+                                  </p:childTnLst>
+                                </p:cTn>
+                              </p:par>
+                            </p:childTnLst>
+                          </p:cTn>
+                        </p:par>
+                      </p:childTnLst>
+                    </p:cTn>
+                  </p:par>
+                </p:childTnLst>
+              </p:cTn>
+              <p:prevCondLst>
+                <p:cond evt="onPrev" delay="0">
+                  <p:tgtEl>
+                    <p:sldTgt/>
+                  </p:tgtEl>
+                </p:cond>
+              </p:prevCondLst>
+              <p:nextCondLst>
+                <p:cond evt="onNext" delay="0">
+                  <p:tgtEl>
+                    <p:sldTgt/>
+                  </p:tgtEl>
+                </p:cond>
+              </p:nextCondLst>
+            </p:seq>
+          </p:childTnLst>
+        </p:cTn>
+      </p:par>
+    </p:tnLst>
+  </p:timing>
+</p:sld>
+</file>
+
+<file path=ppt/slides/slide60.xml><?xml version="1.0" encoding="utf-8"?>
 <p:sld xmlns:a="http://schemas.openxmlformats.org/drawingml/2006/main" xmlns:r="http://schemas.openxmlformats.org/officeDocument/2006/relationships" xmlns:p="http://schemas.openxmlformats.org/presentationml/2006/main">
   <p:cSld>
     <p:spTree>
@@ -39931,635 +40760,7 @@
 </p:sld>
 </file>
 
-<file path=ppt/slides/slide6.xml><?xml version="1.0" encoding="utf-8"?>
-<p:sld xmlns:a="http://schemas.openxmlformats.org/drawingml/2006/main" xmlns:r="http://schemas.openxmlformats.org/officeDocument/2006/relationships" xmlns:p="http://schemas.openxmlformats.org/presentationml/2006/main">
-  <p:cSld>
-    <p:spTree>
-      <p:nvGrpSpPr>
-        <p:cNvPr id="1" name=""/>
-        <p:cNvGrpSpPr/>
-        <p:nvPr/>
-      </p:nvGrpSpPr>
-      <p:grpSpPr>
-        <a:xfrm>
-          <a:off x="0" y="0"/>
-          <a:ext cx="0" cy="0"/>
-          <a:chOff x="0" y="0"/>
-          <a:chExt cx="0" cy="0"/>
-        </a:xfrm>
-      </p:grpSpPr>
-      <p:sp>
-        <p:nvSpPr>
-          <p:cNvPr id="3" name="Content Placeholder 2">
-            <a:extLst>
-              <a:ext uri="{FF2B5EF4-FFF2-40B4-BE49-F238E27FC236}">
-                <a16:creationId xmlns:a16="http://schemas.microsoft.com/office/drawing/2014/main" id="{258E6AF3-7615-4BD1-878E-A94C93E98F90}"/>
-              </a:ext>
-            </a:extLst>
-          </p:cNvPr>
-          <p:cNvSpPr>
-            <a:spLocks noGrp="1"/>
-          </p:cNvSpPr>
-          <p:nvPr>
-            <p:ph idx="1"/>
-          </p:nvPr>
-        </p:nvSpPr>
-        <p:spPr>
-          <a:xfrm>
-            <a:off x="838200" y="1217458"/>
-            <a:ext cx="10515600" cy="485939"/>
-          </a:xfrm>
-        </p:spPr>
-        <p:txBody>
-          <a:bodyPr>
-            <a:normAutofit fontScale="92500" lnSpcReduction="10000"/>
-          </a:bodyPr>
-          <a:lstStyle/>
-          <a:p>
-            <a:pPr marL="0" indent="0">
-              <a:buNone/>
-            </a:pPr>
-            <a:r>
-              <a:rPr lang="en-US" sz="3200" dirty="0"/>
-              <a:t>What is the KDD process?   </a:t>
-            </a:r>
-          </a:p>
-        </p:txBody>
-      </p:sp>
-      <p:sp>
-        <p:nvSpPr>
-          <p:cNvPr id="6" name="Title 1">
-            <a:extLst>
-              <a:ext uri="{FF2B5EF4-FFF2-40B4-BE49-F238E27FC236}">
-                <a16:creationId xmlns:a16="http://schemas.microsoft.com/office/drawing/2014/main" id="{CD29F70F-B868-451B-A65D-8721F4C7A2D9}"/>
-              </a:ext>
-            </a:extLst>
-          </p:cNvPr>
-          <p:cNvSpPr txBox="1">
-            <a:spLocks/>
-          </p:cNvSpPr>
-          <p:nvPr/>
-        </p:nvSpPr>
-        <p:spPr>
-          <a:xfrm>
-            <a:off x="838200" y="-635"/>
-            <a:ext cx="10515600" cy="1325563"/>
-          </a:xfrm>
-          <a:prstGeom prst="rect">
-            <a:avLst/>
-          </a:prstGeom>
-        </p:spPr>
-        <p:txBody>
-          <a:bodyPr vert="horz" lIns="91440" tIns="45720" rIns="91440" bIns="45720" rtlCol="0" anchor="ctr">
-            <a:normAutofit/>
-          </a:bodyPr>
-          <a:lstStyle>
-            <a:lvl1pPr algn="l" defTabSz="914400" rtl="0" eaLnBrk="1" latinLnBrk="0" hangingPunct="1">
-              <a:lnSpc>
-                <a:spcPct val="90000"/>
-              </a:lnSpc>
-              <a:spcBef>
-                <a:spcPct val="0"/>
-              </a:spcBef>
-              <a:buNone/>
-              <a:defRPr sz="4400" kern="1200">
-                <a:solidFill>
-                  <a:schemeClr val="tx1"/>
-                </a:solidFill>
-                <a:latin typeface="+mj-lt"/>
-                <a:ea typeface="+mj-ea"/>
-                <a:cs typeface="+mj-cs"/>
-              </a:defRPr>
-            </a:lvl1pPr>
-          </a:lstStyle>
-          <a:p>
-            <a:r>
-              <a:rPr lang="en-US" dirty="0">
-                <a:latin typeface="+mn-lt"/>
-              </a:rPr>
-              <a:t>KDD process</a:t>
-            </a:r>
-          </a:p>
-        </p:txBody>
-      </p:sp>
-      <p:pic>
-        <p:nvPicPr>
-          <p:cNvPr id="4" name="Picture 3">
-            <a:extLst>
-              <a:ext uri="{FF2B5EF4-FFF2-40B4-BE49-F238E27FC236}">
-                <a16:creationId xmlns:a16="http://schemas.microsoft.com/office/drawing/2014/main" id="{41A10601-345E-4A04-878A-28FFF71506B5}"/>
-              </a:ext>
-            </a:extLst>
-          </p:cNvPr>
-          <p:cNvPicPr>
-            <a:picLocks noChangeAspect="1"/>
-          </p:cNvPicPr>
-          <p:nvPr/>
-        </p:nvPicPr>
-        <p:blipFill>
-          <a:blip r:embed="rId2"/>
-          <a:stretch>
-            <a:fillRect/>
-          </a:stretch>
-        </p:blipFill>
-        <p:spPr>
-          <a:xfrm>
-            <a:off x="376610" y="2168435"/>
-            <a:ext cx="6121998" cy="3176886"/>
-          </a:xfrm>
-          <a:prstGeom prst="rect">
-            <a:avLst/>
-          </a:prstGeom>
-        </p:spPr>
-      </p:pic>
-      <p:sp>
-        <p:nvSpPr>
-          <p:cNvPr id="5" name="Content Placeholder 2">
-            <a:extLst>
-              <a:ext uri="{FF2B5EF4-FFF2-40B4-BE49-F238E27FC236}">
-                <a16:creationId xmlns:a16="http://schemas.microsoft.com/office/drawing/2014/main" id="{DBC99F37-3CFD-4C3B-8CF6-AEDE11B202D2}"/>
-              </a:ext>
-            </a:extLst>
-          </p:cNvPr>
-          <p:cNvSpPr txBox="1">
-            <a:spLocks/>
-          </p:cNvSpPr>
-          <p:nvPr/>
-        </p:nvSpPr>
-        <p:spPr>
-          <a:xfrm>
-            <a:off x="6787461" y="1921229"/>
-            <a:ext cx="5116757" cy="4395969"/>
-          </a:xfrm>
-          <a:prstGeom prst="rect">
-            <a:avLst/>
-          </a:prstGeom>
-        </p:spPr>
-        <p:txBody>
-          <a:bodyPr vert="horz" lIns="91440" tIns="45720" rIns="91440" bIns="45720" rtlCol="0">
-            <a:normAutofit lnSpcReduction="10000"/>
-          </a:bodyPr>
-          <a:lstStyle>
-            <a:lvl1pPr marL="228600" indent="-228600" algn="l" defTabSz="914400" rtl="0" eaLnBrk="1" latinLnBrk="0" hangingPunct="1">
-              <a:lnSpc>
-                <a:spcPct val="90000"/>
-              </a:lnSpc>
-              <a:spcBef>
-                <a:spcPts val="1000"/>
-              </a:spcBef>
-              <a:buFont typeface="Arial" panose="020B0604020202020204" pitchFamily="34" charset="0"/>
-              <a:buChar char="•"/>
-              <a:defRPr sz="2800" kern="1200">
-                <a:solidFill>
-                  <a:schemeClr val="tx1"/>
-                </a:solidFill>
-                <a:latin typeface="+mn-lt"/>
-                <a:ea typeface="+mn-ea"/>
-                <a:cs typeface="+mn-cs"/>
-              </a:defRPr>
-            </a:lvl1pPr>
-            <a:lvl2pPr marL="685800" indent="-228600" algn="l" defTabSz="914400" rtl="0" eaLnBrk="1" latinLnBrk="0" hangingPunct="1">
-              <a:lnSpc>
-                <a:spcPct val="90000"/>
-              </a:lnSpc>
-              <a:spcBef>
-                <a:spcPts val="500"/>
-              </a:spcBef>
-              <a:buFont typeface="Arial" panose="020B0604020202020204" pitchFamily="34" charset="0"/>
-              <a:buChar char="•"/>
-              <a:defRPr sz="2400" kern="1200">
-                <a:solidFill>
-                  <a:schemeClr val="tx1"/>
-                </a:solidFill>
-                <a:latin typeface="+mn-lt"/>
-                <a:ea typeface="+mn-ea"/>
-                <a:cs typeface="+mn-cs"/>
-              </a:defRPr>
-            </a:lvl2pPr>
-            <a:lvl3pPr marL="1143000" indent="-228600" algn="l" defTabSz="914400" rtl="0" eaLnBrk="1" latinLnBrk="0" hangingPunct="1">
-              <a:lnSpc>
-                <a:spcPct val="90000"/>
-              </a:lnSpc>
-              <a:spcBef>
-                <a:spcPts val="500"/>
-              </a:spcBef>
-              <a:buFont typeface="Arial" panose="020B0604020202020204" pitchFamily="34" charset="0"/>
-              <a:buChar char="•"/>
-              <a:defRPr sz="2000" kern="1200">
-                <a:solidFill>
-                  <a:schemeClr val="tx1"/>
-                </a:solidFill>
-                <a:latin typeface="+mn-lt"/>
-                <a:ea typeface="+mn-ea"/>
-                <a:cs typeface="+mn-cs"/>
-              </a:defRPr>
-            </a:lvl3pPr>
-            <a:lvl4pPr marL="1600200" indent="-228600" algn="l" defTabSz="914400" rtl="0" eaLnBrk="1" latinLnBrk="0" hangingPunct="1">
-              <a:lnSpc>
-                <a:spcPct val="90000"/>
-              </a:lnSpc>
-              <a:spcBef>
-                <a:spcPts val="500"/>
-              </a:spcBef>
-              <a:buFont typeface="Arial" panose="020B0604020202020204" pitchFamily="34" charset="0"/>
-              <a:buChar char="•"/>
-              <a:defRPr sz="1800" kern="1200">
-                <a:solidFill>
-                  <a:schemeClr val="tx1"/>
-                </a:solidFill>
-                <a:latin typeface="+mn-lt"/>
-                <a:ea typeface="+mn-ea"/>
-                <a:cs typeface="+mn-cs"/>
-              </a:defRPr>
-            </a:lvl4pPr>
-            <a:lvl5pPr marL="2057400" indent="-228600" algn="l" defTabSz="914400" rtl="0" eaLnBrk="1" latinLnBrk="0" hangingPunct="1">
-              <a:lnSpc>
-                <a:spcPct val="90000"/>
-              </a:lnSpc>
-              <a:spcBef>
-                <a:spcPts val="500"/>
-              </a:spcBef>
-              <a:buFont typeface="Arial" panose="020B0604020202020204" pitchFamily="34" charset="0"/>
-              <a:buChar char="•"/>
-              <a:defRPr sz="1800" kern="1200">
-                <a:solidFill>
-                  <a:schemeClr val="tx1"/>
-                </a:solidFill>
-                <a:latin typeface="+mn-lt"/>
-                <a:ea typeface="+mn-ea"/>
-                <a:cs typeface="+mn-cs"/>
-              </a:defRPr>
-            </a:lvl5pPr>
-            <a:lvl6pPr marL="2514600" indent="-228600" algn="l" defTabSz="914400" rtl="0" eaLnBrk="1" latinLnBrk="0" hangingPunct="1">
-              <a:lnSpc>
-                <a:spcPct val="90000"/>
-              </a:lnSpc>
-              <a:spcBef>
-                <a:spcPts val="500"/>
-              </a:spcBef>
-              <a:buFont typeface="Arial" panose="020B0604020202020204" pitchFamily="34" charset="0"/>
-              <a:buChar char="•"/>
-              <a:defRPr sz="1800" kern="1200">
-                <a:solidFill>
-                  <a:schemeClr val="tx1"/>
-                </a:solidFill>
-                <a:latin typeface="+mn-lt"/>
-                <a:ea typeface="+mn-ea"/>
-                <a:cs typeface="+mn-cs"/>
-              </a:defRPr>
-            </a:lvl6pPr>
-            <a:lvl7pPr marL="2971800" indent="-228600" algn="l" defTabSz="914400" rtl="0" eaLnBrk="1" latinLnBrk="0" hangingPunct="1">
-              <a:lnSpc>
-                <a:spcPct val="90000"/>
-              </a:lnSpc>
-              <a:spcBef>
-                <a:spcPts val="500"/>
-              </a:spcBef>
-              <a:buFont typeface="Arial" panose="020B0604020202020204" pitchFamily="34" charset="0"/>
-              <a:buChar char="•"/>
-              <a:defRPr sz="1800" kern="1200">
-                <a:solidFill>
-                  <a:schemeClr val="tx1"/>
-                </a:solidFill>
-                <a:latin typeface="+mn-lt"/>
-                <a:ea typeface="+mn-ea"/>
-                <a:cs typeface="+mn-cs"/>
-              </a:defRPr>
-            </a:lvl7pPr>
-            <a:lvl8pPr marL="3429000" indent="-228600" algn="l" defTabSz="914400" rtl="0" eaLnBrk="1" latinLnBrk="0" hangingPunct="1">
-              <a:lnSpc>
-                <a:spcPct val="90000"/>
-              </a:lnSpc>
-              <a:spcBef>
-                <a:spcPts val="500"/>
-              </a:spcBef>
-              <a:buFont typeface="Arial" panose="020B0604020202020204" pitchFamily="34" charset="0"/>
-              <a:buChar char="•"/>
-              <a:defRPr sz="1800" kern="1200">
-                <a:solidFill>
-                  <a:schemeClr val="tx1"/>
-                </a:solidFill>
-                <a:latin typeface="+mn-lt"/>
-                <a:ea typeface="+mn-ea"/>
-                <a:cs typeface="+mn-cs"/>
-              </a:defRPr>
-            </a:lvl8pPr>
-            <a:lvl9pPr marL="3886200" indent="-228600" algn="l" defTabSz="914400" rtl="0" eaLnBrk="1" latinLnBrk="0" hangingPunct="1">
-              <a:lnSpc>
-                <a:spcPct val="90000"/>
-              </a:lnSpc>
-              <a:spcBef>
-                <a:spcPts val="500"/>
-              </a:spcBef>
-              <a:buFont typeface="Arial" panose="020B0604020202020204" pitchFamily="34" charset="0"/>
-              <a:buChar char="•"/>
-              <a:defRPr sz="1800" kern="1200">
-                <a:solidFill>
-                  <a:schemeClr val="tx1"/>
-                </a:solidFill>
-                <a:latin typeface="+mn-lt"/>
-                <a:ea typeface="+mn-ea"/>
-                <a:cs typeface="+mn-cs"/>
-              </a:defRPr>
-            </a:lvl9pPr>
-          </a:lstStyle>
-          <a:p>
-            <a:pPr marL="0" indent="0">
-              <a:buFont typeface="Arial" panose="020B0604020202020204" pitchFamily="34" charset="0"/>
-              <a:buNone/>
-            </a:pPr>
-            <a:r>
-              <a:rPr lang="en-US" dirty="0"/>
-              <a:t>Is this diagram representative of today’s process?</a:t>
-            </a:r>
-          </a:p>
-          <a:p>
-            <a:r>
-              <a:rPr lang="en-US" dirty="0"/>
-              <a:t>Perhaps? </a:t>
-            </a:r>
-          </a:p>
-          <a:p>
-            <a:r>
-              <a:rPr lang="en-US" dirty="0"/>
-              <a:t>Must have a clear idea of goal!</a:t>
-            </a:r>
-          </a:p>
-          <a:p>
-            <a:r>
-              <a:rPr lang="en-US" dirty="0"/>
-              <a:t>KDD is an iterative process</a:t>
-            </a:r>
-          </a:p>
-          <a:p>
-            <a:pPr lvl="1"/>
-            <a:r>
-              <a:rPr lang="en-US" sz="2800" dirty="0"/>
-              <a:t>The results of on step informs updates to previous steps  </a:t>
-            </a:r>
-          </a:p>
-          <a:p>
-            <a:pPr lvl="1"/>
-            <a:r>
-              <a:rPr lang="en-US" sz="2800" dirty="0"/>
-              <a:t>Process is a series of overlapping cycles </a:t>
-            </a:r>
-          </a:p>
-        </p:txBody>
-      </p:sp>
-    </p:spTree>
-    <p:extLst>
-      <p:ext uri="{BB962C8B-B14F-4D97-AF65-F5344CB8AC3E}">
-        <p14:creationId xmlns:p14="http://schemas.microsoft.com/office/powerpoint/2010/main" val="2657309543"/>
-      </p:ext>
-    </p:extLst>
-  </p:cSld>
-  <p:clrMapOvr>
-    <a:masterClrMapping/>
-  </p:clrMapOvr>
-  <p:timing>
-    <p:tnLst>
-      <p:par>
-        <p:cTn id="1" dur="indefinite" restart="never" nodeType="tmRoot">
-          <p:childTnLst>
-            <p:seq concurrent="1" nextAc="seek">
-              <p:cTn id="2" dur="indefinite" nodeType="mainSeq">
-                <p:childTnLst>
-                  <p:par>
-                    <p:cTn id="3" fill="hold">
-                      <p:stCondLst>
-                        <p:cond delay="indefinite"/>
-                      </p:stCondLst>
-                      <p:childTnLst>
-                        <p:par>
-                          <p:cTn id="4" fill="hold">
-                            <p:stCondLst>
-                              <p:cond delay="0"/>
-                            </p:stCondLst>
-                            <p:childTnLst>
-                              <p:par>
-                                <p:cTn id="5" presetID="1" presetClass="entr" presetSubtype="0" fill="hold" nodeType="clickEffect">
-                                  <p:stCondLst>
-                                    <p:cond delay="0"/>
-                                  </p:stCondLst>
-                                  <p:childTnLst>
-                                    <p:set>
-                                      <p:cBhvr>
-                                        <p:cTn id="6" dur="1" fill="hold">
-                                          <p:stCondLst>
-                                            <p:cond delay="0"/>
-                                          </p:stCondLst>
-                                        </p:cTn>
-                                        <p:tgtEl>
-                                          <p:spTgt spid="5">
-                                            <p:txEl>
-                                              <p:pRg st="1" end="1"/>
-                                            </p:txEl>
-                                          </p:spTgt>
-                                        </p:tgtEl>
-                                        <p:attrNameLst>
-                                          <p:attrName>style.visibility</p:attrName>
-                                        </p:attrNameLst>
-                                      </p:cBhvr>
-                                      <p:to>
-                                        <p:strVal val="visible"/>
-                                      </p:to>
-                                    </p:set>
-                                  </p:childTnLst>
-                                </p:cTn>
-                              </p:par>
-                            </p:childTnLst>
-                          </p:cTn>
-                        </p:par>
-                      </p:childTnLst>
-                    </p:cTn>
-                  </p:par>
-                  <p:par>
-                    <p:cTn id="7" fill="hold">
-                      <p:stCondLst>
-                        <p:cond delay="indefinite"/>
-                      </p:stCondLst>
-                      <p:childTnLst>
-                        <p:par>
-                          <p:cTn id="8" fill="hold">
-                            <p:stCondLst>
-                              <p:cond delay="0"/>
-                            </p:stCondLst>
-                            <p:childTnLst>
-                              <p:par>
-                                <p:cTn id="9" presetID="1" presetClass="entr" presetSubtype="0" fill="hold" nodeType="clickEffect">
-                                  <p:stCondLst>
-                                    <p:cond delay="0"/>
-                                  </p:stCondLst>
-                                  <p:childTnLst>
-                                    <p:set>
-                                      <p:cBhvr>
-                                        <p:cTn id="10" dur="1" fill="hold">
-                                          <p:stCondLst>
-                                            <p:cond delay="0"/>
-                                          </p:stCondLst>
-                                        </p:cTn>
-                                        <p:tgtEl>
-                                          <p:spTgt spid="5">
-                                            <p:txEl>
-                                              <p:pRg st="2" end="2"/>
-                                            </p:txEl>
-                                          </p:spTgt>
-                                        </p:tgtEl>
-                                        <p:attrNameLst>
-                                          <p:attrName>style.visibility</p:attrName>
-                                        </p:attrNameLst>
-                                      </p:cBhvr>
-                                      <p:to>
-                                        <p:strVal val="visible"/>
-                                      </p:to>
-                                    </p:set>
-                                  </p:childTnLst>
-                                </p:cTn>
-                              </p:par>
-                            </p:childTnLst>
-                          </p:cTn>
-                        </p:par>
-                      </p:childTnLst>
-                    </p:cTn>
-                  </p:par>
-                  <p:par>
-                    <p:cTn id="11" fill="hold">
-                      <p:stCondLst>
-                        <p:cond delay="indefinite"/>
-                      </p:stCondLst>
-                      <p:childTnLst>
-                        <p:par>
-                          <p:cTn id="12" fill="hold">
-                            <p:stCondLst>
-                              <p:cond delay="0"/>
-                            </p:stCondLst>
-                            <p:childTnLst>
-                              <p:par>
-                                <p:cTn id="13" presetID="1" presetClass="entr" presetSubtype="0" fill="hold" nodeType="clickEffect">
-                                  <p:stCondLst>
-                                    <p:cond delay="0"/>
-                                  </p:stCondLst>
-                                  <p:childTnLst>
-                                    <p:set>
-                                      <p:cBhvr>
-                                        <p:cTn id="14" dur="1" fill="hold">
-                                          <p:stCondLst>
-                                            <p:cond delay="0"/>
-                                          </p:stCondLst>
-                                        </p:cTn>
-                                        <p:tgtEl>
-                                          <p:spTgt spid="5">
-                                            <p:txEl>
-                                              <p:pRg st="3" end="3"/>
-                                            </p:txEl>
-                                          </p:spTgt>
-                                        </p:tgtEl>
-                                        <p:attrNameLst>
-                                          <p:attrName>style.visibility</p:attrName>
-                                        </p:attrNameLst>
-                                      </p:cBhvr>
-                                      <p:to>
-                                        <p:strVal val="visible"/>
-                                      </p:to>
-                                    </p:set>
-                                  </p:childTnLst>
-                                </p:cTn>
-                              </p:par>
-                              <p:par>
-                                <p:cTn id="15" presetID="1" presetClass="entr" presetSubtype="0" fill="hold" nodeType="withEffect">
-                                  <p:stCondLst>
-                                    <p:cond delay="0"/>
-                                  </p:stCondLst>
-                                  <p:childTnLst>
-                                    <p:set>
-                                      <p:cBhvr>
-                                        <p:cTn id="16" dur="1" fill="hold">
-                                          <p:stCondLst>
-                                            <p:cond delay="0"/>
-                                          </p:stCondLst>
-                                        </p:cTn>
-                                        <p:tgtEl>
-                                          <p:spTgt spid="5">
-                                            <p:txEl>
-                                              <p:pRg st="4" end="4"/>
-                                            </p:txEl>
-                                          </p:spTgt>
-                                        </p:tgtEl>
-                                        <p:attrNameLst>
-                                          <p:attrName>style.visibility</p:attrName>
-                                        </p:attrNameLst>
-                                      </p:cBhvr>
-                                      <p:to>
-                                        <p:strVal val="visible"/>
-                                      </p:to>
-                                    </p:set>
-                                  </p:childTnLst>
-                                </p:cTn>
-                              </p:par>
-                              <p:par>
-                                <p:cTn id="17" presetID="1" presetClass="entr" presetSubtype="0" fill="hold" nodeType="withEffect">
-                                  <p:stCondLst>
-                                    <p:cond delay="0"/>
-                                  </p:stCondLst>
-                                  <p:childTnLst>
-                                    <p:set>
-                                      <p:cBhvr>
-                                        <p:cTn id="18" dur="1" fill="hold">
-                                          <p:stCondLst>
-                                            <p:cond delay="0"/>
-                                          </p:stCondLst>
-                                        </p:cTn>
-                                        <p:tgtEl>
-                                          <p:spTgt spid="5">
-                                            <p:txEl>
-                                              <p:pRg st="5" end="5"/>
-                                            </p:txEl>
-                                          </p:spTgt>
-                                        </p:tgtEl>
-                                        <p:attrNameLst>
-                                          <p:attrName>style.visibility</p:attrName>
-                                        </p:attrNameLst>
-                                      </p:cBhvr>
-                                      <p:to>
-                                        <p:strVal val="visible"/>
-                                      </p:to>
-                                    </p:set>
-                                  </p:childTnLst>
-                                </p:cTn>
-                              </p:par>
-                            </p:childTnLst>
-                          </p:cTn>
-                        </p:par>
-                      </p:childTnLst>
-                    </p:cTn>
-                  </p:par>
-                </p:childTnLst>
-              </p:cTn>
-              <p:prevCondLst>
-                <p:cond evt="onPrev" delay="0">
-                  <p:tgtEl>
-                    <p:sldTgt/>
-                  </p:tgtEl>
-                </p:cond>
-              </p:prevCondLst>
-              <p:nextCondLst>
-                <p:cond evt="onNext" delay="0">
-                  <p:tgtEl>
-                    <p:sldTgt/>
-                  </p:tgtEl>
-                </p:cond>
-              </p:nextCondLst>
-            </p:seq>
-          </p:childTnLst>
-        </p:cTn>
-      </p:par>
-    </p:tnLst>
-  </p:timing>
-</p:sld>
-</file>
-
-<file path=ppt/slides/slide60.xml><?xml version="1.0" encoding="utf-8"?>
+<file path=ppt/slides/slide61.xml><?xml version="1.0" encoding="utf-8"?>
 <p:sld xmlns:a="http://schemas.openxmlformats.org/drawingml/2006/main" xmlns:r="http://schemas.openxmlformats.org/officeDocument/2006/relationships" xmlns:p="http://schemas.openxmlformats.org/presentationml/2006/main">
   <p:cSld>
     <p:spTree>
@@ -41641,7 +41842,7 @@
 </p:sld>
 </file>
 
-<file path=ppt/slides/slide61.xml><?xml version="1.0" encoding="utf-8"?>
+<file path=ppt/slides/slide62.xml><?xml version="1.0" encoding="utf-8"?>
 <p:sld xmlns:a="http://schemas.openxmlformats.org/drawingml/2006/main" xmlns:r="http://schemas.openxmlformats.org/officeDocument/2006/relationships" xmlns:p="http://schemas.openxmlformats.org/presentationml/2006/main">
   <p:cSld>
     <p:spTree>
@@ -41795,7 +41996,7 @@
 </p:sld>
 </file>
 
-<file path=ppt/slides/slide62.xml><?xml version="1.0" encoding="utf-8"?>
+<file path=ppt/slides/slide63.xml><?xml version="1.0" encoding="utf-8"?>
 <p:sld xmlns:a="http://schemas.openxmlformats.org/drawingml/2006/main" xmlns:r="http://schemas.openxmlformats.org/officeDocument/2006/relationships" xmlns:p="http://schemas.openxmlformats.org/presentationml/2006/main">
   <p:cSld>
     <p:spTree>
@@ -42857,7 +43058,7 @@
 </p:sld>
 </file>
 
-<file path=ppt/slides/slide63.xml><?xml version="1.0" encoding="utf-8"?>
+<file path=ppt/slides/slide64.xml><?xml version="1.0" encoding="utf-8"?>
 <p:sld xmlns:a="http://schemas.openxmlformats.org/drawingml/2006/main" xmlns:r="http://schemas.openxmlformats.org/officeDocument/2006/relationships" xmlns:p="http://schemas.openxmlformats.org/presentationml/2006/main">
   <p:cSld>
     <p:spTree>
@@ -43015,7 +43216,7 @@
 </p:sld>
 </file>
 
-<file path=ppt/slides/slide64.xml><?xml version="1.0" encoding="utf-8"?>
+<file path=ppt/slides/slide65.xml><?xml version="1.0" encoding="utf-8"?>
 <p:sld xmlns:a="http://schemas.openxmlformats.org/drawingml/2006/main" xmlns:r="http://schemas.openxmlformats.org/officeDocument/2006/relationships" xmlns:p="http://schemas.openxmlformats.org/presentationml/2006/main">
   <p:cSld>
     <p:spTree>

</xml_diff>